<commit_message>
Add latest results and begin writing sections, #4
</commit_message>
<xml_diff>
--- a/poster/poster.pptx
+++ b/poster/poster.pptx
@@ -110,6 +110,18 @@
     </p:ext>
   </p:extLst>
 </p:presentation>
+</file>
+
+<file path=ppt/commentAuthors.xml><?xml version="1.0" encoding="utf-8"?>
+<p:cmAuthorLst xmlns:a="http://schemas.openxmlformats.org/drawingml/2006/main" xmlns:r="http://schemas.openxmlformats.org/officeDocument/2006/relationships" xmlns:p="http://schemas.openxmlformats.org/presentationml/2006/main">
+  <p:cmAuthor id="1" name="Jack Pay" initials="JP" lastIdx="1" clrIdx="0">
+    <p:extLst>
+      <p:ext uri="{19B8F6BF-5375-455C-9EA6-DF929625EA0E}">
+        <p15:presenceInfo xmlns:p15="http://schemas.microsoft.com/office/powerpoint/2012/main" userId="S::jack.pay@student.manchester.ac.uk::6dbf6555-e931-4336-9d41-3709907784b5" providerId="AD"/>
+      </p:ext>
+    </p:extLst>
+  </p:cmAuthor>
+</p:cmAuthorLst>
 </file>
 
 <file path=ppt/slideLayouts/slideLayout1.xml><?xml version="1.0" encoding="utf-8"?>
@@ -3112,6 +3124,89 @@
       </p:pic>
       <p:sp>
         <p:nvSpPr>
+          <p:cNvPr id="8" name="Rectangle: Rounded Corners 7">
+            <a:extLst>
+              <a:ext uri="{FF2B5EF4-FFF2-40B4-BE49-F238E27FC236}">
+                <a16:creationId xmlns:a16="http://schemas.microsoft.com/office/drawing/2014/main" id="{36AE10DD-C02A-1DAA-196B-8A671F267BE2}"/>
+              </a:ext>
+            </a:extLst>
+          </p:cNvPr>
+          <p:cNvSpPr/>
+          <p:nvPr/>
+        </p:nvSpPr>
+        <p:spPr>
+          <a:xfrm>
+            <a:off x="15407639" y="16868025"/>
+            <a:ext cx="27782520" cy="8787770"/>
+          </a:xfrm>
+          <a:prstGeom prst="roundRect">
+            <a:avLst>
+              <a:gd name="adj" fmla="val 8626"/>
+            </a:avLst>
+          </a:prstGeom>
+          <a:solidFill>
+            <a:srgbClr val="A799B7"/>
+          </a:solidFill>
+          <a:ln>
+            <a:noFill/>
+          </a:ln>
+        </p:spPr>
+        <p:style>
+          <a:lnRef idx="2">
+            <a:schemeClr val="accent1">
+              <a:shade val="15000"/>
+            </a:schemeClr>
+          </a:lnRef>
+          <a:fillRef idx="1">
+            <a:schemeClr val="accent1"/>
+          </a:fillRef>
+          <a:effectRef idx="0">
+            <a:schemeClr val="accent1"/>
+          </a:effectRef>
+          <a:fontRef idx="minor">
+            <a:schemeClr val="lt1"/>
+          </a:fontRef>
+        </p:style>
+        <p:txBody>
+          <a:bodyPr wrap="square" tIns="0" rtlCol="0" anchor="t"/>
+          <a:lstStyle/>
+          <a:p>
+            <a:pPr algn="ctr"/>
+            <a:r>
+              <a:rPr lang="en-US" sz="6600" dirty="0">
+                <a:solidFill>
+                  <a:srgbClr val="FBD206"/>
+                </a:solidFill>
+                <a:latin typeface="Open Sans SemiBold" pitchFamily="2" charset="0"/>
+                <a:ea typeface="Open Sans SemiBold" pitchFamily="2" charset="0"/>
+                <a:cs typeface="Open Sans SemiBold" pitchFamily="2" charset="0"/>
+              </a:rPr>
+              <a:t>Optimal Results</a:t>
+            </a:r>
+            <a:endParaRPr lang="en-GB" sz="6600" dirty="0">
+              <a:solidFill>
+                <a:schemeClr val="bg1"/>
+              </a:solidFill>
+              <a:latin typeface="Open Sans Light" pitchFamily="2" charset="0"/>
+              <a:ea typeface="Open Sans Light" pitchFamily="2" charset="0"/>
+              <a:cs typeface="Open Sans Light" pitchFamily="2" charset="0"/>
+            </a:endParaRPr>
+          </a:p>
+          <a:p>
+            <a:pPr algn="ctr"/>
+            <a:endParaRPr lang="en-GB" sz="6600" dirty="0">
+              <a:solidFill>
+                <a:srgbClr val="FBD206"/>
+              </a:solidFill>
+              <a:latin typeface="Open Sans Light" pitchFamily="2" charset="0"/>
+              <a:ea typeface="Open Sans Light" pitchFamily="2" charset="0"/>
+              <a:cs typeface="Open Sans Light" pitchFamily="2" charset="0"/>
+            </a:endParaRPr>
+          </a:p>
+        </p:txBody>
+      </p:sp>
+      <p:sp>
+        <p:nvSpPr>
           <p:cNvPr id="4" name="Rectangle: Rounded Corners 3">
             <a:extLst>
               <a:ext uri="{FF2B5EF4-FFF2-40B4-BE49-F238E27FC236}">
@@ -3124,8 +3219,8 @@
         </p:nvSpPr>
         <p:spPr>
           <a:xfrm>
-            <a:off x="1158240" y="3801872"/>
-            <a:ext cx="13075920" cy="12657329"/>
+            <a:off x="701040" y="3789703"/>
+            <a:ext cx="13763105" cy="5562115"/>
           </a:xfrm>
           <a:prstGeom prst="roundRect">
             <a:avLst/>
@@ -3157,7 +3252,11 @@
           <a:bodyPr rtlCol="0" anchor="t"/>
           <a:lstStyle/>
           <a:p>
-            <a:pPr algn="ctr"/>
+            <a:pPr algn="ctr">
+              <a:spcBef>
+                <a:spcPts val="1800"/>
+              </a:spcBef>
+            </a:pPr>
             <a:r>
               <a:rPr lang="en-US" sz="6600" dirty="0">
                 <a:solidFill>
@@ -3171,15 +3270,99 @@
             </a:r>
           </a:p>
           <a:p>
-            <a:pPr algn="ctr"/>
-            <a:r>
-              <a:rPr lang="en-US" sz="6600" dirty="0">
+            <a:pPr marL="857250" indent="-857250">
+              <a:spcBef>
+                <a:spcPts val="1800"/>
+              </a:spcBef>
+              <a:buFont typeface="Arial" panose="020B0604020202020204" pitchFamily="34" charset="0"/>
+              <a:buChar char="•"/>
+            </a:pPr>
+            <a:r>
+              <a:rPr lang="en-GB" sz="4800" b="1" dirty="0">
                 <a:latin typeface="Open Sans Light" pitchFamily="2" charset="0"/>
                 <a:ea typeface="Open Sans Light" pitchFamily="2" charset="0"/>
                 <a:cs typeface="Open Sans Light" pitchFamily="2" charset="0"/>
               </a:rPr>
-              <a:t>input</a:t>
-            </a:r>
+              <a:t>Two models </a:t>
+            </a:r>
+            <a:r>
+              <a:rPr lang="en-GB" sz="4800" dirty="0">
+                <a:latin typeface="Open Sans Light" pitchFamily="2" charset="0"/>
+                <a:ea typeface="Open Sans Light" pitchFamily="2" charset="0"/>
+                <a:cs typeface="Open Sans Light" pitchFamily="2" charset="0"/>
+              </a:rPr>
+              <a:t>were developed to solve Natural Language Inference (</a:t>
+            </a:r>
+            <a:r>
+              <a:rPr lang="en-GB" sz="4800" b="1" dirty="0">
+                <a:latin typeface="Open Sans Light" pitchFamily="2" charset="0"/>
+                <a:ea typeface="Open Sans Light" pitchFamily="2" charset="0"/>
+                <a:cs typeface="Open Sans Light" pitchFamily="2" charset="0"/>
+              </a:rPr>
+              <a:t>NLI</a:t>
+            </a:r>
+            <a:r>
+              <a:rPr lang="en-GB" sz="4800" dirty="0">
+                <a:latin typeface="Open Sans Light" pitchFamily="2" charset="0"/>
+                <a:ea typeface="Open Sans Light" pitchFamily="2" charset="0"/>
+                <a:cs typeface="Open Sans Light" pitchFamily="2" charset="0"/>
+              </a:rPr>
+              <a:t>)</a:t>
+            </a:r>
+          </a:p>
+          <a:p>
+            <a:pPr marL="857250" indent="-857250">
+              <a:spcBef>
+                <a:spcPts val="1800"/>
+              </a:spcBef>
+              <a:buFont typeface="Arial" panose="020B0604020202020204" pitchFamily="34" charset="0"/>
+              <a:buChar char="•"/>
+            </a:pPr>
+            <a:r>
+              <a:rPr lang="en-GB" sz="4800" dirty="0">
+                <a:latin typeface="Open Sans Light" pitchFamily="2" charset="0"/>
+                <a:ea typeface="Open Sans Light" pitchFamily="2" charset="0"/>
+                <a:cs typeface="Open Sans Light" pitchFamily="2" charset="0"/>
+              </a:rPr>
+              <a:t>Method B focused on using RNNs whilst C finetuned pretrained Transformer architectures</a:t>
+            </a:r>
+          </a:p>
+          <a:p>
+            <a:pPr marL="857250" indent="-857250">
+              <a:spcBef>
+                <a:spcPts val="1800"/>
+              </a:spcBef>
+              <a:buFont typeface="Arial" panose="020B0604020202020204" pitchFamily="34" charset="0"/>
+              <a:buChar char="•"/>
+            </a:pPr>
+            <a:endParaRPr lang="en-GB" sz="4800" dirty="0">
+              <a:latin typeface="Open Sans Light" pitchFamily="2" charset="0"/>
+              <a:ea typeface="Open Sans Light" pitchFamily="2" charset="0"/>
+              <a:cs typeface="Open Sans Light" pitchFamily="2" charset="0"/>
+            </a:endParaRPr>
+          </a:p>
+          <a:p>
+            <a:pPr marL="857250" indent="-857250">
+              <a:spcBef>
+                <a:spcPts val="1800"/>
+              </a:spcBef>
+              <a:buFont typeface="Arial" panose="020B0604020202020204" pitchFamily="34" charset="0"/>
+              <a:buChar char="•"/>
+            </a:pPr>
+            <a:endParaRPr lang="en-GB" sz="4800" dirty="0">
+              <a:latin typeface="Open Sans Light" pitchFamily="2" charset="0"/>
+              <a:ea typeface="Open Sans Light" pitchFamily="2" charset="0"/>
+              <a:cs typeface="Open Sans Light" pitchFamily="2" charset="0"/>
+            </a:endParaRPr>
+          </a:p>
+          <a:p>
+            <a:pPr marL="857250" indent="-857250">
+              <a:spcBef>
+                <a:spcPts val="1800"/>
+              </a:spcBef>
+              <a:buFont typeface="Arial" panose="020B0604020202020204" pitchFamily="34" charset="0"/>
+              <a:buChar char="•"/>
+            </a:pPr>
             <a:endParaRPr lang="en-GB" sz="6600" dirty="0">
               <a:latin typeface="Open Sans Light" pitchFamily="2" charset="0"/>
               <a:ea typeface="Open Sans Light" pitchFamily="2" charset="0"/>
@@ -3190,10 +3373,10 @@
       </p:sp>
       <p:sp>
         <p:nvSpPr>
-          <p:cNvPr id="8" name="Rectangle: Rounded Corners 7">
+          <p:cNvPr id="9" name="Rectangle: Rounded Corners 8">
             <a:extLst>
               <a:ext uri="{FF2B5EF4-FFF2-40B4-BE49-F238E27FC236}">
-                <a16:creationId xmlns:a16="http://schemas.microsoft.com/office/drawing/2014/main" id="{36AE10DD-C02A-1DAA-196B-8A671F267BE2}"/>
+                <a16:creationId xmlns:a16="http://schemas.microsoft.com/office/drawing/2014/main" id="{4E54F0FF-A100-E45E-5146-86EADDE73AF0}"/>
               </a:ext>
             </a:extLst>
           </p:cNvPr>
@@ -3202,8 +3385,403 @@
         </p:nvSpPr>
         <p:spPr>
           <a:xfrm>
-            <a:off x="15407640" y="16908272"/>
-            <a:ext cx="27325320" cy="8787770"/>
+            <a:off x="701039" y="9800890"/>
+            <a:ext cx="13763105" cy="15882982"/>
+          </a:xfrm>
+          <a:prstGeom prst="roundRect">
+            <a:avLst>
+              <a:gd name="adj" fmla="val 6097"/>
+            </a:avLst>
+          </a:prstGeom>
+          <a:solidFill>
+            <a:srgbClr val="A799B7"/>
+          </a:solidFill>
+          <a:ln>
+            <a:noFill/>
+          </a:ln>
+        </p:spPr>
+        <p:style>
+          <a:lnRef idx="2">
+            <a:schemeClr val="accent1">
+              <a:shade val="15000"/>
+            </a:schemeClr>
+          </a:lnRef>
+          <a:fillRef idx="1">
+            <a:schemeClr val="accent1"/>
+          </a:fillRef>
+          <a:effectRef idx="0">
+            <a:schemeClr val="accent1"/>
+          </a:effectRef>
+          <a:fontRef idx="minor">
+            <a:schemeClr val="lt1"/>
+          </a:fontRef>
+        </p:style>
+        <p:txBody>
+          <a:bodyPr rtlCol="0" anchor="t"/>
+          <a:lstStyle/>
+          <a:p>
+            <a:pPr algn="ctr">
+              <a:spcBef>
+                <a:spcPts val="1800"/>
+              </a:spcBef>
+            </a:pPr>
+            <a:r>
+              <a:rPr lang="en-US" sz="6600" dirty="0">
+                <a:solidFill>
+                  <a:srgbClr val="FBD206"/>
+                </a:solidFill>
+                <a:latin typeface="Open Sans SemiBold" pitchFamily="2" charset="0"/>
+                <a:ea typeface="Open Sans SemiBold" pitchFamily="2" charset="0"/>
+                <a:cs typeface="Open Sans SemiBold" pitchFamily="2" charset="0"/>
+              </a:rPr>
+              <a:t>Methods</a:t>
+            </a:r>
+          </a:p>
+          <a:p>
+            <a:pPr algn="ctr">
+              <a:spcBef>
+                <a:spcPts val="1800"/>
+              </a:spcBef>
+            </a:pPr>
+            <a:r>
+              <a:rPr lang="en-US" sz="4800" dirty="0">
+                <a:solidFill>
+                  <a:schemeClr val="bg1"/>
+                </a:solidFill>
+                <a:latin typeface="Open Sans Light" pitchFamily="2" charset="0"/>
+                <a:ea typeface="Open Sans Light" pitchFamily="2" charset="0"/>
+                <a:cs typeface="Open Sans Light" pitchFamily="2" charset="0"/>
+              </a:rPr>
+              <a:t>Two methods were taken:</a:t>
+            </a:r>
+          </a:p>
+          <a:p>
+            <a:pPr marL="685800" indent="-685800">
+              <a:spcBef>
+                <a:spcPts val="1800"/>
+              </a:spcBef>
+              <a:buFont typeface="Arial" panose="020B0604020202020204" pitchFamily="34" charset="0"/>
+              <a:buChar char="•"/>
+            </a:pPr>
+            <a:r>
+              <a:rPr lang="en-US" sz="4800" b="1" dirty="0">
+                <a:solidFill>
+                  <a:schemeClr val="bg1"/>
+                </a:solidFill>
+                <a:latin typeface="Open Sans Light" pitchFamily="2" charset="0"/>
+                <a:ea typeface="Open Sans Light" pitchFamily="2" charset="0"/>
+                <a:cs typeface="Open Sans Light" pitchFamily="2" charset="0"/>
+              </a:rPr>
+              <a:t>Method B</a:t>
+            </a:r>
+            <a:r>
+              <a:rPr lang="en-US" sz="4800" dirty="0">
+                <a:solidFill>
+                  <a:schemeClr val="bg1"/>
+                </a:solidFill>
+                <a:latin typeface="Open Sans Light" pitchFamily="2" charset="0"/>
+                <a:ea typeface="Open Sans Light" pitchFamily="2" charset="0"/>
+                <a:cs typeface="Open Sans Light" pitchFamily="2" charset="0"/>
+              </a:rPr>
+              <a:t>:</a:t>
+            </a:r>
+          </a:p>
+          <a:p>
+            <a:pPr marL="1143000" lvl="1" indent="-685800">
+              <a:spcBef>
+                <a:spcPts val="1800"/>
+              </a:spcBef>
+              <a:buFont typeface="Arial" panose="020B0604020202020204" pitchFamily="34" charset="0"/>
+              <a:buChar char="•"/>
+            </a:pPr>
+            <a:r>
+              <a:rPr lang="en-GB" sz="4800" dirty="0">
+                <a:solidFill>
+                  <a:schemeClr val="bg1"/>
+                </a:solidFill>
+                <a:latin typeface="Open Sans Light" pitchFamily="2" charset="0"/>
+                <a:ea typeface="Open Sans Light" pitchFamily="2" charset="0"/>
+                <a:cs typeface="Open Sans Light" pitchFamily="2" charset="0"/>
+              </a:rPr>
+              <a:t>Trained a </a:t>
+            </a:r>
+            <a:r>
+              <a:rPr lang="en-GB" sz="4800" b="1" dirty="0">
+                <a:solidFill>
+                  <a:schemeClr val="bg1"/>
+                </a:solidFill>
+                <a:latin typeface="Open Sans Light" pitchFamily="2" charset="0"/>
+                <a:ea typeface="Open Sans Light" pitchFamily="2" charset="0"/>
+                <a:cs typeface="Open Sans Light" pitchFamily="2" charset="0"/>
+              </a:rPr>
+              <a:t>Bi-LSTM</a:t>
+            </a:r>
+            <a:r>
+              <a:rPr lang="en-GB" sz="4800" dirty="0">
+                <a:solidFill>
+                  <a:schemeClr val="bg1"/>
+                </a:solidFill>
+                <a:latin typeface="Open Sans Light" pitchFamily="2" charset="0"/>
+                <a:ea typeface="Open Sans Light" pitchFamily="2" charset="0"/>
+                <a:cs typeface="Open Sans Light" pitchFamily="2" charset="0"/>
+              </a:rPr>
+              <a:t> with frozen </a:t>
+            </a:r>
+            <a:r>
+              <a:rPr lang="en-GB" sz="4800" b="1" dirty="0">
+                <a:solidFill>
+                  <a:schemeClr val="bg1"/>
+                </a:solidFill>
+                <a:latin typeface="Open Sans Light" pitchFamily="2" charset="0"/>
+                <a:ea typeface="Open Sans Light" pitchFamily="2" charset="0"/>
+                <a:cs typeface="Open Sans Light" pitchFamily="2" charset="0"/>
+              </a:rPr>
+              <a:t>ROBERTA</a:t>
+            </a:r>
+            <a:r>
+              <a:rPr lang="en-GB" sz="4800" dirty="0">
+                <a:solidFill>
+                  <a:schemeClr val="bg1"/>
+                </a:solidFill>
+                <a:latin typeface="Open Sans Light" pitchFamily="2" charset="0"/>
+                <a:ea typeface="Open Sans Light" pitchFamily="2" charset="0"/>
+                <a:cs typeface="Open Sans Light" pitchFamily="2" charset="0"/>
+              </a:rPr>
+              <a:t> embeddings</a:t>
+            </a:r>
+          </a:p>
+          <a:p>
+            <a:pPr marL="1143000" lvl="1" indent="-685800">
+              <a:spcBef>
+                <a:spcPts val="1800"/>
+              </a:spcBef>
+              <a:buFont typeface="Arial" panose="020B0604020202020204" pitchFamily="34" charset="0"/>
+              <a:buChar char="•"/>
+            </a:pPr>
+            <a:r>
+              <a:rPr lang="en-GB" sz="4800" dirty="0">
+                <a:solidFill>
+                  <a:schemeClr val="bg1"/>
+                </a:solidFill>
+                <a:latin typeface="Open Sans Light" pitchFamily="2" charset="0"/>
+                <a:ea typeface="Open Sans Light" pitchFamily="2" charset="0"/>
+                <a:cs typeface="Open Sans Light" pitchFamily="2" charset="0"/>
+              </a:rPr>
+              <a:t>Utilised </a:t>
+            </a:r>
+            <a:r>
+              <a:rPr lang="en-GB" sz="4800" b="1" dirty="0">
+                <a:solidFill>
+                  <a:schemeClr val="bg1"/>
+                </a:solidFill>
+                <a:latin typeface="Open Sans Light" pitchFamily="2" charset="0"/>
+                <a:ea typeface="Open Sans Light" pitchFamily="2" charset="0"/>
+                <a:cs typeface="Open Sans Light" pitchFamily="2" charset="0"/>
+              </a:rPr>
+              <a:t>learning rate scheduling </a:t>
+            </a:r>
+            <a:r>
+              <a:rPr lang="en-GB" sz="4800" dirty="0">
+                <a:solidFill>
+                  <a:schemeClr val="bg1"/>
+                </a:solidFill>
+                <a:latin typeface="Open Sans Light" pitchFamily="2" charset="0"/>
+                <a:ea typeface="Open Sans Light" pitchFamily="2" charset="0"/>
+                <a:cs typeface="Open Sans Light" pitchFamily="2" charset="0"/>
+              </a:rPr>
+              <a:t>to approach a global optimum</a:t>
+            </a:r>
+          </a:p>
+          <a:p>
+            <a:pPr marL="685800" indent="-685800">
+              <a:spcBef>
+                <a:spcPts val="1800"/>
+              </a:spcBef>
+              <a:buFont typeface="Arial" panose="020B0604020202020204" pitchFamily="34" charset="0"/>
+              <a:buChar char="•"/>
+            </a:pPr>
+            <a:r>
+              <a:rPr lang="en-GB" sz="4800" b="1" dirty="0">
+                <a:solidFill>
+                  <a:schemeClr val="bg1"/>
+                </a:solidFill>
+                <a:latin typeface="Open Sans Light" pitchFamily="2" charset="0"/>
+                <a:ea typeface="Open Sans Light" pitchFamily="2" charset="0"/>
+                <a:cs typeface="Open Sans Light" pitchFamily="2" charset="0"/>
+              </a:rPr>
+              <a:t>Method C:</a:t>
+            </a:r>
+            <a:endParaRPr lang="en-GB" sz="4800" dirty="0">
+              <a:solidFill>
+                <a:schemeClr val="bg1"/>
+              </a:solidFill>
+              <a:latin typeface="Open Sans Light" pitchFamily="2" charset="0"/>
+              <a:ea typeface="Open Sans Light" pitchFamily="2" charset="0"/>
+              <a:cs typeface="Open Sans Light" pitchFamily="2" charset="0"/>
+            </a:endParaRPr>
+          </a:p>
+          <a:p>
+            <a:pPr marL="1143000" lvl="1" indent="-685800">
+              <a:spcBef>
+                <a:spcPts val="1800"/>
+              </a:spcBef>
+              <a:buFont typeface="Arial" panose="020B0604020202020204" pitchFamily="34" charset="0"/>
+              <a:buChar char="•"/>
+            </a:pPr>
+            <a:r>
+              <a:rPr lang="en-GB" sz="4800" dirty="0">
+                <a:solidFill>
+                  <a:schemeClr val="bg1"/>
+                </a:solidFill>
+                <a:latin typeface="Open Sans Light" pitchFamily="2" charset="0"/>
+                <a:ea typeface="Open Sans Light" pitchFamily="2" charset="0"/>
+                <a:cs typeface="Open Sans Light" pitchFamily="2" charset="0"/>
+              </a:rPr>
+              <a:t>Finetuned the base </a:t>
+            </a:r>
+            <a:r>
+              <a:rPr lang="en-GB" sz="4800" b="1" dirty="0">
+                <a:solidFill>
+                  <a:schemeClr val="bg1"/>
+                </a:solidFill>
+                <a:latin typeface="Open Sans Light" pitchFamily="2" charset="0"/>
+                <a:ea typeface="Open Sans Light" pitchFamily="2" charset="0"/>
+                <a:cs typeface="Open Sans Light" pitchFamily="2" charset="0"/>
+              </a:rPr>
+              <a:t>ROBERTA</a:t>
+            </a:r>
+            <a:r>
+              <a:rPr lang="en-GB" sz="4800" dirty="0">
+                <a:solidFill>
+                  <a:schemeClr val="bg1"/>
+                </a:solidFill>
+                <a:latin typeface="Open Sans Light" pitchFamily="2" charset="0"/>
+                <a:ea typeface="Open Sans Light" pitchFamily="2" charset="0"/>
+                <a:cs typeface="Open Sans Light" pitchFamily="2" charset="0"/>
+              </a:rPr>
+              <a:t> Transformer model</a:t>
+            </a:r>
+          </a:p>
+          <a:p>
+            <a:pPr marL="1143000" lvl="1" indent="-685800">
+              <a:spcBef>
+                <a:spcPts val="1800"/>
+              </a:spcBef>
+              <a:buFont typeface="Arial" panose="020B0604020202020204" pitchFamily="34" charset="0"/>
+              <a:buChar char="•"/>
+            </a:pPr>
+            <a:r>
+              <a:rPr lang="en-GB" sz="4800" dirty="0">
+                <a:solidFill>
+                  <a:schemeClr val="bg1"/>
+                </a:solidFill>
+                <a:latin typeface="Open Sans Light" pitchFamily="2" charset="0"/>
+                <a:ea typeface="Open Sans Light" pitchFamily="2" charset="0"/>
+                <a:cs typeface="Open Sans Light" pitchFamily="2" charset="0"/>
+              </a:rPr>
+              <a:t>Employed </a:t>
+            </a:r>
+            <a:r>
+              <a:rPr lang="en-GB" sz="4800" b="1" dirty="0">
+                <a:solidFill>
+                  <a:schemeClr val="bg1"/>
+                </a:solidFill>
+                <a:latin typeface="Open Sans Light" pitchFamily="2" charset="0"/>
+                <a:ea typeface="Open Sans Light" pitchFamily="2" charset="0"/>
+                <a:cs typeface="Open Sans Light" pitchFamily="2" charset="0"/>
+              </a:rPr>
+              <a:t>data augmentation </a:t>
+            </a:r>
+            <a:r>
+              <a:rPr lang="en-GB" sz="4800" dirty="0">
+                <a:solidFill>
+                  <a:schemeClr val="bg1"/>
+                </a:solidFill>
+                <a:latin typeface="Open Sans Light" pitchFamily="2" charset="0"/>
+                <a:ea typeface="Open Sans Light" pitchFamily="2" charset="0"/>
+                <a:cs typeface="Open Sans Light" pitchFamily="2" charset="0"/>
+              </a:rPr>
+              <a:t>to bolster the training data:</a:t>
+            </a:r>
+          </a:p>
+          <a:p>
+            <a:pPr marL="1600200" lvl="2" indent="-685800">
+              <a:spcBef>
+                <a:spcPts val="1800"/>
+              </a:spcBef>
+              <a:buFont typeface="Arial" panose="020B0604020202020204" pitchFamily="34" charset="0"/>
+              <a:buChar char="•"/>
+            </a:pPr>
+            <a:r>
+              <a:rPr lang="en-GB" sz="4800" dirty="0">
+                <a:solidFill>
+                  <a:schemeClr val="bg1"/>
+                </a:solidFill>
+                <a:latin typeface="Open Sans Light" pitchFamily="2" charset="0"/>
+                <a:ea typeface="Open Sans Light" pitchFamily="2" charset="0"/>
+                <a:cs typeface="Open Sans Light" pitchFamily="2" charset="0"/>
+              </a:rPr>
+              <a:t>Synonym replacements &amp; insertions</a:t>
+            </a:r>
+          </a:p>
+          <a:p>
+            <a:pPr marL="1600200" lvl="2" indent="-685800">
+              <a:spcBef>
+                <a:spcPts val="1800"/>
+              </a:spcBef>
+              <a:buFont typeface="Arial" panose="020B0604020202020204" pitchFamily="34" charset="0"/>
+              <a:buChar char="•"/>
+            </a:pPr>
+            <a:r>
+              <a:rPr lang="en-GB" sz="4800" dirty="0">
+                <a:solidFill>
+                  <a:schemeClr val="bg1"/>
+                </a:solidFill>
+                <a:latin typeface="Open Sans Light" pitchFamily="2" charset="0"/>
+                <a:ea typeface="Open Sans Light" pitchFamily="2" charset="0"/>
+                <a:cs typeface="Open Sans Light" pitchFamily="2" charset="0"/>
+              </a:rPr>
+              <a:t>Word deletions &amp; swaps</a:t>
+            </a:r>
+          </a:p>
+          <a:p>
+            <a:pPr marL="1143000" lvl="1" indent="-685800">
+              <a:spcBef>
+                <a:spcPts val="1800"/>
+              </a:spcBef>
+              <a:buFont typeface="Arial" panose="020B0604020202020204" pitchFamily="34" charset="0"/>
+              <a:buChar char="•"/>
+            </a:pPr>
+            <a:r>
+              <a:rPr lang="en-GB" sz="4800" dirty="0">
+                <a:solidFill>
+                  <a:schemeClr val="bg1"/>
+                </a:solidFill>
+                <a:latin typeface="Open Sans Light" pitchFamily="2" charset="0"/>
+                <a:ea typeface="Open Sans Light" pitchFamily="2" charset="0"/>
+                <a:cs typeface="Open Sans Light" pitchFamily="2" charset="0"/>
+              </a:rPr>
+              <a:t>Used early stopping to reduce overfitting</a:t>
+            </a:r>
+          </a:p>
+        </p:txBody>
+      </p:sp>
+      <p:sp>
+        <p:nvSpPr>
+          <p:cNvPr id="11" name="Rectangle: Rounded Corners 10">
+            <a:extLst>
+              <a:ext uri="{FF2B5EF4-FFF2-40B4-BE49-F238E27FC236}">
+                <a16:creationId xmlns:a16="http://schemas.microsoft.com/office/drawing/2014/main" id="{9AA187F5-2A01-19B5-CFB8-999A94CBDBBB}"/>
+              </a:ext>
+            </a:extLst>
+          </p:cNvPr>
+          <p:cNvSpPr/>
+          <p:nvPr/>
+        </p:nvSpPr>
+        <p:spPr>
+          <a:xfrm>
+            <a:off x="757341" y="26132945"/>
+            <a:ext cx="28541558" cy="6199078"/>
           </a:xfrm>
           <a:prstGeom prst="roundRect">
             <a:avLst/>
@@ -3245,9 +3823,141 @@
                 <a:ea typeface="Open Sans SemiBold" pitchFamily="2" charset="0"/>
                 <a:cs typeface="Open Sans SemiBold" pitchFamily="2" charset="0"/>
               </a:rPr>
-              <a:t>Results</a:t>
-            </a:r>
-            <a:endParaRPr lang="en-GB" sz="6600" dirty="0">
+              <a:t>Conclusions</a:t>
+            </a:r>
+          </a:p>
+          <a:p>
+            <a:pPr marL="857250" indent="-857250">
+              <a:buFont typeface="Arial" panose="020B0604020202020204" pitchFamily="34" charset="0"/>
+              <a:buChar char="•"/>
+            </a:pPr>
+            <a:r>
+              <a:rPr lang="en-US" sz="4800" b="1" dirty="0">
+                <a:solidFill>
+                  <a:schemeClr val="bg1"/>
+                </a:solidFill>
+                <a:latin typeface="Open Sans Light" pitchFamily="2" charset="0"/>
+                <a:ea typeface="Open Sans Light" pitchFamily="2" charset="0"/>
+                <a:cs typeface="Open Sans Light" pitchFamily="2" charset="0"/>
+              </a:rPr>
+              <a:t>Pretrained word embeddings </a:t>
+            </a:r>
+            <a:r>
+              <a:rPr lang="en-US" sz="4800" dirty="0">
+                <a:solidFill>
+                  <a:schemeClr val="bg1"/>
+                </a:solidFill>
+                <a:latin typeface="Open Sans Light" pitchFamily="2" charset="0"/>
+                <a:ea typeface="Open Sans Light" pitchFamily="2" charset="0"/>
+                <a:cs typeface="Open Sans Light" pitchFamily="2" charset="0"/>
+              </a:rPr>
+              <a:t>are key to higher performance</a:t>
+            </a:r>
+          </a:p>
+          <a:p>
+            <a:pPr marL="857250" indent="-857250">
+              <a:buFont typeface="Arial" panose="020B0604020202020204" pitchFamily="34" charset="0"/>
+              <a:buChar char="•"/>
+            </a:pPr>
+            <a:r>
+              <a:rPr lang="en-US" sz="4800" b="1" dirty="0">
+                <a:solidFill>
+                  <a:schemeClr val="bg1"/>
+                </a:solidFill>
+                <a:latin typeface="Open Sans Light" pitchFamily="2" charset="0"/>
+                <a:ea typeface="Open Sans Light" pitchFamily="2" charset="0"/>
+                <a:cs typeface="Open Sans Light" pitchFamily="2" charset="0"/>
+              </a:rPr>
+              <a:t>Transformers</a:t>
+            </a:r>
+            <a:r>
+              <a:rPr lang="en-US" sz="4800" dirty="0">
+                <a:solidFill>
+                  <a:schemeClr val="bg1"/>
+                </a:solidFill>
+                <a:latin typeface="Open Sans Light" pitchFamily="2" charset="0"/>
+                <a:ea typeface="Open Sans Light" pitchFamily="2" charset="0"/>
+                <a:cs typeface="Open Sans Light" pitchFamily="2" charset="0"/>
+              </a:rPr>
+              <a:t> achieve a </a:t>
+            </a:r>
+            <a:r>
+              <a:rPr lang="en-US" sz="4800" b="1" dirty="0">
+                <a:solidFill>
+                  <a:schemeClr val="bg1"/>
+                </a:solidFill>
+                <a:latin typeface="Open Sans Light" pitchFamily="2" charset="0"/>
+                <a:ea typeface="Open Sans Light" pitchFamily="2" charset="0"/>
+                <a:cs typeface="Open Sans Light" pitchFamily="2" charset="0"/>
+              </a:rPr>
+              <a:t>higher performance </a:t>
+            </a:r>
+            <a:r>
+              <a:rPr lang="en-US" sz="4800" dirty="0">
+                <a:solidFill>
+                  <a:schemeClr val="bg1"/>
+                </a:solidFill>
+                <a:latin typeface="Open Sans Light" pitchFamily="2" charset="0"/>
+                <a:ea typeface="Open Sans Light" pitchFamily="2" charset="0"/>
+                <a:cs typeface="Open Sans Light" pitchFamily="2" charset="0"/>
+              </a:rPr>
+              <a:t>but also loss, compared with RNNs</a:t>
+            </a:r>
+          </a:p>
+          <a:p>
+            <a:pPr marL="1314450" lvl="1" indent="-857250">
+              <a:buFont typeface="Arial" panose="020B0604020202020204" pitchFamily="34" charset="0"/>
+              <a:buChar char="•"/>
+            </a:pPr>
+            <a:r>
+              <a:rPr lang="en-US" sz="4800" dirty="0">
+                <a:solidFill>
+                  <a:schemeClr val="bg1"/>
+                </a:solidFill>
+                <a:latin typeface="Open Sans Light" pitchFamily="2" charset="0"/>
+                <a:ea typeface="Open Sans Light" pitchFamily="2" charset="0"/>
+                <a:cs typeface="Open Sans Light" pitchFamily="2" charset="0"/>
+              </a:rPr>
+              <a:t>Likely due to low output scores from RNNs</a:t>
+            </a:r>
+          </a:p>
+          <a:p>
+            <a:pPr marL="857250" indent="-857250">
+              <a:buFont typeface="Arial" panose="020B0604020202020204" pitchFamily="34" charset="0"/>
+              <a:buChar char="•"/>
+            </a:pPr>
+            <a:r>
+              <a:rPr lang="en-US" sz="4800" dirty="0">
+                <a:solidFill>
+                  <a:schemeClr val="bg1"/>
+                </a:solidFill>
+                <a:latin typeface="Open Sans Light" pitchFamily="2" charset="0"/>
+                <a:ea typeface="Open Sans Light" pitchFamily="2" charset="0"/>
+                <a:cs typeface="Open Sans Light" pitchFamily="2" charset="0"/>
+              </a:rPr>
+              <a:t>Basic textual augmentations do not significantly improve performance</a:t>
+            </a:r>
+          </a:p>
+          <a:p>
+            <a:pPr marL="857250" indent="-857250">
+              <a:buFont typeface="Arial" panose="020B0604020202020204" pitchFamily="34" charset="0"/>
+              <a:buChar char="•"/>
+            </a:pPr>
+            <a:endParaRPr lang="en-US" sz="4800" dirty="0">
+              <a:solidFill>
+                <a:schemeClr val="bg1"/>
+              </a:solidFill>
+              <a:latin typeface="Open Sans Light" pitchFamily="2" charset="0"/>
+              <a:ea typeface="Open Sans Light" pitchFamily="2" charset="0"/>
+              <a:cs typeface="Open Sans Light" pitchFamily="2" charset="0"/>
+            </a:endParaRPr>
+          </a:p>
+          <a:p>
+            <a:pPr marL="857250" indent="-857250">
+              <a:buFont typeface="Arial" panose="020B0604020202020204" pitchFamily="34" charset="0"/>
+              <a:buChar char="•"/>
+            </a:pPr>
+            <a:endParaRPr lang="en-GB" sz="4800" dirty="0">
               <a:solidFill>
                 <a:schemeClr val="bg1"/>
               </a:solidFill>
@@ -3271,185 +3981,6 @@
       </p:sp>
       <p:sp>
         <p:nvSpPr>
-          <p:cNvPr id="9" name="Rectangle: Rounded Corners 8">
-            <a:extLst>
-              <a:ext uri="{FF2B5EF4-FFF2-40B4-BE49-F238E27FC236}">
-                <a16:creationId xmlns:a16="http://schemas.microsoft.com/office/drawing/2014/main" id="{4E54F0FF-A100-E45E-5146-86EADDE73AF0}"/>
-              </a:ext>
-            </a:extLst>
-          </p:cNvPr>
-          <p:cNvSpPr/>
-          <p:nvPr/>
-        </p:nvSpPr>
-        <p:spPr>
-          <a:xfrm>
-            <a:off x="1158240" y="16908272"/>
-            <a:ext cx="13075920" cy="15435920"/>
-          </a:xfrm>
-          <a:prstGeom prst="roundRect">
-            <a:avLst/>
-          </a:prstGeom>
-          <a:solidFill>
-            <a:srgbClr val="A799B7"/>
-          </a:solidFill>
-          <a:ln>
-            <a:noFill/>
-          </a:ln>
-        </p:spPr>
-        <p:style>
-          <a:lnRef idx="2">
-            <a:schemeClr val="accent1">
-              <a:shade val="15000"/>
-            </a:schemeClr>
-          </a:lnRef>
-          <a:fillRef idx="1">
-            <a:schemeClr val="accent1"/>
-          </a:fillRef>
-          <a:effectRef idx="0">
-            <a:schemeClr val="accent1"/>
-          </a:effectRef>
-          <a:fontRef idx="minor">
-            <a:schemeClr val="lt1"/>
-          </a:fontRef>
-        </p:style>
-        <p:txBody>
-          <a:bodyPr rtlCol="0" anchor="t"/>
-          <a:lstStyle/>
-          <a:p>
-            <a:pPr algn="ctr"/>
-            <a:r>
-              <a:rPr lang="en-US" sz="6600" dirty="0">
-                <a:solidFill>
-                  <a:srgbClr val="FBD206"/>
-                </a:solidFill>
-                <a:latin typeface="Open Sans SemiBold" pitchFamily="2" charset="0"/>
-                <a:ea typeface="Open Sans SemiBold" pitchFamily="2" charset="0"/>
-                <a:cs typeface="Open Sans SemiBold" pitchFamily="2" charset="0"/>
-              </a:rPr>
-              <a:t>Materials &amp; Method</a:t>
-            </a:r>
-          </a:p>
-          <a:p>
-            <a:pPr algn="ctr"/>
-            <a:r>
-              <a:rPr lang="en-US" sz="6600" dirty="0">
-                <a:solidFill>
-                  <a:schemeClr val="bg1"/>
-                </a:solidFill>
-                <a:latin typeface="Open Sans Light" pitchFamily="2" charset="0"/>
-                <a:ea typeface="Open Sans Light" pitchFamily="2" charset="0"/>
-                <a:cs typeface="Open Sans Light" pitchFamily="2" charset="0"/>
-              </a:rPr>
-              <a:t>input</a:t>
-            </a:r>
-            <a:endParaRPr lang="en-GB" sz="6600" dirty="0">
-              <a:solidFill>
-                <a:schemeClr val="bg1"/>
-              </a:solidFill>
-              <a:latin typeface="Open Sans Light" pitchFamily="2" charset="0"/>
-              <a:ea typeface="Open Sans Light" pitchFamily="2" charset="0"/>
-              <a:cs typeface="Open Sans Light" pitchFamily="2" charset="0"/>
-            </a:endParaRPr>
-          </a:p>
-        </p:txBody>
-      </p:sp>
-      <p:sp>
-        <p:nvSpPr>
-          <p:cNvPr id="11" name="Rectangle: Rounded Corners 10">
-            <a:extLst>
-              <a:ext uri="{FF2B5EF4-FFF2-40B4-BE49-F238E27FC236}">
-                <a16:creationId xmlns:a16="http://schemas.microsoft.com/office/drawing/2014/main" id="{9AA187F5-2A01-19B5-CFB8-999A94CBDBBB}"/>
-              </a:ext>
-            </a:extLst>
-          </p:cNvPr>
-          <p:cNvSpPr/>
-          <p:nvPr/>
-        </p:nvSpPr>
-        <p:spPr>
-          <a:xfrm>
-            <a:off x="15407640" y="26145114"/>
-            <a:ext cx="13075920" cy="6199078"/>
-          </a:xfrm>
-          <a:prstGeom prst="roundRect">
-            <a:avLst/>
-          </a:prstGeom>
-          <a:solidFill>
-            <a:srgbClr val="A799B7"/>
-          </a:solidFill>
-          <a:ln>
-            <a:noFill/>
-          </a:ln>
-        </p:spPr>
-        <p:style>
-          <a:lnRef idx="2">
-            <a:schemeClr val="accent1">
-              <a:shade val="15000"/>
-            </a:schemeClr>
-          </a:lnRef>
-          <a:fillRef idx="1">
-            <a:schemeClr val="accent1"/>
-          </a:fillRef>
-          <a:effectRef idx="0">
-            <a:schemeClr val="accent1"/>
-          </a:effectRef>
-          <a:fontRef idx="minor">
-            <a:schemeClr val="lt1"/>
-          </a:fontRef>
-        </p:style>
-        <p:txBody>
-          <a:bodyPr rtlCol="0" anchor="t"/>
-          <a:lstStyle/>
-          <a:p>
-            <a:pPr algn="ctr"/>
-            <a:r>
-              <a:rPr lang="en-US" sz="6600" dirty="0">
-                <a:solidFill>
-                  <a:srgbClr val="FBD206"/>
-                </a:solidFill>
-                <a:latin typeface="Open Sans SemiBold" pitchFamily="2" charset="0"/>
-                <a:ea typeface="Open Sans SemiBold" pitchFamily="2" charset="0"/>
-                <a:cs typeface="Open Sans SemiBold" pitchFamily="2" charset="0"/>
-              </a:rPr>
-              <a:t>Conclusions</a:t>
-            </a:r>
-          </a:p>
-          <a:p>
-            <a:pPr algn="ctr"/>
-            <a:r>
-              <a:rPr lang="en-US" sz="6600" dirty="0">
-                <a:solidFill>
-                  <a:schemeClr val="bg1"/>
-                </a:solidFill>
-                <a:latin typeface="Open Sans Light" pitchFamily="2" charset="0"/>
-                <a:ea typeface="Open Sans Light" pitchFamily="2" charset="0"/>
-                <a:cs typeface="Open Sans Light" pitchFamily="2" charset="0"/>
-              </a:rPr>
-              <a:t>input</a:t>
-            </a:r>
-            <a:endParaRPr lang="en-GB" sz="6600" dirty="0">
-              <a:solidFill>
-                <a:schemeClr val="bg1"/>
-              </a:solidFill>
-              <a:latin typeface="Open Sans Light" pitchFamily="2" charset="0"/>
-              <a:ea typeface="Open Sans Light" pitchFamily="2" charset="0"/>
-              <a:cs typeface="Open Sans Light" pitchFamily="2" charset="0"/>
-            </a:endParaRPr>
-          </a:p>
-          <a:p>
-            <a:pPr algn="ctr"/>
-            <a:endParaRPr lang="en-GB" sz="6600" dirty="0">
-              <a:solidFill>
-                <a:srgbClr val="FBD206"/>
-              </a:solidFill>
-              <a:latin typeface="Open Sans Light" pitchFamily="2" charset="0"/>
-              <a:ea typeface="Open Sans Light" pitchFamily="2" charset="0"/>
-              <a:cs typeface="Open Sans Light" pitchFamily="2" charset="0"/>
-            </a:endParaRPr>
-          </a:p>
-        </p:txBody>
-      </p:sp>
-      <p:sp>
-        <p:nvSpPr>
           <p:cNvPr id="12" name="Rectangle: Rounded Corners 11">
             <a:extLst>
               <a:ext uri="{FF2B5EF4-FFF2-40B4-BE49-F238E27FC236}">
@@ -3462,11 +3993,13 @@
         </p:nvSpPr>
         <p:spPr>
           <a:xfrm>
-            <a:off x="29657040" y="26145114"/>
-            <a:ext cx="13075920" cy="6199078"/>
+            <a:off x="29879099" y="26104867"/>
+            <a:ext cx="13311060" cy="6199078"/>
           </a:xfrm>
           <a:prstGeom prst="roundRect">
-            <a:avLst/>
+            <a:avLst>
+              <a:gd name="adj" fmla="val 11303"/>
+            </a:avLst>
           </a:prstGeom>
           <a:solidFill>
             <a:srgbClr val="A799B7"/>
@@ -3602,11 +4135,13 @@
         </p:nvSpPr>
         <p:spPr>
           <a:xfrm>
-            <a:off x="15407640" y="3801873"/>
-            <a:ext cx="27325320" cy="12657328"/>
+            <a:off x="15407639" y="3789703"/>
+            <a:ext cx="27782521" cy="12657328"/>
           </a:xfrm>
           <a:prstGeom prst="roundRect">
-            <a:avLst/>
+            <a:avLst>
+              <a:gd name="adj" fmla="val 10428"/>
+            </a:avLst>
           </a:prstGeom>
           <a:solidFill>
             <a:srgbClr val="A799B7"/>
@@ -3698,14 +4233,14 @@
           <p:nvPr>
             <p:extLst>
               <p:ext uri="{D42A27DB-BD31-4B8C-83A1-F6EECF244321}">
-                <p14:modId xmlns:p14="http://schemas.microsoft.com/office/powerpoint/2010/main" val="2319068758"/>
+                <p14:modId xmlns:p14="http://schemas.microsoft.com/office/powerpoint/2010/main" val="1295222006"/>
               </p:ext>
             </p:extLst>
           </p:nvPr>
         </p:nvGraphicFramePr>
         <p:xfrm>
-          <a:off x="15407640" y="18448952"/>
-          <a:ext cx="27325324" cy="6177280"/>
+          <a:off x="15407640" y="18448951"/>
+          <a:ext cx="27782521" cy="6103068"/>
         </p:xfrm>
         <a:graphic>
           <a:graphicData uri="http://schemas.openxmlformats.org/drawingml/2006/table">
@@ -3714,91 +4249,91 @@
                 <a:tableStyleId>{5940675A-B579-460E-94D1-54222C63F5DA}</a:tableStyleId>
               </a:tblPr>
               <a:tblGrid>
-                <a:gridCol w="2101948">
+                <a:gridCol w="2137117">
                   <a:extLst>
                     <a:ext uri="{9D8B030D-6E8A-4147-A177-3AD203B41FA5}">
                       <a16:colId xmlns:a16="http://schemas.microsoft.com/office/drawing/2014/main" val="2074238800"/>
                     </a:ext>
                   </a:extLst>
                 </a:gridCol>
-                <a:gridCol w="2101948">
+                <a:gridCol w="2137117">
                   <a:extLst>
                     <a:ext uri="{9D8B030D-6E8A-4147-A177-3AD203B41FA5}">
                       <a16:colId xmlns:a16="http://schemas.microsoft.com/office/drawing/2014/main" val="2240268206"/>
                     </a:ext>
                   </a:extLst>
                 </a:gridCol>
-                <a:gridCol w="2101948">
+                <a:gridCol w="2137117">
                   <a:extLst>
                     <a:ext uri="{9D8B030D-6E8A-4147-A177-3AD203B41FA5}">
                       <a16:colId xmlns:a16="http://schemas.microsoft.com/office/drawing/2014/main" val="3305914191"/>
                     </a:ext>
                   </a:extLst>
                 </a:gridCol>
-                <a:gridCol w="2101948">
+                <a:gridCol w="2137117">
                   <a:extLst>
                     <a:ext uri="{9D8B030D-6E8A-4147-A177-3AD203B41FA5}">
                       <a16:colId xmlns:a16="http://schemas.microsoft.com/office/drawing/2014/main" val="3391066115"/>
                     </a:ext>
                   </a:extLst>
                 </a:gridCol>
-                <a:gridCol w="2101948">
+                <a:gridCol w="2137117">
                   <a:extLst>
                     <a:ext uri="{9D8B030D-6E8A-4147-A177-3AD203B41FA5}">
                       <a16:colId xmlns:a16="http://schemas.microsoft.com/office/drawing/2014/main" val="4079886862"/>
                     </a:ext>
                   </a:extLst>
                 </a:gridCol>
-                <a:gridCol w="2101948">
+                <a:gridCol w="2137117">
                   <a:extLst>
                     <a:ext uri="{9D8B030D-6E8A-4147-A177-3AD203B41FA5}">
                       <a16:colId xmlns:a16="http://schemas.microsoft.com/office/drawing/2014/main" val="1603675036"/>
                     </a:ext>
                   </a:extLst>
                 </a:gridCol>
-                <a:gridCol w="2101948">
+                <a:gridCol w="2137117">
                   <a:extLst>
                     <a:ext uri="{9D8B030D-6E8A-4147-A177-3AD203B41FA5}">
                       <a16:colId xmlns:a16="http://schemas.microsoft.com/office/drawing/2014/main" val="1095657681"/>
                     </a:ext>
                   </a:extLst>
                 </a:gridCol>
-                <a:gridCol w="2101948">
+                <a:gridCol w="2137117">
                   <a:extLst>
                     <a:ext uri="{9D8B030D-6E8A-4147-A177-3AD203B41FA5}">
                       <a16:colId xmlns:a16="http://schemas.microsoft.com/office/drawing/2014/main" val="2061514745"/>
                     </a:ext>
                   </a:extLst>
                 </a:gridCol>
-                <a:gridCol w="2101948">
+                <a:gridCol w="2137117">
                   <a:extLst>
                     <a:ext uri="{9D8B030D-6E8A-4147-A177-3AD203B41FA5}">
                       <a16:colId xmlns:a16="http://schemas.microsoft.com/office/drawing/2014/main" val="4013144454"/>
                     </a:ext>
                   </a:extLst>
                 </a:gridCol>
-                <a:gridCol w="2101948">
+                <a:gridCol w="2137117">
                   <a:extLst>
                     <a:ext uri="{9D8B030D-6E8A-4147-A177-3AD203B41FA5}">
                       <a16:colId xmlns:a16="http://schemas.microsoft.com/office/drawing/2014/main" val="3579964545"/>
                     </a:ext>
                   </a:extLst>
                 </a:gridCol>
-                <a:gridCol w="2101948">
+                <a:gridCol w="2137117">
                   <a:extLst>
                     <a:ext uri="{9D8B030D-6E8A-4147-A177-3AD203B41FA5}">
                       <a16:colId xmlns:a16="http://schemas.microsoft.com/office/drawing/2014/main" val="3448529985"/>
                     </a:ext>
                   </a:extLst>
                 </a:gridCol>
-                <a:gridCol w="2101948">
+                <a:gridCol w="2137117">
                   <a:extLst>
                     <a:ext uri="{9D8B030D-6E8A-4147-A177-3AD203B41FA5}">
                       <a16:colId xmlns:a16="http://schemas.microsoft.com/office/drawing/2014/main" val="2131172517"/>
                     </a:ext>
                   </a:extLst>
                 </a:gridCol>
-                <a:gridCol w="2101948">
+                <a:gridCol w="2137117">
                   <a:extLst>
                     <a:ext uri="{9D8B030D-6E8A-4147-A177-3AD203B41FA5}">
                       <a16:colId xmlns:a16="http://schemas.microsoft.com/office/drawing/2014/main" val="1762411193"/>
@@ -3806,7 +4341,7 @@
                   </a:extLst>
                 </a:gridCol>
               </a:tblGrid>
-              <a:tr h="1544320">
+              <a:tr h="2297050">
                 <a:tc>
                   <a:txBody>
                     <a:bodyPr/>
@@ -3814,7 +4349,7 @@
                     <a:p>
                       <a:pPr algn="ctr"/>
                       <a:r>
-                        <a:rPr lang="en-US" sz="3200" b="0" dirty="0">
+                        <a:rPr lang="en-US" sz="4000" b="0" dirty="0">
                           <a:solidFill>
                             <a:srgbClr val="FBD206"/>
                           </a:solidFill>
@@ -3822,9 +4357,9 @@
                           <a:ea typeface="Open Sans SemiBold" pitchFamily="2" charset="0"/>
                           <a:cs typeface="Open Sans SemiBold" pitchFamily="2" charset="0"/>
                         </a:rPr>
-                        <a:t>Task</a:t>
+                        <a:t>Method</a:t>
                       </a:r>
-                      <a:endParaRPr lang="en-GB" sz="3200" b="0" dirty="0">
+                      <a:endParaRPr lang="en-GB" sz="4000" b="0" dirty="0">
                         <a:solidFill>
                           <a:srgbClr val="FBD206"/>
                         </a:solidFill>
@@ -3843,7 +4378,7 @@
                     <a:p>
                       <a:pPr algn="ctr" fontAlgn="b"/>
                       <a:r>
-                        <a:rPr lang="en-GB" sz="3200" b="0" i="0" u="none" strike="noStrike" dirty="0">
+                        <a:rPr lang="en-GB" sz="4000" b="0" i="0" u="none" strike="noStrike" dirty="0">
                           <a:solidFill>
                             <a:srgbClr val="FBD206"/>
                           </a:solidFill>
@@ -3865,7 +4400,7 @@
                     <a:p>
                       <a:pPr algn="ctr" fontAlgn="b"/>
                       <a:r>
-                        <a:rPr lang="en-GB" sz="3200" b="0" i="0" u="none" strike="noStrike">
+                        <a:rPr lang="en-GB" sz="4000" b="0" i="0" u="none" strike="noStrike" dirty="0">
                           <a:solidFill>
                             <a:srgbClr val="FBD206"/>
                           </a:solidFill>
@@ -3887,7 +4422,7 @@
                     <a:p>
                       <a:pPr algn="ctr" fontAlgn="b"/>
                       <a:r>
-                        <a:rPr lang="en-GB" sz="3200" b="0" i="0" u="none" strike="noStrike">
+                        <a:rPr lang="en-GB" sz="4000" b="0" i="0" u="none" strike="noStrike">
                           <a:solidFill>
                             <a:srgbClr val="FBD206"/>
                           </a:solidFill>
@@ -3909,7 +4444,7 @@
                     <a:p>
                       <a:pPr algn="ctr" fontAlgn="b"/>
                       <a:r>
-                        <a:rPr lang="en-GB" sz="3200" b="0" i="0" u="none" strike="noStrike">
+                        <a:rPr lang="en-GB" sz="4000" b="0" i="0" u="none" strike="noStrike" dirty="0">
                           <a:solidFill>
                             <a:srgbClr val="FBD206"/>
                           </a:solidFill>
@@ -3931,7 +4466,7 @@
                     <a:p>
                       <a:pPr algn="ctr" fontAlgn="b"/>
                       <a:r>
-                        <a:rPr lang="en-GB" sz="3200" b="0" i="0" u="none" strike="noStrike">
+                        <a:rPr lang="en-GB" sz="4000" b="0" i="0" u="none" strike="noStrike">
                           <a:solidFill>
                             <a:srgbClr val="FBD206"/>
                           </a:solidFill>
@@ -3953,7 +4488,7 @@
                     <a:p>
                       <a:pPr algn="ctr" fontAlgn="b"/>
                       <a:r>
-                        <a:rPr lang="en-GB" sz="3200" b="0" i="0" u="none" strike="noStrike">
+                        <a:rPr lang="en-GB" sz="4000" b="0" i="0" u="none" strike="noStrike">
                           <a:solidFill>
                             <a:srgbClr val="FBD206"/>
                           </a:solidFill>
@@ -3975,7 +4510,7 @@
                     <a:p>
                       <a:pPr algn="ctr" fontAlgn="b"/>
                       <a:r>
-                        <a:rPr lang="en-GB" sz="3200" b="0" i="0" u="none" strike="noStrike">
+                        <a:rPr lang="en-GB" sz="4000" b="0" i="0" u="none" strike="noStrike">
                           <a:solidFill>
                             <a:srgbClr val="FBD206"/>
                           </a:solidFill>
@@ -3997,7 +4532,7 @@
                     <a:p>
                       <a:pPr algn="ctr" fontAlgn="b"/>
                       <a:r>
-                        <a:rPr lang="en-GB" sz="3200" b="0" i="0" u="none" strike="noStrike">
+                        <a:rPr lang="en-GB" sz="4000" b="0" i="0" u="none" strike="noStrike">
                           <a:solidFill>
                             <a:srgbClr val="FBD206"/>
                           </a:solidFill>
@@ -4019,7 +4554,7 @@
                     <a:p>
                       <a:pPr algn="ctr" fontAlgn="b"/>
                       <a:r>
-                        <a:rPr lang="en-GB" sz="3200" b="0" i="0" u="none" strike="noStrike">
+                        <a:rPr lang="en-GB" sz="4000" b="0" i="0" u="none" strike="noStrike">
                           <a:solidFill>
                             <a:srgbClr val="FBD206"/>
                           </a:solidFill>
@@ -4041,7 +4576,7 @@
                     <a:p>
                       <a:pPr algn="ctr" fontAlgn="b"/>
                       <a:r>
-                        <a:rPr lang="en-GB" sz="3200" b="0" i="0" u="none" strike="noStrike">
+                        <a:rPr lang="en-GB" sz="4000" b="0" i="0" u="none" strike="noStrike">
                           <a:solidFill>
                             <a:srgbClr val="FBD206"/>
                           </a:solidFill>
@@ -4063,7 +4598,7 @@
                     <a:p>
                       <a:pPr algn="ctr" fontAlgn="b"/>
                       <a:r>
-                        <a:rPr lang="en-GB" sz="3200" b="0" i="0" u="none" strike="noStrike">
+                        <a:rPr lang="en-GB" sz="4000" b="0" i="0" u="none" strike="noStrike">
                           <a:solidFill>
                             <a:srgbClr val="FBD206"/>
                           </a:solidFill>
@@ -4085,7 +4620,7 @@
                     <a:p>
                       <a:pPr algn="ctr" fontAlgn="b"/>
                       <a:r>
-                        <a:rPr lang="en-GB" sz="3200" b="0" i="0" u="none" strike="noStrike" dirty="0">
+                        <a:rPr lang="en-GB" sz="4000" b="0" i="0" u="none" strike="noStrike" dirty="0">
                           <a:solidFill>
                             <a:srgbClr val="FBD206"/>
                           </a:solidFill>
@@ -4106,7 +4641,7 @@
                   </a:ext>
                 </a:extLst>
               </a:tr>
-              <a:tr h="1544320">
+              <a:tr h="1828524">
                 <a:tc>
                   <a:txBody>
                     <a:bodyPr/>
@@ -4114,7 +4649,7 @@
                     <a:p>
                       <a:pPr algn="ctr"/>
                       <a:r>
-                        <a:rPr lang="en-US" sz="3200" dirty="0">
+                        <a:rPr lang="en-US" sz="4000" dirty="0">
                           <a:solidFill>
                             <a:schemeClr val="bg1"/>
                           </a:solidFill>
@@ -4122,9 +4657,9 @@
                           <a:ea typeface="Open Sans Light" pitchFamily="2" charset="0"/>
                           <a:cs typeface="Open Sans Light" pitchFamily="2" charset="0"/>
                         </a:rPr>
-                        <a:t>A</a:t>
+                        <a:t>B</a:t>
                       </a:r>
-                      <a:endParaRPr lang="en-GB" sz="3200" dirty="0">
+                      <a:endParaRPr lang="en-GB" sz="4000" dirty="0">
                         <a:solidFill>
                           <a:schemeClr val="bg1"/>
                         </a:solidFill>
@@ -4141,212 +4676,272 @@
                     <a:bodyPr/>
                     <a:lstStyle/>
                     <a:p>
-                      <a:pPr algn="r" fontAlgn="b"/>
-                      <a:endParaRPr lang="en-GB" sz="600" b="0" i="0" u="none" strike="noStrike" dirty="0">
-                        <a:solidFill>
-                          <a:srgbClr val="000000"/>
-                        </a:solidFill>
-                        <a:effectLst/>
-                        <a:latin typeface="Calibri" panose="020F0502020204030204" pitchFamily="34" charset="0"/>
-                      </a:endParaRPr>
+                      <a:pPr algn="ctr" fontAlgn="b"/>
+                      <a:r>
+                        <a:rPr lang="en-GB" sz="4000" b="0" i="0" u="none" strike="noStrike" dirty="0">
+                          <a:solidFill>
+                            <a:schemeClr val="bg1"/>
+                          </a:solidFill>
+                          <a:effectLst/>
+                          <a:latin typeface="Open Sans Light" pitchFamily="2" charset="0"/>
+                          <a:ea typeface="Open Sans Light" pitchFamily="2" charset="0"/>
+                          <a:cs typeface="Open Sans Light" pitchFamily="2" charset="0"/>
+                        </a:rPr>
+                        <a:t>0.723</a:t>
+                      </a:r>
                     </a:p>
                   </a:txBody>
-                  <a:tcPr marL="7620" marR="7620" marT="7620" marB="0" anchor="b"/>
+                  <a:tcPr marL="9525" marR="9525" marT="9525" marB="0" anchor="ctr"/>
                 </a:tc>
                 <a:tc>
                   <a:txBody>
                     <a:bodyPr/>
                     <a:lstStyle/>
                     <a:p>
-                      <a:pPr algn="r" fontAlgn="b"/>
-                      <a:endParaRPr lang="en-GB" sz="600" b="0" i="0" u="none" strike="noStrike">
-                        <a:solidFill>
-                          <a:srgbClr val="000000"/>
-                        </a:solidFill>
-                        <a:effectLst/>
-                        <a:latin typeface="Calibri" panose="020F0502020204030204" pitchFamily="34" charset="0"/>
-                      </a:endParaRPr>
+                      <a:pPr algn="ctr" fontAlgn="b"/>
+                      <a:r>
+                        <a:rPr lang="en-GB" sz="4000" b="0" i="0" u="none" strike="noStrike" dirty="0">
+                          <a:solidFill>
+                            <a:schemeClr val="bg1"/>
+                          </a:solidFill>
+                          <a:effectLst/>
+                          <a:latin typeface="Open Sans Light" pitchFamily="2" charset="0"/>
+                          <a:ea typeface="Open Sans Light" pitchFamily="2" charset="0"/>
+                          <a:cs typeface="Open Sans Light" pitchFamily="2" charset="0"/>
+                        </a:rPr>
+                        <a:t>0.718</a:t>
+                      </a:r>
                     </a:p>
                   </a:txBody>
-                  <a:tcPr marL="7620" marR="7620" marT="7620" marB="0" anchor="b"/>
+                  <a:tcPr marL="9525" marR="9525" marT="9525" marB="0" anchor="ctr"/>
                 </a:tc>
                 <a:tc>
                   <a:txBody>
                     <a:bodyPr/>
                     <a:lstStyle/>
                     <a:p>
-                      <a:pPr algn="r" fontAlgn="b"/>
-                      <a:endParaRPr lang="en-GB" sz="600" b="0" i="0" u="none" strike="noStrike">
-                        <a:solidFill>
-                          <a:srgbClr val="000000"/>
-                        </a:solidFill>
-                        <a:effectLst/>
-                        <a:latin typeface="Calibri" panose="020F0502020204030204" pitchFamily="34" charset="0"/>
-                      </a:endParaRPr>
+                      <a:pPr algn="ctr" fontAlgn="b"/>
+                      <a:r>
+                        <a:rPr lang="en-GB" sz="4000" b="0" i="0" u="none" strike="noStrike" dirty="0">
+                          <a:solidFill>
+                            <a:schemeClr val="bg1"/>
+                          </a:solidFill>
+                          <a:effectLst/>
+                          <a:latin typeface="Open Sans Light" pitchFamily="2" charset="0"/>
+                          <a:ea typeface="Open Sans Light" pitchFamily="2" charset="0"/>
+                          <a:cs typeface="Open Sans Light" pitchFamily="2" charset="0"/>
+                        </a:rPr>
+                        <a:t>0.724</a:t>
+                      </a:r>
                     </a:p>
                   </a:txBody>
-                  <a:tcPr marL="7620" marR="7620" marT="7620" marB="0" anchor="b"/>
+                  <a:tcPr marL="9525" marR="9525" marT="9525" marB="0" anchor="ctr"/>
                 </a:tc>
                 <a:tc>
                   <a:txBody>
                     <a:bodyPr/>
                     <a:lstStyle/>
                     <a:p>
-                      <a:pPr algn="r" fontAlgn="b"/>
-                      <a:endParaRPr lang="en-GB" sz="600" b="0" i="0" u="none" strike="noStrike">
-                        <a:solidFill>
-                          <a:srgbClr val="000000"/>
-                        </a:solidFill>
-                        <a:effectLst/>
-                        <a:latin typeface="Calibri" panose="020F0502020204030204" pitchFamily="34" charset="0"/>
-                      </a:endParaRPr>
+                      <a:pPr algn="ctr" fontAlgn="b"/>
+                      <a:r>
+                        <a:rPr lang="en-GB" sz="4000" b="0" i="0" u="none" strike="noStrike" dirty="0">
+                          <a:solidFill>
+                            <a:schemeClr val="bg1"/>
+                          </a:solidFill>
+                          <a:effectLst/>
+                          <a:latin typeface="Open Sans Light" pitchFamily="2" charset="0"/>
+                          <a:ea typeface="Open Sans Light" pitchFamily="2" charset="0"/>
+                          <a:cs typeface="Open Sans Light" pitchFamily="2" charset="0"/>
+                        </a:rPr>
+                        <a:t>0.724</a:t>
+                      </a:r>
                     </a:p>
                   </a:txBody>
-                  <a:tcPr marL="7620" marR="7620" marT="7620" marB="0" anchor="b"/>
+                  <a:tcPr marL="9525" marR="9525" marT="9525" marB="0" anchor="ctr"/>
                 </a:tc>
                 <a:tc>
                   <a:txBody>
                     <a:bodyPr/>
                     <a:lstStyle/>
                     <a:p>
-                      <a:pPr algn="r" fontAlgn="b"/>
-                      <a:endParaRPr lang="en-GB" sz="600" b="0" i="0" u="none" strike="noStrike">
-                        <a:solidFill>
-                          <a:srgbClr val="000000"/>
-                        </a:solidFill>
-                        <a:effectLst/>
-                        <a:latin typeface="Calibri" panose="020F0502020204030204" pitchFamily="34" charset="0"/>
-                      </a:endParaRPr>
+                      <a:pPr algn="ctr" fontAlgn="b"/>
+                      <a:r>
+                        <a:rPr lang="en-GB" sz="4000" b="0" i="0" u="none" strike="noStrike" dirty="0">
+                          <a:solidFill>
+                            <a:schemeClr val="bg1"/>
+                          </a:solidFill>
+                          <a:effectLst/>
+                          <a:latin typeface="Open Sans Light" pitchFamily="2" charset="0"/>
+                          <a:ea typeface="Open Sans Light" pitchFamily="2" charset="0"/>
+                          <a:cs typeface="Open Sans Light" pitchFamily="2" charset="0"/>
+                        </a:rPr>
+                        <a:t>0.765</a:t>
+                      </a:r>
                     </a:p>
                   </a:txBody>
-                  <a:tcPr marL="7620" marR="7620" marT="7620" marB="0" anchor="b"/>
+                  <a:tcPr marL="9525" marR="9525" marT="9525" marB="0" anchor="ctr"/>
                 </a:tc>
                 <a:tc>
                   <a:txBody>
                     <a:bodyPr/>
                     <a:lstStyle/>
                     <a:p>
-                      <a:pPr algn="r" fontAlgn="b"/>
-                      <a:endParaRPr lang="en-GB" sz="600" b="0" i="0" u="none" strike="noStrike">
-                        <a:solidFill>
-                          <a:srgbClr val="000000"/>
-                        </a:solidFill>
-                        <a:effectLst/>
-                        <a:latin typeface="Calibri" panose="020F0502020204030204" pitchFamily="34" charset="0"/>
-                      </a:endParaRPr>
+                      <a:pPr algn="ctr" fontAlgn="b"/>
+                      <a:r>
+                        <a:rPr lang="en-GB" sz="4000" b="0" i="0" u="none" strike="noStrike" dirty="0">
+                          <a:solidFill>
+                            <a:schemeClr val="bg1"/>
+                          </a:solidFill>
+                          <a:effectLst/>
+                          <a:latin typeface="Open Sans Light" pitchFamily="2" charset="0"/>
+                          <a:ea typeface="Open Sans Light" pitchFamily="2" charset="0"/>
+                          <a:cs typeface="Open Sans Light" pitchFamily="2" charset="0"/>
+                        </a:rPr>
+                        <a:t>0.722</a:t>
+                      </a:r>
                     </a:p>
                   </a:txBody>
-                  <a:tcPr marL="7620" marR="7620" marT="7620" marB="0" anchor="b"/>
+                  <a:tcPr marL="9525" marR="9525" marT="9525" marB="0" anchor="ctr"/>
                 </a:tc>
                 <a:tc>
                   <a:txBody>
                     <a:bodyPr/>
                     <a:lstStyle/>
                     <a:p>
-                      <a:pPr algn="r" fontAlgn="b"/>
-                      <a:endParaRPr lang="en-GB" sz="600" b="0" i="0" u="none" strike="noStrike">
-                        <a:solidFill>
-                          <a:srgbClr val="000000"/>
-                        </a:solidFill>
-                        <a:effectLst/>
-                        <a:latin typeface="Calibri" panose="020F0502020204030204" pitchFamily="34" charset="0"/>
-                      </a:endParaRPr>
+                      <a:pPr algn="ctr" fontAlgn="b"/>
+                      <a:r>
+                        <a:rPr lang="en-GB" sz="4000" b="0" i="0" u="none" strike="noStrike" dirty="0">
+                          <a:solidFill>
+                            <a:schemeClr val="bg1"/>
+                          </a:solidFill>
+                          <a:effectLst/>
+                          <a:latin typeface="Open Sans Light" pitchFamily="2" charset="0"/>
+                          <a:ea typeface="Open Sans Light" pitchFamily="2" charset="0"/>
+                          <a:cs typeface="Open Sans Light" pitchFamily="2" charset="0"/>
+                        </a:rPr>
+                        <a:t>0.723</a:t>
+                      </a:r>
                     </a:p>
                   </a:txBody>
-                  <a:tcPr marL="7620" marR="7620" marT="7620" marB="0" anchor="b"/>
+                  <a:tcPr marL="9525" marR="9525" marT="9525" marB="0" anchor="ctr"/>
                 </a:tc>
                 <a:tc>
                   <a:txBody>
                     <a:bodyPr/>
                     <a:lstStyle/>
                     <a:p>
-                      <a:pPr algn="r" fontAlgn="b"/>
-                      <a:endParaRPr lang="en-GB" sz="600" b="0" i="0" u="none" strike="noStrike">
-                        <a:solidFill>
-                          <a:srgbClr val="000000"/>
-                        </a:solidFill>
-                        <a:effectLst/>
-                        <a:latin typeface="Calibri" panose="020F0502020204030204" pitchFamily="34" charset="0"/>
-                      </a:endParaRPr>
+                      <a:pPr algn="ctr" fontAlgn="b"/>
+                      <a:r>
+                        <a:rPr lang="en-GB" sz="4000" b="0" i="0" u="none" strike="noStrike" dirty="0">
+                          <a:solidFill>
+                            <a:schemeClr val="bg1"/>
+                          </a:solidFill>
+                          <a:effectLst/>
+                          <a:latin typeface="Open Sans Light" pitchFamily="2" charset="0"/>
+                          <a:ea typeface="Open Sans Light" pitchFamily="2" charset="0"/>
+                          <a:cs typeface="Open Sans Light" pitchFamily="2" charset="0"/>
+                        </a:rPr>
+                        <a:t>0.741</a:t>
+                      </a:r>
                     </a:p>
                   </a:txBody>
-                  <a:tcPr marL="7620" marR="7620" marT="7620" marB="0" anchor="b"/>
+                  <a:tcPr marL="9525" marR="9525" marT="9525" marB="0" anchor="ctr"/>
                 </a:tc>
                 <a:tc>
                   <a:txBody>
                     <a:bodyPr/>
                     <a:lstStyle/>
                     <a:p>
-                      <a:pPr algn="r" fontAlgn="b"/>
-                      <a:endParaRPr lang="en-GB" sz="600" b="0" i="0" u="none" strike="noStrike">
-                        <a:solidFill>
-                          <a:srgbClr val="000000"/>
-                        </a:solidFill>
-                        <a:effectLst/>
-                        <a:latin typeface="Calibri" panose="020F0502020204030204" pitchFamily="34" charset="0"/>
-                      </a:endParaRPr>
+                      <a:pPr algn="ctr" fontAlgn="b"/>
+                      <a:r>
+                        <a:rPr lang="en-GB" sz="4000" b="0" i="0" u="none" strike="noStrike" dirty="0">
+                          <a:solidFill>
+                            <a:schemeClr val="bg1"/>
+                          </a:solidFill>
+                          <a:effectLst/>
+                          <a:latin typeface="Open Sans Light" pitchFamily="2" charset="0"/>
+                          <a:ea typeface="Open Sans Light" pitchFamily="2" charset="0"/>
+                          <a:cs typeface="Open Sans Light" pitchFamily="2" charset="0"/>
+                        </a:rPr>
+                        <a:t>0.722</a:t>
+                      </a:r>
                     </a:p>
                   </a:txBody>
-                  <a:tcPr marL="7620" marR="7620" marT="7620" marB="0" anchor="b"/>
+                  <a:tcPr marL="9525" marR="9525" marT="9525" marB="0" anchor="ctr"/>
                 </a:tc>
                 <a:tc>
                   <a:txBody>
                     <a:bodyPr/>
                     <a:lstStyle/>
                     <a:p>
-                      <a:pPr algn="r" fontAlgn="b"/>
-                      <a:endParaRPr lang="en-GB" sz="600" b="0" i="0" u="none" strike="noStrike">
-                        <a:solidFill>
-                          <a:srgbClr val="000000"/>
-                        </a:solidFill>
-                        <a:effectLst/>
-                        <a:latin typeface="Calibri" panose="020F0502020204030204" pitchFamily="34" charset="0"/>
-                      </a:endParaRPr>
+                      <a:pPr algn="ctr" fontAlgn="b"/>
+                      <a:r>
+                        <a:rPr lang="en-GB" sz="4000" b="0" i="0" u="none" strike="noStrike" dirty="0">
+                          <a:solidFill>
+                            <a:schemeClr val="bg1"/>
+                          </a:solidFill>
+                          <a:effectLst/>
+                          <a:latin typeface="Open Sans Light" pitchFamily="2" charset="0"/>
+                          <a:ea typeface="Open Sans Light" pitchFamily="2" charset="0"/>
+                          <a:cs typeface="Open Sans Light" pitchFamily="2" charset="0"/>
+                        </a:rPr>
+                        <a:t>0.723</a:t>
+                      </a:r>
                     </a:p>
                   </a:txBody>
-                  <a:tcPr marL="7620" marR="7620" marT="7620" marB="0" anchor="b"/>
+                  <a:tcPr marL="9525" marR="9525" marT="9525" marB="0" anchor="ctr"/>
                 </a:tc>
                 <a:tc>
                   <a:txBody>
                     <a:bodyPr/>
                     <a:lstStyle/>
                     <a:p>
-                      <a:pPr algn="r" fontAlgn="b"/>
-                      <a:endParaRPr lang="en-GB" sz="600" b="0" i="0" u="none" strike="noStrike" dirty="0">
-                        <a:solidFill>
-                          <a:srgbClr val="000000"/>
-                        </a:solidFill>
-                        <a:effectLst/>
-                        <a:latin typeface="Calibri" panose="020F0502020204030204" pitchFamily="34" charset="0"/>
-                      </a:endParaRPr>
+                      <a:pPr algn="ctr" fontAlgn="b"/>
+                      <a:r>
+                        <a:rPr lang="en-GB" sz="4000" b="0" i="0" u="none" strike="noStrike" dirty="0">
+                          <a:solidFill>
+                            <a:schemeClr val="bg1"/>
+                          </a:solidFill>
+                          <a:effectLst/>
+                          <a:latin typeface="Open Sans Light" pitchFamily="2" charset="0"/>
+                          <a:ea typeface="Open Sans Light" pitchFamily="2" charset="0"/>
+                          <a:cs typeface="Open Sans Light" pitchFamily="2" charset="0"/>
+                        </a:rPr>
+                        <a:t>0.446</a:t>
+                      </a:r>
                     </a:p>
                   </a:txBody>
-                  <a:tcPr marL="7620" marR="7620" marT="7620" marB="0" anchor="b"/>
+                  <a:tcPr marL="9525" marR="9525" marT="9525" marB="0" anchor="ctr"/>
                 </a:tc>
                 <a:tc>
                   <a:txBody>
                     <a:bodyPr/>
                     <a:lstStyle/>
                     <a:p>
-                      <a:pPr algn="r" fontAlgn="b"/>
-                      <a:endParaRPr lang="en-GB" sz="600" b="0" i="0" u="none" strike="noStrike" dirty="0">
-                        <a:solidFill>
-                          <a:srgbClr val="000000"/>
-                        </a:solidFill>
-                        <a:effectLst/>
-                        <a:latin typeface="Calibri" panose="020F0502020204030204" pitchFamily="34" charset="0"/>
-                      </a:endParaRPr>
+                      <a:pPr algn="ctr" fontAlgn="b"/>
+                      <a:r>
+                        <a:rPr lang="en-GB" sz="4000" b="0" i="0" u="none" strike="noStrike" dirty="0">
+                          <a:solidFill>
+                            <a:schemeClr val="bg1"/>
+                          </a:solidFill>
+                          <a:effectLst/>
+                          <a:latin typeface="Open Sans Light" pitchFamily="2" charset="0"/>
+                          <a:ea typeface="Open Sans Light" pitchFamily="2" charset="0"/>
+                          <a:cs typeface="Open Sans Light" pitchFamily="2" charset="0"/>
+                        </a:rPr>
+                        <a:t>0.587</a:t>
+                      </a:r>
                     </a:p>
                   </a:txBody>
-                  <a:tcPr marL="7620" marR="7620" marT="7620" marB="0" anchor="b"/>
+                  <a:tcPr marL="9525" marR="9525" marT="9525" marB="0" anchor="ctr"/>
                 </a:tc>
                 <a:extLst>
                   <a:ext uri="{0D108BD9-81ED-4DB2-BD59-A6C34878D82A}">
-                    <a16:rowId xmlns:a16="http://schemas.microsoft.com/office/drawing/2014/main" val="1547941008"/>
+                    <a16:rowId xmlns:a16="http://schemas.microsoft.com/office/drawing/2014/main" val="1005609488"/>
                   </a:ext>
                 </a:extLst>
               </a:tr>
-              <a:tr h="1544320">
+              <a:tr h="1828524">
                 <a:tc>
                   <a:txBody>
                     <a:bodyPr/>
@@ -4354,7 +4949,7 @@
                     <a:p>
                       <a:pPr algn="ctr"/>
                       <a:r>
-                        <a:rPr lang="en-US" sz="3200" dirty="0">
+                        <a:rPr lang="en-US" sz="4000" dirty="0">
                           <a:solidFill>
                             <a:schemeClr val="bg1"/>
                           </a:solidFill>
@@ -4362,9 +4957,9 @@
                           <a:ea typeface="Open Sans Light" pitchFamily="2" charset="0"/>
                           <a:cs typeface="Open Sans Light" pitchFamily="2" charset="0"/>
                         </a:rPr>
-                        <a:t>B</a:t>
+                        <a:t>C</a:t>
                       </a:r>
-                      <a:endParaRPr lang="en-GB" sz="3200" dirty="0">
+                      <a:endParaRPr lang="en-GB" sz="4000" dirty="0">
                         <a:solidFill>
                           <a:schemeClr val="bg1"/>
                         </a:solidFill>
@@ -4381,468 +4976,264 @@
                     <a:bodyPr/>
                     <a:lstStyle/>
                     <a:p>
-                      <a:pPr algn="ctr"/>
-                      <a:endParaRPr lang="en-GB" sz="3200">
-                        <a:solidFill>
-                          <a:schemeClr val="bg1"/>
-                        </a:solidFill>
-                        <a:latin typeface="Open Sans Light" pitchFamily="2" charset="0"/>
-                        <a:ea typeface="Open Sans Light" pitchFamily="2" charset="0"/>
-                        <a:cs typeface="Open Sans Light" pitchFamily="2" charset="0"/>
-                      </a:endParaRPr>
+                      <a:pPr algn="ctr" fontAlgn="b"/>
+                      <a:r>
+                        <a:rPr lang="en-GB" sz="4000" b="0" i="0" u="none" strike="noStrike" dirty="0">
+                          <a:solidFill>
+                            <a:schemeClr val="bg1"/>
+                          </a:solidFill>
+                          <a:effectLst/>
+                          <a:latin typeface="Open Sans Light" pitchFamily="2" charset="0"/>
+                          <a:ea typeface="Open Sans Light" pitchFamily="2" charset="0"/>
+                          <a:cs typeface="Open Sans Light" pitchFamily="2" charset="0"/>
+                        </a:rPr>
+                        <a:t>0.880</a:t>
+                      </a:r>
                     </a:p>
                   </a:txBody>
-                  <a:tcPr anchor="ctr"/>
+                  <a:tcPr marL="9525" marR="9525" marT="9525" marB="0" anchor="ctr"/>
                 </a:tc>
                 <a:tc>
                   <a:txBody>
                     <a:bodyPr/>
                     <a:lstStyle/>
                     <a:p>
-                      <a:pPr algn="ctr"/>
-                      <a:endParaRPr lang="en-GB" sz="3200" dirty="0">
-                        <a:solidFill>
-                          <a:schemeClr val="bg1"/>
-                        </a:solidFill>
-                        <a:latin typeface="Open Sans Light" pitchFamily="2" charset="0"/>
-                        <a:ea typeface="Open Sans Light" pitchFamily="2" charset="0"/>
-                        <a:cs typeface="Open Sans Light" pitchFamily="2" charset="0"/>
-                      </a:endParaRPr>
+                      <a:pPr algn="ctr" fontAlgn="b"/>
+                      <a:r>
+                        <a:rPr lang="en-GB" sz="4000" b="0" i="0" u="none" strike="noStrike" dirty="0">
+                          <a:solidFill>
+                            <a:schemeClr val="bg1"/>
+                          </a:solidFill>
+                          <a:effectLst/>
+                          <a:latin typeface="Open Sans Light" pitchFamily="2" charset="0"/>
+                          <a:ea typeface="Open Sans Light" pitchFamily="2" charset="0"/>
+                          <a:cs typeface="Open Sans Light" pitchFamily="2" charset="0"/>
+                        </a:rPr>
+                        <a:t>0.880</a:t>
+                      </a:r>
                     </a:p>
                   </a:txBody>
-                  <a:tcPr anchor="ctr"/>
+                  <a:tcPr marL="9525" marR="9525" marT="9525" marB="0" anchor="ctr"/>
                 </a:tc>
                 <a:tc>
                   <a:txBody>
                     <a:bodyPr/>
                     <a:lstStyle/>
                     <a:p>
-                      <a:pPr algn="ctr"/>
-                      <a:endParaRPr lang="en-GB" sz="3200" dirty="0">
-                        <a:solidFill>
-                          <a:schemeClr val="bg1"/>
-                        </a:solidFill>
-                        <a:latin typeface="Open Sans Light" pitchFamily="2" charset="0"/>
-                        <a:ea typeface="Open Sans Light" pitchFamily="2" charset="0"/>
-                        <a:cs typeface="Open Sans Light" pitchFamily="2" charset="0"/>
-                      </a:endParaRPr>
+                      <a:pPr algn="ctr" fontAlgn="b"/>
+                      <a:r>
+                        <a:rPr lang="en-GB" sz="4000" b="0" i="0" u="none" strike="noStrike" dirty="0">
+                          <a:solidFill>
+                            <a:schemeClr val="bg1"/>
+                          </a:solidFill>
+                          <a:effectLst/>
+                          <a:latin typeface="Open Sans Light" pitchFamily="2" charset="0"/>
+                          <a:ea typeface="Open Sans Light" pitchFamily="2" charset="0"/>
+                          <a:cs typeface="Open Sans Light" pitchFamily="2" charset="0"/>
+                        </a:rPr>
+                        <a:t>0.880</a:t>
+                      </a:r>
                     </a:p>
                   </a:txBody>
-                  <a:tcPr anchor="ctr"/>
+                  <a:tcPr marL="9525" marR="9525" marT="9525" marB="0" anchor="ctr"/>
                 </a:tc>
                 <a:tc>
                   <a:txBody>
                     <a:bodyPr/>
                     <a:lstStyle/>
                     <a:p>
-                      <a:pPr algn="ctr"/>
-                      <a:endParaRPr lang="en-GB" sz="3200" dirty="0">
-                        <a:solidFill>
-                          <a:schemeClr val="bg1"/>
-                        </a:solidFill>
-                        <a:latin typeface="Open Sans Light" pitchFamily="2" charset="0"/>
-                        <a:ea typeface="Open Sans Light" pitchFamily="2" charset="0"/>
-                        <a:cs typeface="Open Sans Light" pitchFamily="2" charset="0"/>
-                      </a:endParaRPr>
+                      <a:pPr algn="ctr" fontAlgn="b"/>
+                      <a:r>
+                        <a:rPr lang="en-GB" sz="4000" b="0" i="0" u="none" strike="noStrike" dirty="0">
+                          <a:solidFill>
+                            <a:schemeClr val="bg1"/>
+                          </a:solidFill>
+                          <a:effectLst/>
+                          <a:latin typeface="Open Sans Light" pitchFamily="2" charset="0"/>
+                          <a:ea typeface="Open Sans Light" pitchFamily="2" charset="0"/>
+                          <a:cs typeface="Open Sans Light" pitchFamily="2" charset="0"/>
+                        </a:rPr>
+                        <a:t>0.880</a:t>
+                      </a:r>
                     </a:p>
                   </a:txBody>
-                  <a:tcPr anchor="ctr"/>
+                  <a:tcPr marL="9525" marR="9525" marT="9525" marB="0" anchor="ctr"/>
                 </a:tc>
                 <a:tc>
                   <a:txBody>
                     <a:bodyPr/>
                     <a:lstStyle/>
                     <a:p>
-                      <a:pPr algn="ctr"/>
-                      <a:endParaRPr lang="en-GB" sz="3200" dirty="0">
-                        <a:solidFill>
-                          <a:schemeClr val="bg1"/>
-                        </a:solidFill>
-                        <a:latin typeface="Open Sans Light" pitchFamily="2" charset="0"/>
-                        <a:ea typeface="Open Sans Light" pitchFamily="2" charset="0"/>
-                        <a:cs typeface="Open Sans Light" pitchFamily="2" charset="0"/>
-                      </a:endParaRPr>
+                      <a:pPr algn="ctr" fontAlgn="b"/>
+                      <a:r>
+                        <a:rPr lang="en-GB" sz="4000" b="0" i="0" u="none" strike="noStrike" dirty="0">
+                          <a:solidFill>
+                            <a:schemeClr val="bg1"/>
+                          </a:solidFill>
+                          <a:effectLst/>
+                          <a:latin typeface="Open Sans Light" pitchFamily="2" charset="0"/>
+                          <a:ea typeface="Open Sans Light" pitchFamily="2" charset="0"/>
+                          <a:cs typeface="Open Sans Light" pitchFamily="2" charset="0"/>
+                        </a:rPr>
+                        <a:t>0.889</a:t>
+                      </a:r>
                     </a:p>
                   </a:txBody>
-                  <a:tcPr anchor="ctr"/>
+                  <a:tcPr marL="9525" marR="9525" marT="9525" marB="0" anchor="ctr"/>
                 </a:tc>
                 <a:tc>
                   <a:txBody>
                     <a:bodyPr/>
                     <a:lstStyle/>
                     <a:p>
-                      <a:pPr algn="ctr"/>
-                      <a:endParaRPr lang="en-GB" sz="3200" dirty="0">
-                        <a:solidFill>
-                          <a:schemeClr val="bg1"/>
-                        </a:solidFill>
-                        <a:latin typeface="Open Sans Light" pitchFamily="2" charset="0"/>
-                        <a:ea typeface="Open Sans Light" pitchFamily="2" charset="0"/>
-                        <a:cs typeface="Open Sans Light" pitchFamily="2" charset="0"/>
-                      </a:endParaRPr>
+                      <a:pPr algn="ctr" fontAlgn="b"/>
+                      <a:r>
+                        <a:rPr lang="en-GB" sz="4000" b="0" i="0" u="none" strike="noStrike" dirty="0">
+                          <a:solidFill>
+                            <a:schemeClr val="bg1"/>
+                          </a:solidFill>
+                          <a:effectLst/>
+                          <a:latin typeface="Open Sans Light" pitchFamily="2" charset="0"/>
+                          <a:ea typeface="Open Sans Light" pitchFamily="2" charset="0"/>
+                          <a:cs typeface="Open Sans Light" pitchFamily="2" charset="0"/>
+                        </a:rPr>
+                        <a:t>0.880</a:t>
+                      </a:r>
                     </a:p>
                   </a:txBody>
-                  <a:tcPr anchor="ctr"/>
+                  <a:tcPr marL="9525" marR="9525" marT="9525" marB="0" anchor="ctr"/>
                 </a:tc>
                 <a:tc>
                   <a:txBody>
                     <a:bodyPr/>
                     <a:lstStyle/>
                     <a:p>
-                      <a:pPr algn="ctr"/>
-                      <a:endParaRPr lang="en-GB" sz="3200" dirty="0">
-                        <a:solidFill>
-                          <a:schemeClr val="bg1"/>
-                        </a:solidFill>
-                        <a:latin typeface="Open Sans Light" pitchFamily="2" charset="0"/>
-                        <a:ea typeface="Open Sans Light" pitchFamily="2" charset="0"/>
-                        <a:cs typeface="Open Sans Light" pitchFamily="2" charset="0"/>
-                      </a:endParaRPr>
+                      <a:pPr algn="ctr" fontAlgn="b"/>
+                      <a:r>
+                        <a:rPr lang="en-GB" sz="4000" b="0" i="0" u="none" strike="noStrike" dirty="0">
+                          <a:solidFill>
+                            <a:schemeClr val="bg1"/>
+                          </a:solidFill>
+                          <a:effectLst/>
+                          <a:latin typeface="Open Sans Light" pitchFamily="2" charset="0"/>
+                          <a:ea typeface="Open Sans Light" pitchFamily="2" charset="0"/>
+                          <a:cs typeface="Open Sans Light" pitchFamily="2" charset="0"/>
+                        </a:rPr>
+                        <a:t>0.880</a:t>
+                      </a:r>
                     </a:p>
                   </a:txBody>
-                  <a:tcPr anchor="ctr"/>
+                  <a:tcPr marL="9525" marR="9525" marT="9525" marB="0" anchor="ctr"/>
                 </a:tc>
                 <a:tc>
                   <a:txBody>
                     <a:bodyPr/>
                     <a:lstStyle/>
                     <a:p>
-                      <a:pPr algn="ctr"/>
-                      <a:endParaRPr lang="en-GB" sz="3200" dirty="0">
-                        <a:solidFill>
-                          <a:schemeClr val="bg1"/>
-                        </a:solidFill>
-                        <a:latin typeface="Open Sans Light" pitchFamily="2" charset="0"/>
-                        <a:ea typeface="Open Sans Light" pitchFamily="2" charset="0"/>
-                        <a:cs typeface="Open Sans Light" pitchFamily="2" charset="0"/>
-                      </a:endParaRPr>
+                      <a:pPr algn="ctr" fontAlgn="b"/>
+                      <a:r>
+                        <a:rPr lang="en-GB" sz="4000" b="0" i="0" u="none" strike="noStrike" dirty="0">
+                          <a:solidFill>
+                            <a:schemeClr val="bg1"/>
+                          </a:solidFill>
+                          <a:effectLst/>
+                          <a:latin typeface="Open Sans Light" pitchFamily="2" charset="0"/>
+                          <a:ea typeface="Open Sans Light" pitchFamily="2" charset="0"/>
+                          <a:cs typeface="Open Sans Light" pitchFamily="2" charset="0"/>
+                        </a:rPr>
+                        <a:t>0.884</a:t>
+                      </a:r>
                     </a:p>
                   </a:txBody>
-                  <a:tcPr anchor="ctr"/>
+                  <a:tcPr marL="9525" marR="9525" marT="9525" marB="0" anchor="ctr"/>
                 </a:tc>
                 <a:tc>
                   <a:txBody>
                     <a:bodyPr/>
                     <a:lstStyle/>
                     <a:p>
-                      <a:pPr algn="ctr"/>
-                      <a:endParaRPr lang="en-GB" sz="3200" dirty="0">
-                        <a:solidFill>
-                          <a:schemeClr val="bg1"/>
-                        </a:solidFill>
-                        <a:latin typeface="Open Sans Light" pitchFamily="2" charset="0"/>
-                        <a:ea typeface="Open Sans Light" pitchFamily="2" charset="0"/>
-                        <a:cs typeface="Open Sans Light" pitchFamily="2" charset="0"/>
-                      </a:endParaRPr>
+                      <a:pPr algn="ctr" fontAlgn="b"/>
+                      <a:r>
+                        <a:rPr lang="en-GB" sz="4000" b="0" i="0" u="none" strike="noStrike" dirty="0">
+                          <a:solidFill>
+                            <a:schemeClr val="bg1"/>
+                          </a:solidFill>
+                          <a:effectLst/>
+                          <a:latin typeface="Open Sans Light" pitchFamily="2" charset="0"/>
+                          <a:ea typeface="Open Sans Light" pitchFamily="2" charset="0"/>
+                          <a:cs typeface="Open Sans Light" pitchFamily="2" charset="0"/>
+                        </a:rPr>
+                        <a:t>0.880</a:t>
+                      </a:r>
                     </a:p>
                   </a:txBody>
-                  <a:tcPr anchor="ctr"/>
+                  <a:tcPr marL="9525" marR="9525" marT="9525" marB="0" anchor="ctr"/>
                 </a:tc>
                 <a:tc>
                   <a:txBody>
                     <a:bodyPr/>
                     <a:lstStyle/>
                     <a:p>
-                      <a:pPr algn="ctr"/>
-                      <a:endParaRPr lang="en-GB" sz="3200" dirty="0">
-                        <a:solidFill>
-                          <a:schemeClr val="bg1"/>
-                        </a:solidFill>
-                        <a:latin typeface="Open Sans Light" pitchFamily="2" charset="0"/>
-                        <a:ea typeface="Open Sans Light" pitchFamily="2" charset="0"/>
-                        <a:cs typeface="Open Sans Light" pitchFamily="2" charset="0"/>
-                      </a:endParaRPr>
+                      <a:pPr algn="ctr" fontAlgn="b"/>
+                      <a:r>
+                        <a:rPr lang="en-GB" sz="4000" b="0" i="0" u="none" strike="noStrike" dirty="0">
+                          <a:solidFill>
+                            <a:schemeClr val="bg1"/>
+                          </a:solidFill>
+                          <a:effectLst/>
+                          <a:latin typeface="Open Sans Light" pitchFamily="2" charset="0"/>
+                          <a:ea typeface="Open Sans Light" pitchFamily="2" charset="0"/>
+                          <a:cs typeface="Open Sans Light" pitchFamily="2" charset="0"/>
+                        </a:rPr>
+                        <a:t>0.880</a:t>
+                      </a:r>
                     </a:p>
                   </a:txBody>
-                  <a:tcPr anchor="ctr"/>
+                  <a:tcPr marL="9525" marR="9525" marT="9525" marB="0" anchor="ctr"/>
                 </a:tc>
                 <a:tc>
                   <a:txBody>
                     <a:bodyPr/>
                     <a:lstStyle/>
                     <a:p>
-                      <a:pPr algn="ctr"/>
-                      <a:endParaRPr lang="en-GB" sz="3200" dirty="0">
-                        <a:solidFill>
-                          <a:schemeClr val="bg1"/>
-                        </a:solidFill>
-                        <a:latin typeface="Open Sans Light" pitchFamily="2" charset="0"/>
-                        <a:ea typeface="Open Sans Light" pitchFamily="2" charset="0"/>
-                        <a:cs typeface="Open Sans Light" pitchFamily="2" charset="0"/>
-                      </a:endParaRPr>
+                      <a:pPr algn="ctr" fontAlgn="b"/>
+                      <a:r>
+                        <a:rPr lang="en-GB" sz="4000" b="0" i="0" u="none" strike="noStrike" dirty="0">
+                          <a:solidFill>
+                            <a:schemeClr val="bg1"/>
+                          </a:solidFill>
+                          <a:effectLst/>
+                          <a:latin typeface="Open Sans Light" pitchFamily="2" charset="0"/>
+                          <a:ea typeface="Open Sans Light" pitchFamily="2" charset="0"/>
+                          <a:cs typeface="Open Sans Light" pitchFamily="2" charset="0"/>
+                        </a:rPr>
+                        <a:t>0.760</a:t>
+                      </a:r>
                     </a:p>
                   </a:txBody>
-                  <a:tcPr anchor="ctr"/>
+                  <a:tcPr marL="9525" marR="9525" marT="9525" marB="0" anchor="ctr"/>
                 </a:tc>
                 <a:tc>
                   <a:txBody>
                     <a:bodyPr/>
                     <a:lstStyle/>
                     <a:p>
-                      <a:pPr algn="ctr"/>
-                      <a:endParaRPr lang="en-GB" sz="3200" dirty="0">
-                        <a:solidFill>
-                          <a:schemeClr val="bg1"/>
-                        </a:solidFill>
-                        <a:latin typeface="Open Sans Light" pitchFamily="2" charset="0"/>
-                        <a:ea typeface="Open Sans Light" pitchFamily="2" charset="0"/>
-                        <a:cs typeface="Open Sans Light" pitchFamily="2" charset="0"/>
-                      </a:endParaRPr>
-                    </a:p>
-                  </a:txBody>
-                  <a:tcPr anchor="ctr"/>
-                </a:tc>
-                <a:extLst>
-                  <a:ext uri="{0D108BD9-81ED-4DB2-BD59-A6C34878D82A}">
-                    <a16:rowId xmlns:a16="http://schemas.microsoft.com/office/drawing/2014/main" val="1005609488"/>
-                  </a:ext>
-                </a:extLst>
-              </a:tr>
-              <a:tr h="1544320">
-                <a:tc>
-                  <a:txBody>
-                    <a:bodyPr/>
-                    <a:lstStyle/>
-                    <a:p>
-                      <a:pPr algn="ctr"/>
+                      <a:pPr algn="ctr" fontAlgn="b"/>
                       <a:r>
-                        <a:rPr lang="en-US" sz="3200" dirty="0">
+                        <a:rPr lang="en-GB" sz="4000" b="0" i="0" u="none" strike="noStrike" dirty="0">
                           <a:solidFill>
                             <a:schemeClr val="bg1"/>
                           </a:solidFill>
+                          <a:effectLst/>
                           <a:latin typeface="Open Sans Light" pitchFamily="2" charset="0"/>
                           <a:ea typeface="Open Sans Light" pitchFamily="2" charset="0"/>
                           <a:cs typeface="Open Sans Light" pitchFamily="2" charset="0"/>
                         </a:rPr>
-                        <a:t>C</a:t>
+                        <a:t>1.751</a:t>
                       </a:r>
-                      <a:endParaRPr lang="en-GB" sz="3200" dirty="0">
-                        <a:solidFill>
-                          <a:schemeClr val="bg1"/>
-                        </a:solidFill>
-                        <a:latin typeface="Open Sans Light" pitchFamily="2" charset="0"/>
-                        <a:ea typeface="Open Sans Light" pitchFamily="2" charset="0"/>
-                        <a:cs typeface="Open Sans Light" pitchFamily="2" charset="0"/>
-                      </a:endParaRPr>
                     </a:p>
                   </a:txBody>
-                  <a:tcPr anchor="ctr"/>
-                </a:tc>
-                <a:tc>
-                  <a:txBody>
-                    <a:bodyPr/>
-                    <a:lstStyle/>
-                    <a:p>
-                      <a:pPr algn="ctr"/>
-                      <a:endParaRPr lang="en-GB" sz="3200">
-                        <a:solidFill>
-                          <a:schemeClr val="bg1"/>
-                        </a:solidFill>
-                        <a:latin typeface="Open Sans Light" pitchFamily="2" charset="0"/>
-                        <a:ea typeface="Open Sans Light" pitchFamily="2" charset="0"/>
-                        <a:cs typeface="Open Sans Light" pitchFamily="2" charset="0"/>
-                      </a:endParaRPr>
-                    </a:p>
-                  </a:txBody>
-                  <a:tcPr anchor="ctr"/>
-                </a:tc>
-                <a:tc>
-                  <a:txBody>
-                    <a:bodyPr/>
-                    <a:lstStyle/>
-                    <a:p>
-                      <a:pPr algn="ctr"/>
-                      <a:endParaRPr lang="en-GB" sz="3200" dirty="0">
-                        <a:solidFill>
-                          <a:schemeClr val="bg1"/>
-                        </a:solidFill>
-                        <a:latin typeface="Open Sans Light" pitchFamily="2" charset="0"/>
-                        <a:ea typeface="Open Sans Light" pitchFamily="2" charset="0"/>
-                        <a:cs typeface="Open Sans Light" pitchFamily="2" charset="0"/>
-                      </a:endParaRPr>
-                    </a:p>
-                  </a:txBody>
-                  <a:tcPr anchor="ctr"/>
-                </a:tc>
-                <a:tc>
-                  <a:txBody>
-                    <a:bodyPr/>
-                    <a:lstStyle/>
-                    <a:p>
-                      <a:pPr algn="ctr"/>
-                      <a:endParaRPr lang="en-GB" sz="3200" dirty="0">
-                        <a:solidFill>
-                          <a:schemeClr val="bg1"/>
-                        </a:solidFill>
-                        <a:latin typeface="Open Sans Light" pitchFamily="2" charset="0"/>
-                        <a:ea typeface="Open Sans Light" pitchFamily="2" charset="0"/>
-                        <a:cs typeface="Open Sans Light" pitchFamily="2" charset="0"/>
-                      </a:endParaRPr>
-                    </a:p>
-                  </a:txBody>
-                  <a:tcPr anchor="ctr"/>
-                </a:tc>
-                <a:tc>
-                  <a:txBody>
-                    <a:bodyPr/>
-                    <a:lstStyle/>
-                    <a:p>
-                      <a:pPr algn="ctr"/>
-                      <a:endParaRPr lang="en-GB" sz="3200" dirty="0">
-                        <a:solidFill>
-                          <a:schemeClr val="bg1"/>
-                        </a:solidFill>
-                        <a:latin typeface="Open Sans Light" pitchFamily="2" charset="0"/>
-                        <a:ea typeface="Open Sans Light" pitchFamily="2" charset="0"/>
-                        <a:cs typeface="Open Sans Light" pitchFamily="2" charset="0"/>
-                      </a:endParaRPr>
-                    </a:p>
-                  </a:txBody>
-                  <a:tcPr anchor="ctr"/>
-                </a:tc>
-                <a:tc>
-                  <a:txBody>
-                    <a:bodyPr/>
-                    <a:lstStyle/>
-                    <a:p>
-                      <a:pPr algn="ctr"/>
-                      <a:endParaRPr lang="en-GB" sz="3200" dirty="0">
-                        <a:solidFill>
-                          <a:schemeClr val="bg1"/>
-                        </a:solidFill>
-                        <a:latin typeface="Open Sans Light" pitchFamily="2" charset="0"/>
-                        <a:ea typeface="Open Sans Light" pitchFamily="2" charset="0"/>
-                        <a:cs typeface="Open Sans Light" pitchFamily="2" charset="0"/>
-                      </a:endParaRPr>
-                    </a:p>
-                  </a:txBody>
-                  <a:tcPr anchor="ctr"/>
-                </a:tc>
-                <a:tc>
-                  <a:txBody>
-                    <a:bodyPr/>
-                    <a:lstStyle/>
-                    <a:p>
-                      <a:pPr algn="ctr"/>
-                      <a:endParaRPr lang="en-GB" sz="3200" dirty="0">
-                        <a:solidFill>
-                          <a:schemeClr val="bg1"/>
-                        </a:solidFill>
-                        <a:latin typeface="Open Sans Light" pitchFamily="2" charset="0"/>
-                        <a:ea typeface="Open Sans Light" pitchFamily="2" charset="0"/>
-                        <a:cs typeface="Open Sans Light" pitchFamily="2" charset="0"/>
-                      </a:endParaRPr>
-                    </a:p>
-                  </a:txBody>
-                  <a:tcPr anchor="ctr"/>
-                </a:tc>
-                <a:tc>
-                  <a:txBody>
-                    <a:bodyPr/>
-                    <a:lstStyle/>
-                    <a:p>
-                      <a:pPr algn="ctr"/>
-                      <a:endParaRPr lang="en-GB" sz="3200" dirty="0">
-                        <a:solidFill>
-                          <a:schemeClr val="bg1"/>
-                        </a:solidFill>
-                        <a:latin typeface="Open Sans Light" pitchFamily="2" charset="0"/>
-                        <a:ea typeface="Open Sans Light" pitchFamily="2" charset="0"/>
-                        <a:cs typeface="Open Sans Light" pitchFamily="2" charset="0"/>
-                      </a:endParaRPr>
-                    </a:p>
-                  </a:txBody>
-                  <a:tcPr anchor="ctr"/>
-                </a:tc>
-                <a:tc>
-                  <a:txBody>
-                    <a:bodyPr/>
-                    <a:lstStyle/>
-                    <a:p>
-                      <a:pPr algn="ctr"/>
-                      <a:endParaRPr lang="en-GB" sz="3200" dirty="0">
-                        <a:solidFill>
-                          <a:schemeClr val="bg1"/>
-                        </a:solidFill>
-                        <a:latin typeface="Open Sans Light" pitchFamily="2" charset="0"/>
-                        <a:ea typeface="Open Sans Light" pitchFamily="2" charset="0"/>
-                        <a:cs typeface="Open Sans Light" pitchFamily="2" charset="0"/>
-                      </a:endParaRPr>
-                    </a:p>
-                  </a:txBody>
-                  <a:tcPr anchor="ctr"/>
-                </a:tc>
-                <a:tc>
-                  <a:txBody>
-                    <a:bodyPr/>
-                    <a:lstStyle/>
-                    <a:p>
-                      <a:pPr algn="ctr"/>
-                      <a:endParaRPr lang="en-GB" sz="3200" dirty="0">
-                        <a:solidFill>
-                          <a:schemeClr val="bg1"/>
-                        </a:solidFill>
-                        <a:latin typeface="Open Sans Light" pitchFamily="2" charset="0"/>
-                        <a:ea typeface="Open Sans Light" pitchFamily="2" charset="0"/>
-                        <a:cs typeface="Open Sans Light" pitchFamily="2" charset="0"/>
-                      </a:endParaRPr>
-                    </a:p>
-                  </a:txBody>
-                  <a:tcPr anchor="ctr"/>
-                </a:tc>
-                <a:tc>
-                  <a:txBody>
-                    <a:bodyPr/>
-                    <a:lstStyle/>
-                    <a:p>
-                      <a:pPr algn="ctr"/>
-                      <a:endParaRPr lang="en-GB" sz="3200" dirty="0">
-                        <a:solidFill>
-                          <a:schemeClr val="bg1"/>
-                        </a:solidFill>
-                        <a:latin typeface="Open Sans Light" pitchFamily="2" charset="0"/>
-                        <a:ea typeface="Open Sans Light" pitchFamily="2" charset="0"/>
-                        <a:cs typeface="Open Sans Light" pitchFamily="2" charset="0"/>
-                      </a:endParaRPr>
-                    </a:p>
-                  </a:txBody>
-                  <a:tcPr anchor="ctr"/>
-                </a:tc>
-                <a:tc>
-                  <a:txBody>
-                    <a:bodyPr/>
-                    <a:lstStyle/>
-                    <a:p>
-                      <a:pPr algn="ctr"/>
-                      <a:endParaRPr lang="en-GB" sz="3200" dirty="0">
-                        <a:solidFill>
-                          <a:schemeClr val="bg1"/>
-                        </a:solidFill>
-                        <a:latin typeface="Open Sans Light" pitchFamily="2" charset="0"/>
-                        <a:ea typeface="Open Sans Light" pitchFamily="2" charset="0"/>
-                        <a:cs typeface="Open Sans Light" pitchFamily="2" charset="0"/>
-                      </a:endParaRPr>
-                    </a:p>
-                  </a:txBody>
-                  <a:tcPr anchor="ctr"/>
-                </a:tc>
-                <a:tc>
-                  <a:txBody>
-                    <a:bodyPr/>
-                    <a:lstStyle/>
-                    <a:p>
-                      <a:pPr algn="ctr"/>
-                      <a:endParaRPr lang="en-GB" sz="3200" dirty="0">
-                        <a:solidFill>
-                          <a:schemeClr val="bg1"/>
-                        </a:solidFill>
-                        <a:latin typeface="Open Sans Light" pitchFamily="2" charset="0"/>
-                        <a:ea typeface="Open Sans Light" pitchFamily="2" charset="0"/>
-                        <a:cs typeface="Open Sans Light" pitchFamily="2" charset="0"/>
-                      </a:endParaRPr>
-                    </a:p>
-                  </a:txBody>
-                  <a:tcPr anchor="ctr"/>
+                  <a:tcPr marL="9525" marR="9525" marT="9525" marB="0" anchor="ctr"/>
                 </a:tc>
                 <a:extLst>
                   <a:ext uri="{0D108BD9-81ED-4DB2-BD59-A6C34878D82A}">

</xml_diff>

<commit_message>
Move poster and add filler items, #4
</commit_message>
<xml_diff>
--- a/poster/poster.pptx
+++ b/poster/poster.pptx
@@ -255,7 +255,7 @@
           <a:p>
             <a:fld id="{52A2FECF-891D-49EB-A3E6-5F3FE0DE1572}" type="datetimeFigureOut">
               <a:rPr lang="en-GB" smtClean="0"/>
-              <a:t>16/04/2024</a:t>
+              <a:t>22/04/2024</a:t>
             </a:fld>
             <a:endParaRPr lang="en-GB"/>
           </a:p>
@@ -425,7 +425,7 @@
           <a:p>
             <a:fld id="{52A2FECF-891D-49EB-A3E6-5F3FE0DE1572}" type="datetimeFigureOut">
               <a:rPr lang="en-GB" smtClean="0"/>
-              <a:t>16/04/2024</a:t>
+              <a:t>22/04/2024</a:t>
             </a:fld>
             <a:endParaRPr lang="en-GB"/>
           </a:p>
@@ -605,7 +605,7 @@
           <a:p>
             <a:fld id="{52A2FECF-891D-49EB-A3E6-5F3FE0DE1572}" type="datetimeFigureOut">
               <a:rPr lang="en-GB" smtClean="0"/>
-              <a:t>16/04/2024</a:t>
+              <a:t>22/04/2024</a:t>
             </a:fld>
             <a:endParaRPr lang="en-GB"/>
           </a:p>
@@ -775,7 +775,7 @@
           <a:p>
             <a:fld id="{52A2FECF-891D-49EB-A3E6-5F3FE0DE1572}" type="datetimeFigureOut">
               <a:rPr lang="en-GB" smtClean="0"/>
-              <a:t>16/04/2024</a:t>
+              <a:t>22/04/2024</a:t>
             </a:fld>
             <a:endParaRPr lang="en-GB"/>
           </a:p>
@@ -1019,7 +1019,7 @@
           <a:p>
             <a:fld id="{52A2FECF-891D-49EB-A3E6-5F3FE0DE1572}" type="datetimeFigureOut">
               <a:rPr lang="en-GB" smtClean="0"/>
-              <a:t>16/04/2024</a:t>
+              <a:t>22/04/2024</a:t>
             </a:fld>
             <a:endParaRPr lang="en-GB"/>
           </a:p>
@@ -1251,7 +1251,7 @@
           <a:p>
             <a:fld id="{52A2FECF-891D-49EB-A3E6-5F3FE0DE1572}" type="datetimeFigureOut">
               <a:rPr lang="en-GB" smtClean="0"/>
-              <a:t>16/04/2024</a:t>
+              <a:t>22/04/2024</a:t>
             </a:fld>
             <a:endParaRPr lang="en-GB"/>
           </a:p>
@@ -1618,7 +1618,7 @@
           <a:p>
             <a:fld id="{52A2FECF-891D-49EB-A3E6-5F3FE0DE1572}" type="datetimeFigureOut">
               <a:rPr lang="en-GB" smtClean="0"/>
-              <a:t>16/04/2024</a:t>
+              <a:t>22/04/2024</a:t>
             </a:fld>
             <a:endParaRPr lang="en-GB"/>
           </a:p>
@@ -1736,7 +1736,7 @@
           <a:p>
             <a:fld id="{52A2FECF-891D-49EB-A3E6-5F3FE0DE1572}" type="datetimeFigureOut">
               <a:rPr lang="en-GB" smtClean="0"/>
-              <a:t>16/04/2024</a:t>
+              <a:t>22/04/2024</a:t>
             </a:fld>
             <a:endParaRPr lang="en-GB"/>
           </a:p>
@@ -1831,7 +1831,7 @@
           <a:p>
             <a:fld id="{52A2FECF-891D-49EB-A3E6-5F3FE0DE1572}" type="datetimeFigureOut">
               <a:rPr lang="en-GB" smtClean="0"/>
-              <a:t>16/04/2024</a:t>
+              <a:t>22/04/2024</a:t>
             </a:fld>
             <a:endParaRPr lang="en-GB"/>
           </a:p>
@@ -2108,7 +2108,7 @@
           <a:p>
             <a:fld id="{52A2FECF-891D-49EB-A3E6-5F3FE0DE1572}" type="datetimeFigureOut">
               <a:rPr lang="en-GB" smtClean="0"/>
-              <a:t>16/04/2024</a:t>
+              <a:t>22/04/2024</a:t>
             </a:fld>
             <a:endParaRPr lang="en-GB"/>
           </a:p>
@@ -2365,7 +2365,7 @@
           <a:p>
             <a:fld id="{52A2FECF-891D-49EB-A3E6-5F3FE0DE1572}" type="datetimeFigureOut">
               <a:rPr lang="en-GB" smtClean="0"/>
-              <a:t>16/04/2024</a:t>
+              <a:t>22/04/2024</a:t>
             </a:fld>
             <a:endParaRPr lang="en-GB"/>
           </a:p>
@@ -2578,7 +2578,7 @@
           <a:p>
             <a:fld id="{52A2FECF-891D-49EB-A3E6-5F3FE0DE1572}" type="datetimeFigureOut">
               <a:rPr lang="en-GB" smtClean="0"/>
-              <a:t>16/04/2024</a:t>
+              <a:t>22/04/2024</a:t>
             </a:fld>
             <a:endParaRPr lang="en-GB"/>
           </a:p>
@@ -3136,8 +3136,8 @@
         </p:nvSpPr>
         <p:spPr>
           <a:xfrm>
-            <a:off x="15407639" y="16868025"/>
-            <a:ext cx="27782520" cy="8787770"/>
+            <a:off x="15351339" y="17882105"/>
+            <a:ext cx="27782520" cy="7801767"/>
           </a:xfrm>
           <a:prstGeom prst="roundRect">
             <a:avLst>
@@ -3444,7 +3444,7 @@
               </a:spcBef>
             </a:pPr>
             <a:r>
-              <a:rPr lang="en-US" sz="4800" dirty="0">
+              <a:rPr lang="en-US" sz="4000" dirty="0">
                 <a:solidFill>
                   <a:schemeClr val="bg1"/>
                 </a:solidFill>
@@ -3464,7 +3464,7 @@
               <a:buChar char="•"/>
             </a:pPr>
             <a:r>
-              <a:rPr lang="en-US" sz="4800" b="1" dirty="0">
+              <a:rPr lang="en-US" sz="4000" b="1" dirty="0">
                 <a:solidFill>
                   <a:schemeClr val="bg1"/>
                 </a:solidFill>
@@ -3475,7 +3475,7 @@
               <a:t>Method B</a:t>
             </a:r>
             <a:r>
-              <a:rPr lang="en-US" sz="4800" dirty="0">
+              <a:rPr lang="en-US" sz="4000" dirty="0">
                 <a:solidFill>
                   <a:schemeClr val="bg1"/>
                 </a:solidFill>
@@ -3495,7 +3495,7 @@
               <a:buChar char="•"/>
             </a:pPr>
             <a:r>
-              <a:rPr lang="en-GB" sz="4800" dirty="0">
+              <a:rPr lang="en-GB" sz="4000" dirty="0">
                 <a:solidFill>
                   <a:schemeClr val="bg1"/>
                 </a:solidFill>
@@ -3506,7 +3506,7 @@
               <a:t>Trained a </a:t>
             </a:r>
             <a:r>
-              <a:rPr lang="en-GB" sz="4800" b="1" dirty="0">
+              <a:rPr lang="en-GB" sz="4000" b="1" dirty="0">
                 <a:solidFill>
                   <a:schemeClr val="bg1"/>
                 </a:solidFill>
@@ -3517,7 +3517,7 @@
               <a:t>Bi-LSTM</a:t>
             </a:r>
             <a:r>
-              <a:rPr lang="en-GB" sz="4800" dirty="0">
+              <a:rPr lang="en-GB" sz="4000" dirty="0">
                 <a:solidFill>
                   <a:schemeClr val="bg1"/>
                 </a:solidFill>
@@ -3528,7 +3528,139 @@
               <a:t> with frozen </a:t>
             </a:r>
             <a:r>
-              <a:rPr lang="en-GB" sz="4800" b="1" dirty="0">
+              <a:rPr lang="en-GB" sz="4000" b="1" dirty="0">
+                <a:solidFill>
+                  <a:schemeClr val="bg1"/>
+                </a:solidFill>
+                <a:latin typeface="Open Sans Light" pitchFamily="2" charset="0"/>
+                <a:ea typeface="Open Sans Light" pitchFamily="2" charset="0"/>
+                <a:cs typeface="Open Sans Light" pitchFamily="2" charset="0"/>
+              </a:rPr>
+              <a:t>XLNET</a:t>
+            </a:r>
+            <a:r>
+              <a:rPr lang="en-GB" sz="4000" dirty="0">
+                <a:solidFill>
+                  <a:schemeClr val="bg1"/>
+                </a:solidFill>
+                <a:latin typeface="Open Sans Light" pitchFamily="2" charset="0"/>
+                <a:ea typeface="Open Sans Light" pitchFamily="2" charset="0"/>
+                <a:cs typeface="Open Sans Light" pitchFamily="2" charset="0"/>
+              </a:rPr>
+              <a:t> embeddings</a:t>
+            </a:r>
+          </a:p>
+          <a:p>
+            <a:pPr marL="1143000" lvl="1" indent="-685800">
+              <a:spcBef>
+                <a:spcPts val="1800"/>
+              </a:spcBef>
+              <a:buFont typeface="Arial" panose="020B0604020202020204" pitchFamily="34" charset="0"/>
+              <a:buChar char="•"/>
+            </a:pPr>
+            <a:r>
+              <a:rPr lang="en-GB" sz="4000" dirty="0">
+                <a:solidFill>
+                  <a:schemeClr val="bg1"/>
+                </a:solidFill>
+                <a:latin typeface="Open Sans Light" pitchFamily="2" charset="0"/>
+                <a:ea typeface="Open Sans Light" pitchFamily="2" charset="0"/>
+                <a:cs typeface="Open Sans Light" pitchFamily="2" charset="0"/>
+              </a:rPr>
+              <a:t>Utilised </a:t>
+            </a:r>
+            <a:r>
+              <a:rPr lang="en-GB" sz="4000" b="1" dirty="0">
+                <a:solidFill>
+                  <a:schemeClr val="bg1"/>
+                </a:solidFill>
+                <a:latin typeface="Open Sans Light" pitchFamily="2" charset="0"/>
+                <a:ea typeface="Open Sans Light" pitchFamily="2" charset="0"/>
+                <a:cs typeface="Open Sans Light" pitchFamily="2" charset="0"/>
+              </a:rPr>
+              <a:t>learning rate scheduling </a:t>
+            </a:r>
+            <a:r>
+              <a:rPr lang="en-GB" sz="4000" dirty="0">
+                <a:solidFill>
+                  <a:schemeClr val="bg1"/>
+                </a:solidFill>
+                <a:latin typeface="Open Sans Light" pitchFamily="2" charset="0"/>
+                <a:ea typeface="Open Sans Light" pitchFamily="2" charset="0"/>
+                <a:cs typeface="Open Sans Light" pitchFamily="2" charset="0"/>
+              </a:rPr>
+              <a:t>to approach a global optimum</a:t>
+            </a:r>
+          </a:p>
+          <a:p>
+            <a:pPr marL="1143000" lvl="1" indent="-685800">
+              <a:spcBef>
+                <a:spcPts val="1800"/>
+              </a:spcBef>
+              <a:buFont typeface="Arial" panose="020B0604020202020204" pitchFamily="34" charset="0"/>
+              <a:buChar char="•"/>
+            </a:pPr>
+            <a:r>
+              <a:rPr lang="en-GB" sz="4000" dirty="0">
+                <a:solidFill>
+                  <a:schemeClr val="bg1"/>
+                </a:solidFill>
+                <a:latin typeface="Open Sans Light" pitchFamily="2" charset="0"/>
+                <a:ea typeface="Open Sans Light" pitchFamily="2" charset="0"/>
+                <a:cs typeface="Open Sans Light" pitchFamily="2" charset="0"/>
+              </a:rPr>
+              <a:t>Employed sentence fusion &amp; attention to enhance sentence representations</a:t>
+            </a:r>
+          </a:p>
+          <a:p>
+            <a:pPr marL="685800" indent="-685800">
+              <a:spcBef>
+                <a:spcPts val="1800"/>
+              </a:spcBef>
+              <a:buFont typeface="Arial" panose="020B0604020202020204" pitchFamily="34" charset="0"/>
+              <a:buChar char="•"/>
+            </a:pPr>
+            <a:r>
+              <a:rPr lang="en-GB" sz="4000" b="1" dirty="0">
+                <a:solidFill>
+                  <a:schemeClr val="bg1"/>
+                </a:solidFill>
+                <a:latin typeface="Open Sans Light" pitchFamily="2" charset="0"/>
+                <a:ea typeface="Open Sans Light" pitchFamily="2" charset="0"/>
+                <a:cs typeface="Open Sans Light" pitchFamily="2" charset="0"/>
+              </a:rPr>
+              <a:t>Method C:</a:t>
+            </a:r>
+            <a:endParaRPr lang="en-GB" sz="4000" dirty="0">
+              <a:solidFill>
+                <a:schemeClr val="bg1"/>
+              </a:solidFill>
+              <a:latin typeface="Open Sans Light" pitchFamily="2" charset="0"/>
+              <a:ea typeface="Open Sans Light" pitchFamily="2" charset="0"/>
+              <a:cs typeface="Open Sans Light" pitchFamily="2" charset="0"/>
+            </a:endParaRPr>
+          </a:p>
+          <a:p>
+            <a:pPr marL="1143000" lvl="1" indent="-685800">
+              <a:spcBef>
+                <a:spcPts val="1800"/>
+              </a:spcBef>
+              <a:buFont typeface="Arial" panose="020B0604020202020204" pitchFamily="34" charset="0"/>
+              <a:buChar char="•"/>
+            </a:pPr>
+            <a:r>
+              <a:rPr lang="en-GB" sz="4000" dirty="0">
+                <a:solidFill>
+                  <a:schemeClr val="bg1"/>
+                </a:solidFill>
+                <a:latin typeface="Open Sans Light" pitchFamily="2" charset="0"/>
+                <a:ea typeface="Open Sans Light" pitchFamily="2" charset="0"/>
+                <a:cs typeface="Open Sans Light" pitchFamily="2" charset="0"/>
+              </a:rPr>
+              <a:t>Finetuned the base </a:t>
+            </a:r>
+            <a:r>
+              <a:rPr lang="en-GB" sz="4000" b="1" dirty="0">
                 <a:solidFill>
                   <a:schemeClr val="bg1"/>
                 </a:solidFill>
@@ -3539,119 +3671,7 @@
               <a:t>ROBERTA</a:t>
             </a:r>
             <a:r>
-              <a:rPr lang="en-GB" sz="4800" dirty="0">
-                <a:solidFill>
-                  <a:schemeClr val="bg1"/>
-                </a:solidFill>
-                <a:latin typeface="Open Sans Light" pitchFamily="2" charset="0"/>
-                <a:ea typeface="Open Sans Light" pitchFamily="2" charset="0"/>
-                <a:cs typeface="Open Sans Light" pitchFamily="2" charset="0"/>
-              </a:rPr>
-              <a:t> embeddings</a:t>
-            </a:r>
-          </a:p>
-          <a:p>
-            <a:pPr marL="1143000" lvl="1" indent="-685800">
-              <a:spcBef>
-                <a:spcPts val="1800"/>
-              </a:spcBef>
-              <a:buFont typeface="Arial" panose="020B0604020202020204" pitchFamily="34" charset="0"/>
-              <a:buChar char="•"/>
-            </a:pPr>
-            <a:r>
-              <a:rPr lang="en-GB" sz="4800" dirty="0">
-                <a:solidFill>
-                  <a:schemeClr val="bg1"/>
-                </a:solidFill>
-                <a:latin typeface="Open Sans Light" pitchFamily="2" charset="0"/>
-                <a:ea typeface="Open Sans Light" pitchFamily="2" charset="0"/>
-                <a:cs typeface="Open Sans Light" pitchFamily="2" charset="0"/>
-              </a:rPr>
-              <a:t>Utilised </a:t>
-            </a:r>
-            <a:r>
-              <a:rPr lang="en-GB" sz="4800" b="1" dirty="0">
-                <a:solidFill>
-                  <a:schemeClr val="bg1"/>
-                </a:solidFill>
-                <a:latin typeface="Open Sans Light" pitchFamily="2" charset="0"/>
-                <a:ea typeface="Open Sans Light" pitchFamily="2" charset="0"/>
-                <a:cs typeface="Open Sans Light" pitchFamily="2" charset="0"/>
-              </a:rPr>
-              <a:t>learning rate scheduling </a:t>
-            </a:r>
-            <a:r>
-              <a:rPr lang="en-GB" sz="4800" dirty="0">
-                <a:solidFill>
-                  <a:schemeClr val="bg1"/>
-                </a:solidFill>
-                <a:latin typeface="Open Sans Light" pitchFamily="2" charset="0"/>
-                <a:ea typeface="Open Sans Light" pitchFamily="2" charset="0"/>
-                <a:cs typeface="Open Sans Light" pitchFamily="2" charset="0"/>
-              </a:rPr>
-              <a:t>to approach a global optimum</a:t>
-            </a:r>
-          </a:p>
-          <a:p>
-            <a:pPr marL="685800" indent="-685800">
-              <a:spcBef>
-                <a:spcPts val="1800"/>
-              </a:spcBef>
-              <a:buFont typeface="Arial" panose="020B0604020202020204" pitchFamily="34" charset="0"/>
-              <a:buChar char="•"/>
-            </a:pPr>
-            <a:r>
-              <a:rPr lang="en-GB" sz="4800" b="1" dirty="0">
-                <a:solidFill>
-                  <a:schemeClr val="bg1"/>
-                </a:solidFill>
-                <a:latin typeface="Open Sans Light" pitchFamily="2" charset="0"/>
-                <a:ea typeface="Open Sans Light" pitchFamily="2" charset="0"/>
-                <a:cs typeface="Open Sans Light" pitchFamily="2" charset="0"/>
-              </a:rPr>
-              <a:t>Method C:</a:t>
-            </a:r>
-            <a:endParaRPr lang="en-GB" sz="4800" dirty="0">
-              <a:solidFill>
-                <a:schemeClr val="bg1"/>
-              </a:solidFill>
-              <a:latin typeface="Open Sans Light" pitchFamily="2" charset="0"/>
-              <a:ea typeface="Open Sans Light" pitchFamily="2" charset="0"/>
-              <a:cs typeface="Open Sans Light" pitchFamily="2" charset="0"/>
-            </a:endParaRPr>
-          </a:p>
-          <a:p>
-            <a:pPr marL="1143000" lvl="1" indent="-685800">
-              <a:spcBef>
-                <a:spcPts val="1800"/>
-              </a:spcBef>
-              <a:buFont typeface="Arial" panose="020B0604020202020204" pitchFamily="34" charset="0"/>
-              <a:buChar char="•"/>
-            </a:pPr>
-            <a:r>
-              <a:rPr lang="en-GB" sz="4800" dirty="0">
-                <a:solidFill>
-                  <a:schemeClr val="bg1"/>
-                </a:solidFill>
-                <a:latin typeface="Open Sans Light" pitchFamily="2" charset="0"/>
-                <a:ea typeface="Open Sans Light" pitchFamily="2" charset="0"/>
-                <a:cs typeface="Open Sans Light" pitchFamily="2" charset="0"/>
-              </a:rPr>
-              <a:t>Finetuned the base </a:t>
-            </a:r>
-            <a:r>
-              <a:rPr lang="en-GB" sz="4800" b="1" dirty="0">
-                <a:solidFill>
-                  <a:schemeClr val="bg1"/>
-                </a:solidFill>
-                <a:latin typeface="Open Sans Light" pitchFamily="2" charset="0"/>
-                <a:ea typeface="Open Sans Light" pitchFamily="2" charset="0"/>
-                <a:cs typeface="Open Sans Light" pitchFamily="2" charset="0"/>
-              </a:rPr>
-              <a:t>ROBERTA</a:t>
-            </a:r>
-            <a:r>
-              <a:rPr lang="en-GB" sz="4800" dirty="0">
+              <a:rPr lang="en-GB" sz="4000" dirty="0">
                 <a:solidFill>
                   <a:schemeClr val="bg1"/>
                 </a:solidFill>
@@ -3671,7 +3691,7 @@
               <a:buChar char="•"/>
             </a:pPr>
             <a:r>
-              <a:rPr lang="en-GB" sz="4800" dirty="0">
+              <a:rPr lang="en-GB" sz="4000" dirty="0">
                 <a:solidFill>
                   <a:schemeClr val="bg1"/>
                 </a:solidFill>
@@ -3682,7 +3702,7 @@
               <a:t>Employed </a:t>
             </a:r>
             <a:r>
-              <a:rPr lang="en-GB" sz="4800" b="1" dirty="0">
+              <a:rPr lang="en-GB" sz="4000" b="1" dirty="0">
                 <a:solidFill>
                   <a:schemeClr val="bg1"/>
                 </a:solidFill>
@@ -3693,7 +3713,7 @@
               <a:t>data augmentation </a:t>
             </a:r>
             <a:r>
-              <a:rPr lang="en-GB" sz="4800" dirty="0">
+              <a:rPr lang="en-GB" sz="4000" dirty="0">
                 <a:solidFill>
                   <a:schemeClr val="bg1"/>
                 </a:solidFill>
@@ -3713,7 +3733,7 @@
               <a:buChar char="•"/>
             </a:pPr>
             <a:r>
-              <a:rPr lang="en-GB" sz="4800" dirty="0">
+              <a:rPr lang="en-GB" sz="4000" dirty="0">
                 <a:solidFill>
                   <a:schemeClr val="bg1"/>
                 </a:solidFill>
@@ -3733,7 +3753,7 @@
               <a:buChar char="•"/>
             </a:pPr>
             <a:r>
-              <a:rPr lang="en-GB" sz="4800" dirty="0">
+              <a:rPr lang="en-GB" sz="4000" dirty="0">
                 <a:solidFill>
                   <a:schemeClr val="bg1"/>
                 </a:solidFill>
@@ -3753,7 +3773,7 @@
               <a:buChar char="•"/>
             </a:pPr>
             <a:r>
-              <a:rPr lang="en-GB" sz="4800" dirty="0">
+              <a:rPr lang="en-GB" sz="4000" dirty="0">
                 <a:solidFill>
                   <a:schemeClr val="bg1"/>
                 </a:solidFill>
@@ -4121,103 +4141,6 @@
           </a:extLst>
         </p:spPr>
       </p:pic>
-      <p:sp>
-        <p:nvSpPr>
-          <p:cNvPr id="14" name="Rectangle: Rounded Corners 13">
-            <a:extLst>
-              <a:ext uri="{FF2B5EF4-FFF2-40B4-BE49-F238E27FC236}">
-                <a16:creationId xmlns:a16="http://schemas.microsoft.com/office/drawing/2014/main" id="{9506BAEF-C630-63EA-6E89-CB8C5A51F7AD}"/>
-              </a:ext>
-            </a:extLst>
-          </p:cNvPr>
-          <p:cNvSpPr/>
-          <p:nvPr/>
-        </p:nvSpPr>
-        <p:spPr>
-          <a:xfrm>
-            <a:off x="15407639" y="3789703"/>
-            <a:ext cx="27782521" cy="12657328"/>
-          </a:xfrm>
-          <a:prstGeom prst="roundRect">
-            <a:avLst>
-              <a:gd name="adj" fmla="val 10428"/>
-            </a:avLst>
-          </a:prstGeom>
-          <a:solidFill>
-            <a:srgbClr val="A799B7"/>
-          </a:solidFill>
-          <a:ln>
-            <a:noFill/>
-          </a:ln>
-        </p:spPr>
-        <p:style>
-          <a:lnRef idx="2">
-            <a:schemeClr val="accent1">
-              <a:shade val="15000"/>
-            </a:schemeClr>
-          </a:lnRef>
-          <a:fillRef idx="1">
-            <a:schemeClr val="accent1"/>
-          </a:fillRef>
-          <a:effectRef idx="0">
-            <a:schemeClr val="accent1"/>
-          </a:effectRef>
-          <a:fontRef idx="minor">
-            <a:schemeClr val="lt1"/>
-          </a:fontRef>
-        </p:style>
-        <p:txBody>
-          <a:bodyPr rtlCol="0" anchor="t"/>
-          <a:lstStyle/>
-          <a:p>
-            <a:pPr algn="ctr"/>
-            <a:r>
-              <a:rPr lang="en-US" sz="6600" dirty="0">
-                <a:solidFill>
-                  <a:srgbClr val="FBD206"/>
-                </a:solidFill>
-                <a:latin typeface="Open Sans SemiBold" pitchFamily="2" charset="0"/>
-                <a:ea typeface="Open Sans SemiBold" pitchFamily="2" charset="0"/>
-                <a:cs typeface="Open Sans SemiBold" pitchFamily="2" charset="0"/>
-              </a:rPr>
-              <a:t>Figures</a:t>
-            </a:r>
-          </a:p>
-          <a:p>
-            <a:pPr algn="ctr"/>
-            <a:r>
-              <a:rPr lang="en-US" sz="6600" dirty="0">
-                <a:solidFill>
-                  <a:schemeClr val="bg1"/>
-                </a:solidFill>
-                <a:latin typeface="Open Sans Light" pitchFamily="2" charset="0"/>
-                <a:ea typeface="Open Sans Light" pitchFamily="2" charset="0"/>
-                <a:cs typeface="Open Sans Light" pitchFamily="2" charset="0"/>
-              </a:rPr>
-              <a:t>input</a:t>
-            </a:r>
-            <a:endParaRPr lang="en-GB" sz="6600" dirty="0">
-              <a:solidFill>
-                <a:schemeClr val="bg1"/>
-              </a:solidFill>
-              <a:latin typeface="Open Sans Light" pitchFamily="2" charset="0"/>
-              <a:ea typeface="Open Sans Light" pitchFamily="2" charset="0"/>
-              <a:cs typeface="Open Sans Light" pitchFamily="2" charset="0"/>
-            </a:endParaRPr>
-          </a:p>
-          <a:p>
-            <a:pPr algn="ctr"/>
-            <a:endParaRPr lang="en-GB" sz="6600" dirty="0">
-              <a:solidFill>
-                <a:srgbClr val="FBD206"/>
-              </a:solidFill>
-              <a:latin typeface="Open Sans Light" pitchFamily="2" charset="0"/>
-              <a:ea typeface="Open Sans Light" pitchFamily="2" charset="0"/>
-              <a:cs typeface="Open Sans Light" pitchFamily="2" charset="0"/>
-            </a:endParaRPr>
-          </a:p>
-        </p:txBody>
-      </p:sp>
       <p:graphicFrame>
         <p:nvGraphicFramePr>
           <p:cNvPr id="15" name="Table 14">
@@ -4233,14 +4156,14 @@
           <p:nvPr>
             <p:extLst>
               <p:ext uri="{D42A27DB-BD31-4B8C-83A1-F6EECF244321}">
-                <p14:modId xmlns:p14="http://schemas.microsoft.com/office/powerpoint/2010/main" val="1295222006"/>
+                <p14:modId xmlns:p14="http://schemas.microsoft.com/office/powerpoint/2010/main" val="275636815"/>
               </p:ext>
             </p:extLst>
           </p:nvPr>
         </p:nvGraphicFramePr>
         <p:xfrm>
-          <a:off x="15407640" y="18448951"/>
-          <a:ext cx="27782521" cy="6103068"/>
+          <a:off x="15407638" y="19084918"/>
+          <a:ext cx="27782521" cy="5954098"/>
         </p:xfrm>
         <a:graphic>
           <a:graphicData uri="http://schemas.openxmlformats.org/drawingml/2006/table">
@@ -4349,7 +4272,7 @@
                     <a:p>
                       <a:pPr algn="ctr"/>
                       <a:r>
-                        <a:rPr lang="en-US" sz="4000" b="0" dirty="0">
+                        <a:rPr lang="en-US" sz="3200" b="0" dirty="0">
                           <a:solidFill>
                             <a:srgbClr val="FBD206"/>
                           </a:solidFill>
@@ -4359,7 +4282,7 @@
                         </a:rPr>
                         <a:t>Method</a:t>
                       </a:r>
-                      <a:endParaRPr lang="en-GB" sz="4000" b="0" dirty="0">
+                      <a:endParaRPr lang="en-GB" sz="3200" b="0" dirty="0">
                         <a:solidFill>
                           <a:srgbClr val="FBD206"/>
                         </a:solidFill>
@@ -4378,7 +4301,7 @@
                     <a:p>
                       <a:pPr algn="ctr" fontAlgn="b"/>
                       <a:r>
-                        <a:rPr lang="en-GB" sz="4000" b="0" i="0" u="none" strike="noStrike" dirty="0">
+                        <a:rPr lang="en-GB" sz="3200" b="0" i="0" u="none" strike="noStrike" dirty="0">
                           <a:solidFill>
                             <a:srgbClr val="FBD206"/>
                           </a:solidFill>
@@ -4400,7 +4323,7 @@
                     <a:p>
                       <a:pPr algn="ctr" fontAlgn="b"/>
                       <a:r>
-                        <a:rPr lang="en-GB" sz="4000" b="0" i="0" u="none" strike="noStrike" dirty="0">
+                        <a:rPr lang="en-GB" sz="3200" b="0" i="0" u="none" strike="noStrike" dirty="0">
                           <a:solidFill>
                             <a:srgbClr val="FBD206"/>
                           </a:solidFill>
@@ -4422,7 +4345,7 @@
                     <a:p>
                       <a:pPr algn="ctr" fontAlgn="b"/>
                       <a:r>
-                        <a:rPr lang="en-GB" sz="4000" b="0" i="0" u="none" strike="noStrike">
+                        <a:rPr lang="en-GB" sz="3200" b="0" i="0" u="none" strike="noStrike">
                           <a:solidFill>
                             <a:srgbClr val="FBD206"/>
                           </a:solidFill>
@@ -4444,7 +4367,7 @@
                     <a:p>
                       <a:pPr algn="ctr" fontAlgn="b"/>
                       <a:r>
-                        <a:rPr lang="en-GB" sz="4000" b="0" i="0" u="none" strike="noStrike" dirty="0">
+                        <a:rPr lang="en-GB" sz="3200" b="0" i="0" u="none" strike="noStrike" dirty="0">
                           <a:solidFill>
                             <a:srgbClr val="FBD206"/>
                           </a:solidFill>
@@ -4466,7 +4389,7 @@
                     <a:p>
                       <a:pPr algn="ctr" fontAlgn="b"/>
                       <a:r>
-                        <a:rPr lang="en-GB" sz="4000" b="0" i="0" u="none" strike="noStrike">
+                        <a:rPr lang="en-GB" sz="3200" b="0" i="0" u="none" strike="noStrike">
                           <a:solidFill>
                             <a:srgbClr val="FBD206"/>
                           </a:solidFill>
@@ -4488,7 +4411,7 @@
                     <a:p>
                       <a:pPr algn="ctr" fontAlgn="b"/>
                       <a:r>
-                        <a:rPr lang="en-GB" sz="4000" b="0" i="0" u="none" strike="noStrike">
+                        <a:rPr lang="en-GB" sz="3200" b="0" i="0" u="none" strike="noStrike">
                           <a:solidFill>
                             <a:srgbClr val="FBD206"/>
                           </a:solidFill>
@@ -4510,7 +4433,7 @@
                     <a:p>
                       <a:pPr algn="ctr" fontAlgn="b"/>
                       <a:r>
-                        <a:rPr lang="en-GB" sz="4000" b="0" i="0" u="none" strike="noStrike">
+                        <a:rPr lang="en-GB" sz="3200" b="0" i="0" u="none" strike="noStrike" dirty="0">
                           <a:solidFill>
                             <a:srgbClr val="FBD206"/>
                           </a:solidFill>
@@ -4532,7 +4455,7 @@
                     <a:p>
                       <a:pPr algn="ctr" fontAlgn="b"/>
                       <a:r>
-                        <a:rPr lang="en-GB" sz="4000" b="0" i="0" u="none" strike="noStrike">
+                        <a:rPr lang="en-GB" sz="3200" b="0" i="0" u="none" strike="noStrike" dirty="0">
                           <a:solidFill>
                             <a:srgbClr val="FBD206"/>
                           </a:solidFill>
@@ -4554,7 +4477,7 @@
                     <a:p>
                       <a:pPr algn="ctr" fontAlgn="b"/>
                       <a:r>
-                        <a:rPr lang="en-GB" sz="4000" b="0" i="0" u="none" strike="noStrike">
+                        <a:rPr lang="en-GB" sz="3200" b="0" i="0" u="none" strike="noStrike" dirty="0">
                           <a:solidFill>
                             <a:srgbClr val="FBD206"/>
                           </a:solidFill>
@@ -4576,7 +4499,7 @@
                     <a:p>
                       <a:pPr algn="ctr" fontAlgn="b"/>
                       <a:r>
-                        <a:rPr lang="en-GB" sz="4000" b="0" i="0" u="none" strike="noStrike">
+                        <a:rPr lang="en-GB" sz="3200" b="0" i="0" u="none" strike="noStrike" dirty="0">
                           <a:solidFill>
                             <a:srgbClr val="FBD206"/>
                           </a:solidFill>
@@ -4598,7 +4521,7 @@
                     <a:p>
                       <a:pPr algn="ctr" fontAlgn="b"/>
                       <a:r>
-                        <a:rPr lang="en-GB" sz="4000" b="0" i="0" u="none" strike="noStrike">
+                        <a:rPr lang="en-GB" sz="3200" b="0" i="0" u="none" strike="noStrike" dirty="0">
                           <a:solidFill>
                             <a:srgbClr val="FBD206"/>
                           </a:solidFill>
@@ -4620,7 +4543,7 @@
                     <a:p>
                       <a:pPr algn="ctr" fontAlgn="b"/>
                       <a:r>
-                        <a:rPr lang="en-GB" sz="4000" b="0" i="0" u="none" strike="noStrike" dirty="0">
+                        <a:rPr lang="en-GB" sz="3200" b="0" i="0" u="none" strike="noStrike" dirty="0">
                           <a:solidFill>
                             <a:srgbClr val="FBD206"/>
                           </a:solidFill>
@@ -5238,6 +5161,1296 @@
                 <a:extLst>
                   <a:ext uri="{0D108BD9-81ED-4DB2-BD59-A6C34878D82A}">
                     <a16:rowId xmlns:a16="http://schemas.microsoft.com/office/drawing/2014/main" val="1894335215"/>
+                  </a:ext>
+                </a:extLst>
+              </a:tr>
+            </a:tbl>
+          </a:graphicData>
+        </a:graphic>
+      </p:graphicFrame>
+      <p:grpSp>
+        <p:nvGrpSpPr>
+          <p:cNvPr id="23" name="Group 22">
+            <a:extLst>
+              <a:ext uri="{FF2B5EF4-FFF2-40B4-BE49-F238E27FC236}">
+                <a16:creationId xmlns:a16="http://schemas.microsoft.com/office/drawing/2014/main" id="{5C4156F8-F4D6-F1FA-32AC-A8811A0D24FE}"/>
+              </a:ext>
+            </a:extLst>
+          </p:cNvPr>
+          <p:cNvGrpSpPr/>
+          <p:nvPr/>
+        </p:nvGrpSpPr>
+        <p:grpSpPr>
+          <a:xfrm>
+            <a:off x="15407639" y="3789703"/>
+            <a:ext cx="27782521" cy="6720008"/>
+            <a:chOff x="15407639" y="3789703"/>
+            <a:chExt cx="27782521" cy="6720008"/>
+          </a:xfrm>
+        </p:grpSpPr>
+        <p:sp>
+          <p:nvSpPr>
+            <p:cNvPr id="14" name="Rectangle: Rounded Corners 13">
+              <a:extLst>
+                <a:ext uri="{FF2B5EF4-FFF2-40B4-BE49-F238E27FC236}">
+                  <a16:creationId xmlns:a16="http://schemas.microsoft.com/office/drawing/2014/main" id="{9506BAEF-C630-63EA-6E89-CB8C5A51F7AD}"/>
+                </a:ext>
+              </a:extLst>
+            </p:cNvPr>
+            <p:cNvSpPr/>
+            <p:nvPr/>
+          </p:nvSpPr>
+          <p:spPr>
+            <a:xfrm>
+              <a:off x="15407639" y="3789703"/>
+              <a:ext cx="27782521" cy="6720008"/>
+            </a:xfrm>
+            <a:prstGeom prst="roundRect">
+              <a:avLst>
+                <a:gd name="adj" fmla="val 10428"/>
+              </a:avLst>
+            </a:prstGeom>
+            <a:solidFill>
+              <a:srgbClr val="A799B7"/>
+            </a:solidFill>
+            <a:ln>
+              <a:noFill/>
+            </a:ln>
+          </p:spPr>
+          <p:style>
+            <a:lnRef idx="2">
+              <a:schemeClr val="accent1">
+                <a:shade val="15000"/>
+              </a:schemeClr>
+            </a:lnRef>
+            <a:fillRef idx="1">
+              <a:schemeClr val="accent1"/>
+            </a:fillRef>
+            <a:effectRef idx="0">
+              <a:schemeClr val="accent1"/>
+            </a:effectRef>
+            <a:fontRef idx="minor">
+              <a:schemeClr val="lt1"/>
+            </a:fontRef>
+          </p:style>
+          <p:txBody>
+            <a:bodyPr rtlCol="0" anchor="t"/>
+            <a:lstStyle/>
+            <a:p>
+              <a:pPr algn="ctr"/>
+              <a:r>
+                <a:rPr lang="en-US" sz="6600" dirty="0">
+                  <a:solidFill>
+                    <a:srgbClr val="FBD206"/>
+                  </a:solidFill>
+                  <a:latin typeface="Open Sans SemiBold" pitchFamily="2" charset="0"/>
+                  <a:ea typeface="Open Sans SemiBold" pitchFamily="2" charset="0"/>
+                  <a:cs typeface="Open Sans SemiBold" pitchFamily="2" charset="0"/>
+                </a:rPr>
+                <a:t>Task B: Figures</a:t>
+              </a:r>
+              <a:endParaRPr lang="en-GB" sz="6600" dirty="0">
+                <a:solidFill>
+                  <a:schemeClr val="bg1"/>
+                </a:solidFill>
+                <a:latin typeface="Open Sans Light" pitchFamily="2" charset="0"/>
+                <a:ea typeface="Open Sans Light" pitchFamily="2" charset="0"/>
+                <a:cs typeface="Open Sans Light" pitchFamily="2" charset="0"/>
+              </a:endParaRPr>
+            </a:p>
+            <a:p>
+              <a:pPr algn="ctr"/>
+              <a:endParaRPr lang="en-GB" sz="6600" dirty="0">
+                <a:solidFill>
+                  <a:srgbClr val="FBD206"/>
+                </a:solidFill>
+                <a:latin typeface="Open Sans Light" pitchFamily="2" charset="0"/>
+                <a:ea typeface="Open Sans Light" pitchFamily="2" charset="0"/>
+                <a:cs typeface="Open Sans Light" pitchFamily="2" charset="0"/>
+              </a:endParaRPr>
+            </a:p>
+          </p:txBody>
+        </p:sp>
+        <p:pic>
+          <p:nvPicPr>
+            <p:cNvPr id="7" name="Picture 6">
+              <a:extLst>
+                <a:ext uri="{FF2B5EF4-FFF2-40B4-BE49-F238E27FC236}">
+                  <a16:creationId xmlns:a16="http://schemas.microsoft.com/office/drawing/2014/main" id="{5ED74926-ACD7-9DEE-96F4-DCAAB5FEE42F}"/>
+                </a:ext>
+              </a:extLst>
+            </p:cNvPr>
+            <p:cNvPicPr>
+              <a:picLocks noChangeAspect="1"/>
+            </p:cNvPicPr>
+            <p:nvPr/>
+          </p:nvPicPr>
+          <p:blipFill>
+            <a:blip r:embed="rId3"/>
+            <a:stretch>
+              <a:fillRect/>
+            </a:stretch>
+          </p:blipFill>
+          <p:spPr>
+            <a:xfrm>
+              <a:off x="15594526" y="5198153"/>
+              <a:ext cx="9460033" cy="4850710"/>
+            </a:xfrm>
+            <a:prstGeom prst="rect">
+              <a:avLst/>
+            </a:prstGeom>
+          </p:spPr>
+        </p:pic>
+        <p:pic>
+          <p:nvPicPr>
+            <p:cNvPr id="17" name="Picture 16">
+              <a:extLst>
+                <a:ext uri="{FF2B5EF4-FFF2-40B4-BE49-F238E27FC236}">
+                  <a16:creationId xmlns:a16="http://schemas.microsoft.com/office/drawing/2014/main" id="{888A0C2E-80D7-37E7-837E-FE0570782601}"/>
+                </a:ext>
+              </a:extLst>
+            </p:cNvPr>
+            <p:cNvPicPr>
+              <a:picLocks noChangeAspect="1"/>
+            </p:cNvPicPr>
+            <p:nvPr/>
+          </p:nvPicPr>
+          <p:blipFill>
+            <a:blip r:embed="rId4"/>
+            <a:stretch>
+              <a:fillRect/>
+            </a:stretch>
+          </p:blipFill>
+          <p:spPr>
+            <a:xfrm>
+              <a:off x="25207082" y="5198152"/>
+              <a:ext cx="6903598" cy="4871327"/>
+            </a:xfrm>
+            <a:prstGeom prst="rect">
+              <a:avLst/>
+            </a:prstGeom>
+          </p:spPr>
+        </p:pic>
+      </p:grpSp>
+      <p:graphicFrame>
+        <p:nvGraphicFramePr>
+          <p:cNvPr id="22" name="Table 21">
+            <a:extLst>
+              <a:ext uri="{FF2B5EF4-FFF2-40B4-BE49-F238E27FC236}">
+                <a16:creationId xmlns:a16="http://schemas.microsoft.com/office/drawing/2014/main" id="{4CADAA73-2C4D-BC9B-06B9-9D166A9F6A40}"/>
+              </a:ext>
+            </a:extLst>
+          </p:cNvPr>
+          <p:cNvGraphicFramePr>
+            <a:graphicFrameLocks noGrp="1"/>
+          </p:cNvGraphicFramePr>
+          <p:nvPr>
+            <p:extLst>
+              <p:ext uri="{D42A27DB-BD31-4B8C-83A1-F6EECF244321}">
+                <p14:modId xmlns:p14="http://schemas.microsoft.com/office/powerpoint/2010/main" val="2035319798"/>
+              </p:ext>
+            </p:extLst>
+          </p:nvPr>
+        </p:nvGraphicFramePr>
+        <p:xfrm>
+          <a:off x="32277972" y="5198152"/>
+          <a:ext cx="10501053" cy="4977799"/>
+        </p:xfrm>
+        <a:graphic>
+          <a:graphicData uri="http://schemas.openxmlformats.org/drawingml/2006/table">
+            <a:tbl>
+              <a:tblPr firstRow="1" bandRow="1">
+                <a:tableStyleId>{5940675A-B579-460E-94D1-54222C63F5DA}</a:tableStyleId>
+              </a:tblPr>
+              <a:tblGrid>
+                <a:gridCol w="3500351">
+                  <a:extLst>
+                    <a:ext uri="{9D8B030D-6E8A-4147-A177-3AD203B41FA5}">
+                      <a16:colId xmlns:a16="http://schemas.microsoft.com/office/drawing/2014/main" val="2074238800"/>
+                    </a:ext>
+                  </a:extLst>
+                </a:gridCol>
+                <a:gridCol w="3500351">
+                  <a:extLst>
+                    <a:ext uri="{9D8B030D-6E8A-4147-A177-3AD203B41FA5}">
+                      <a16:colId xmlns:a16="http://schemas.microsoft.com/office/drawing/2014/main" val="2240268206"/>
+                    </a:ext>
+                  </a:extLst>
+                </a:gridCol>
+                <a:gridCol w="3500351">
+                  <a:extLst>
+                    <a:ext uri="{9D8B030D-6E8A-4147-A177-3AD203B41FA5}">
+                      <a16:colId xmlns:a16="http://schemas.microsoft.com/office/drawing/2014/main" val="3305914191"/>
+                    </a:ext>
+                  </a:extLst>
+                </a:gridCol>
+              </a:tblGrid>
+              <a:tr h="1189687">
+                <a:tc>
+                  <a:txBody>
+                    <a:bodyPr/>
+                    <a:lstStyle/>
+                    <a:p>
+                      <a:pPr algn="ctr"/>
+                      <a:r>
+                        <a:rPr lang="en-US" sz="3200" b="0" dirty="0">
+                          <a:solidFill>
+                            <a:srgbClr val="FBD206"/>
+                          </a:solidFill>
+                          <a:latin typeface="Open Sans SemiBold" pitchFamily="2" charset="0"/>
+                          <a:ea typeface="Open Sans SemiBold" pitchFamily="2" charset="0"/>
+                          <a:cs typeface="Open Sans SemiBold" pitchFamily="2" charset="0"/>
+                        </a:rPr>
+                        <a:t>Loss</a:t>
+                      </a:r>
+                      <a:endParaRPr lang="en-GB" sz="3200" b="0" dirty="0">
+                        <a:solidFill>
+                          <a:srgbClr val="FBD206"/>
+                        </a:solidFill>
+                        <a:latin typeface="Open Sans SemiBold" pitchFamily="2" charset="0"/>
+                        <a:ea typeface="Open Sans SemiBold" pitchFamily="2" charset="0"/>
+                        <a:cs typeface="Open Sans SemiBold" pitchFamily="2" charset="0"/>
+                      </a:endParaRPr>
+                    </a:p>
+                  </a:txBody>
+                  <a:tcPr anchor="ctr"/>
+                </a:tc>
+                <a:tc>
+                  <a:txBody>
+                    <a:bodyPr/>
+                    <a:lstStyle/>
+                    <a:p>
+                      <a:pPr algn="ctr" fontAlgn="b"/>
+                      <a:r>
+                        <a:rPr lang="en-GB" sz="3200" b="0" i="0" u="none" strike="noStrike" dirty="0">
+                          <a:solidFill>
+                            <a:srgbClr val="FBD206"/>
+                          </a:solidFill>
+                          <a:effectLst/>
+                          <a:latin typeface="Open Sans SemiBold" pitchFamily="2" charset="0"/>
+                          <a:ea typeface="Open Sans SemiBold" pitchFamily="2" charset="0"/>
+                          <a:cs typeface="Open Sans SemiBold" pitchFamily="2" charset="0"/>
+                        </a:rPr>
+                        <a:t>Premise</a:t>
+                      </a:r>
+                    </a:p>
+                  </a:txBody>
+                  <a:tcPr marL="7620" marR="7620" marT="7620" marB="0" anchor="ctr"/>
+                </a:tc>
+                <a:tc>
+                  <a:txBody>
+                    <a:bodyPr/>
+                    <a:lstStyle/>
+                    <a:p>
+                      <a:pPr algn="ctr" fontAlgn="b"/>
+                      <a:r>
+                        <a:rPr lang="en-GB" sz="3200" b="0" i="0" u="none" strike="noStrike" dirty="0">
+                          <a:solidFill>
+                            <a:srgbClr val="FBD206"/>
+                          </a:solidFill>
+                          <a:effectLst/>
+                          <a:latin typeface="Open Sans SemiBold" pitchFamily="2" charset="0"/>
+                          <a:ea typeface="Open Sans SemiBold" pitchFamily="2" charset="0"/>
+                          <a:cs typeface="Open Sans SemiBold" pitchFamily="2" charset="0"/>
+                        </a:rPr>
+                        <a:t>Hypothesis</a:t>
+                      </a:r>
+                    </a:p>
+                  </a:txBody>
+                  <a:tcPr marL="7620" marR="7620" marT="7620" marB="0" anchor="ctr"/>
+                </a:tc>
+                <a:extLst>
+                  <a:ext uri="{0D108BD9-81ED-4DB2-BD59-A6C34878D82A}">
+                    <a16:rowId xmlns:a16="http://schemas.microsoft.com/office/drawing/2014/main" val="2616975685"/>
+                  </a:ext>
+                </a:extLst>
+              </a:tr>
+              <a:tr h="947028">
+                <a:tc>
+                  <a:txBody>
+                    <a:bodyPr/>
+                    <a:lstStyle/>
+                    <a:p>
+                      <a:pPr algn="ctr"/>
+                      <a:r>
+                        <a:rPr lang="en-US" sz="3200" dirty="0">
+                          <a:solidFill>
+                            <a:schemeClr val="bg1"/>
+                          </a:solidFill>
+                          <a:latin typeface="Open Sans Light" pitchFamily="2" charset="0"/>
+                          <a:ea typeface="Open Sans Light" pitchFamily="2" charset="0"/>
+                          <a:cs typeface="Open Sans Light" pitchFamily="2" charset="0"/>
+                        </a:rPr>
+                        <a:t>4</a:t>
+                      </a:r>
+                      <a:endParaRPr lang="en-GB" sz="3200" dirty="0">
+                        <a:solidFill>
+                          <a:schemeClr val="bg1"/>
+                        </a:solidFill>
+                        <a:latin typeface="Open Sans Light" pitchFamily="2" charset="0"/>
+                        <a:ea typeface="Open Sans Light" pitchFamily="2" charset="0"/>
+                        <a:cs typeface="Open Sans Light" pitchFamily="2" charset="0"/>
+                      </a:endParaRPr>
+                    </a:p>
+                  </a:txBody>
+                  <a:tcPr anchor="ctr"/>
+                </a:tc>
+                <a:tc>
+                  <a:txBody>
+                    <a:bodyPr/>
+                    <a:lstStyle/>
+                    <a:p>
+                      <a:pPr algn="l" fontAlgn="b"/>
+                      <a:r>
+                        <a:rPr lang="en-US" sz="3200" b="0" i="0" u="none" strike="noStrike" dirty="0">
+                          <a:solidFill>
+                            <a:schemeClr val="bg1"/>
+                          </a:solidFill>
+                          <a:effectLst/>
+                          <a:latin typeface="Open Sans Light" pitchFamily="2" charset="0"/>
+                          <a:ea typeface="Open Sans Light" pitchFamily="2" charset="0"/>
+                          <a:cs typeface="Open Sans Light" pitchFamily="2" charset="0"/>
+                        </a:rPr>
+                        <a:t>p</a:t>
+                      </a:r>
+                      <a:r>
+                        <a:rPr lang="en-GB" sz="3200" b="0" i="0" u="none" strike="noStrike" dirty="0">
+                          <a:solidFill>
+                            <a:schemeClr val="bg1"/>
+                          </a:solidFill>
+                          <a:effectLst/>
+                          <a:latin typeface="Open Sans Light" pitchFamily="2" charset="0"/>
+                          <a:ea typeface="Open Sans Light" pitchFamily="2" charset="0"/>
+                          <a:cs typeface="Open Sans Light" pitchFamily="2" charset="0"/>
+                        </a:rPr>
+                        <a:t>remise1</a:t>
+                      </a:r>
+                    </a:p>
+                  </a:txBody>
+                  <a:tcPr marL="9525" marR="9525" marT="9525" marB="0" anchor="ctr"/>
+                </a:tc>
+                <a:tc>
+                  <a:txBody>
+                    <a:bodyPr/>
+                    <a:lstStyle/>
+                    <a:p>
+                      <a:pPr algn="l" fontAlgn="b"/>
+                      <a:r>
+                        <a:rPr lang="en-GB" sz="3200" b="0" i="0" u="none" strike="noStrike" dirty="0">
+                          <a:solidFill>
+                            <a:schemeClr val="bg1"/>
+                          </a:solidFill>
+                          <a:effectLst/>
+                          <a:latin typeface="Open Sans Light" pitchFamily="2" charset="0"/>
+                          <a:ea typeface="Open Sans Light" pitchFamily="2" charset="0"/>
+                          <a:cs typeface="Open Sans Light" pitchFamily="2" charset="0"/>
+                        </a:rPr>
+                        <a:t>hypothesis1</a:t>
+                      </a:r>
+                    </a:p>
+                  </a:txBody>
+                  <a:tcPr marL="9525" marR="9525" marT="9525" marB="0" anchor="ctr"/>
+                </a:tc>
+                <a:extLst>
+                  <a:ext uri="{0D108BD9-81ED-4DB2-BD59-A6C34878D82A}">
+                    <a16:rowId xmlns:a16="http://schemas.microsoft.com/office/drawing/2014/main" val="1005609488"/>
+                  </a:ext>
+                </a:extLst>
+              </a:tr>
+              <a:tr h="947028">
+                <a:tc>
+                  <a:txBody>
+                    <a:bodyPr/>
+                    <a:lstStyle/>
+                    <a:p>
+                      <a:pPr algn="ctr"/>
+                      <a:r>
+                        <a:rPr lang="en-US" sz="3200" dirty="0">
+                          <a:solidFill>
+                            <a:schemeClr val="bg1"/>
+                          </a:solidFill>
+                          <a:latin typeface="Open Sans Light" pitchFamily="2" charset="0"/>
+                          <a:ea typeface="Open Sans Light" pitchFamily="2" charset="0"/>
+                          <a:cs typeface="Open Sans Light" pitchFamily="2" charset="0"/>
+                        </a:rPr>
+                        <a:t>3</a:t>
+                      </a:r>
+                      <a:endParaRPr lang="en-GB" sz="3200" dirty="0">
+                        <a:solidFill>
+                          <a:schemeClr val="bg1"/>
+                        </a:solidFill>
+                        <a:latin typeface="Open Sans Light" pitchFamily="2" charset="0"/>
+                        <a:ea typeface="Open Sans Light" pitchFamily="2" charset="0"/>
+                        <a:cs typeface="Open Sans Light" pitchFamily="2" charset="0"/>
+                      </a:endParaRPr>
+                    </a:p>
+                  </a:txBody>
+                  <a:tcPr anchor="ctr"/>
+                </a:tc>
+                <a:tc>
+                  <a:txBody>
+                    <a:bodyPr/>
+                    <a:lstStyle/>
+                    <a:p>
+                      <a:pPr algn="l" fontAlgn="b"/>
+                      <a:r>
+                        <a:rPr lang="en-GB" sz="3200" b="0" i="0" u="none" strike="noStrike" dirty="0">
+                          <a:solidFill>
+                            <a:schemeClr val="bg1"/>
+                          </a:solidFill>
+                          <a:effectLst/>
+                          <a:latin typeface="Open Sans Light" pitchFamily="2" charset="0"/>
+                          <a:ea typeface="Open Sans Light" pitchFamily="2" charset="0"/>
+                          <a:cs typeface="Open Sans Light" pitchFamily="2" charset="0"/>
+                        </a:rPr>
+                        <a:t>Premise2</a:t>
+                      </a:r>
+                    </a:p>
+                  </a:txBody>
+                  <a:tcPr marL="9525" marR="9525" marT="9525" marB="0" anchor="ctr"/>
+                </a:tc>
+                <a:tc>
+                  <a:txBody>
+                    <a:bodyPr/>
+                    <a:lstStyle/>
+                    <a:p>
+                      <a:pPr algn="l" fontAlgn="b"/>
+                      <a:r>
+                        <a:rPr lang="en-GB" sz="3200" b="0" i="0" u="none" strike="noStrike" dirty="0">
+                          <a:solidFill>
+                            <a:schemeClr val="bg1"/>
+                          </a:solidFill>
+                          <a:effectLst/>
+                          <a:latin typeface="Open Sans Light" pitchFamily="2" charset="0"/>
+                          <a:ea typeface="Open Sans Light" pitchFamily="2" charset="0"/>
+                          <a:cs typeface="Open Sans Light" pitchFamily="2" charset="0"/>
+                        </a:rPr>
+                        <a:t>Hypothesis2</a:t>
+                      </a:r>
+                    </a:p>
+                  </a:txBody>
+                  <a:tcPr marL="9525" marR="9525" marT="9525" marB="0" anchor="ctr"/>
+                </a:tc>
+                <a:extLst>
+                  <a:ext uri="{0D108BD9-81ED-4DB2-BD59-A6C34878D82A}">
+                    <a16:rowId xmlns:a16="http://schemas.microsoft.com/office/drawing/2014/main" val="1894335215"/>
+                  </a:ext>
+                </a:extLst>
+              </a:tr>
+              <a:tr h="947028">
+                <a:tc>
+                  <a:txBody>
+                    <a:bodyPr/>
+                    <a:lstStyle/>
+                    <a:p>
+                      <a:pPr algn="ctr"/>
+                      <a:r>
+                        <a:rPr lang="en-US" sz="3200" dirty="0">
+                          <a:solidFill>
+                            <a:schemeClr val="bg1"/>
+                          </a:solidFill>
+                          <a:latin typeface="Open Sans Light" pitchFamily="2" charset="0"/>
+                          <a:ea typeface="Open Sans Light" pitchFamily="2" charset="0"/>
+                          <a:cs typeface="Open Sans Light" pitchFamily="2" charset="0"/>
+                        </a:rPr>
+                        <a:t>2</a:t>
+                      </a:r>
+                      <a:endParaRPr lang="en-GB" sz="3200" dirty="0">
+                        <a:solidFill>
+                          <a:schemeClr val="bg1"/>
+                        </a:solidFill>
+                        <a:latin typeface="Open Sans Light" pitchFamily="2" charset="0"/>
+                        <a:ea typeface="Open Sans Light" pitchFamily="2" charset="0"/>
+                        <a:cs typeface="Open Sans Light" pitchFamily="2" charset="0"/>
+                      </a:endParaRPr>
+                    </a:p>
+                  </a:txBody>
+                  <a:tcPr anchor="ctr"/>
+                </a:tc>
+                <a:tc>
+                  <a:txBody>
+                    <a:bodyPr/>
+                    <a:lstStyle/>
+                    <a:p>
+                      <a:pPr algn="l" fontAlgn="b"/>
+                      <a:r>
+                        <a:rPr lang="en-US" sz="3200" b="0" i="0" u="none" strike="noStrike" dirty="0">
+                          <a:solidFill>
+                            <a:schemeClr val="bg1"/>
+                          </a:solidFill>
+                          <a:effectLst/>
+                          <a:latin typeface="Open Sans Light" pitchFamily="2" charset="0"/>
+                          <a:ea typeface="Open Sans Light" pitchFamily="2" charset="0"/>
+                          <a:cs typeface="Open Sans Light" pitchFamily="2" charset="0"/>
+                        </a:rPr>
+                        <a:t>P</a:t>
+                      </a:r>
+                      <a:r>
+                        <a:rPr lang="en-GB" sz="3200" b="0" i="0" u="none" strike="noStrike" dirty="0">
+                          <a:solidFill>
+                            <a:schemeClr val="bg1"/>
+                          </a:solidFill>
+                          <a:effectLst/>
+                          <a:latin typeface="Open Sans Light" pitchFamily="2" charset="0"/>
+                          <a:ea typeface="Open Sans Light" pitchFamily="2" charset="0"/>
+                          <a:cs typeface="Open Sans Light" pitchFamily="2" charset="0"/>
+                        </a:rPr>
+                        <a:t>remise3</a:t>
+                      </a:r>
+                    </a:p>
+                  </a:txBody>
+                  <a:tcPr marL="9525" marR="9525" marT="9525" marB="0" anchor="ctr"/>
+                </a:tc>
+                <a:tc>
+                  <a:txBody>
+                    <a:bodyPr/>
+                    <a:lstStyle/>
+                    <a:p>
+                      <a:pPr algn="l" fontAlgn="b"/>
+                      <a:r>
+                        <a:rPr lang="en-GB" sz="3200" b="0" i="0" u="none" strike="noStrike" dirty="0">
+                          <a:solidFill>
+                            <a:schemeClr val="bg1"/>
+                          </a:solidFill>
+                          <a:effectLst/>
+                          <a:latin typeface="Open Sans Light" pitchFamily="2" charset="0"/>
+                          <a:ea typeface="Open Sans Light" pitchFamily="2" charset="0"/>
+                          <a:cs typeface="Open Sans Light" pitchFamily="2" charset="0"/>
+                        </a:rPr>
+                        <a:t>Hypothesis3</a:t>
+                      </a:r>
+                    </a:p>
+                  </a:txBody>
+                  <a:tcPr marL="9525" marR="9525" marT="9525" marB="0" anchor="ctr"/>
+                </a:tc>
+                <a:extLst>
+                  <a:ext uri="{0D108BD9-81ED-4DB2-BD59-A6C34878D82A}">
+                    <a16:rowId xmlns:a16="http://schemas.microsoft.com/office/drawing/2014/main" val="2766742310"/>
+                  </a:ext>
+                </a:extLst>
+              </a:tr>
+              <a:tr h="947028">
+                <a:tc>
+                  <a:txBody>
+                    <a:bodyPr/>
+                    <a:lstStyle/>
+                    <a:p>
+                      <a:pPr algn="ctr"/>
+                      <a:r>
+                        <a:rPr lang="en-US" sz="3200" dirty="0">
+                          <a:solidFill>
+                            <a:schemeClr val="bg1"/>
+                          </a:solidFill>
+                          <a:latin typeface="Open Sans Light" pitchFamily="2" charset="0"/>
+                          <a:ea typeface="Open Sans Light" pitchFamily="2" charset="0"/>
+                          <a:cs typeface="Open Sans Light" pitchFamily="2" charset="0"/>
+                        </a:rPr>
+                        <a:t>1</a:t>
+                      </a:r>
+                      <a:endParaRPr lang="en-GB" sz="3200" dirty="0">
+                        <a:solidFill>
+                          <a:schemeClr val="bg1"/>
+                        </a:solidFill>
+                        <a:latin typeface="Open Sans Light" pitchFamily="2" charset="0"/>
+                        <a:ea typeface="Open Sans Light" pitchFamily="2" charset="0"/>
+                        <a:cs typeface="Open Sans Light" pitchFamily="2" charset="0"/>
+                      </a:endParaRPr>
+                    </a:p>
+                  </a:txBody>
+                  <a:tcPr anchor="ctr"/>
+                </a:tc>
+                <a:tc>
+                  <a:txBody>
+                    <a:bodyPr/>
+                    <a:lstStyle/>
+                    <a:p>
+                      <a:pPr algn="l" fontAlgn="b"/>
+                      <a:r>
+                        <a:rPr lang="en-GB" sz="3200" b="0" i="0" u="none" strike="noStrike" dirty="0">
+                          <a:solidFill>
+                            <a:schemeClr val="bg1"/>
+                          </a:solidFill>
+                          <a:effectLst/>
+                          <a:latin typeface="Open Sans Light" pitchFamily="2" charset="0"/>
+                          <a:ea typeface="Open Sans Light" pitchFamily="2" charset="0"/>
+                          <a:cs typeface="Open Sans Light" pitchFamily="2" charset="0"/>
+                        </a:rPr>
+                        <a:t>premise4</a:t>
+                      </a:r>
+                    </a:p>
+                  </a:txBody>
+                  <a:tcPr marL="9525" marR="9525" marT="9525" marB="0" anchor="ctr"/>
+                </a:tc>
+                <a:tc>
+                  <a:txBody>
+                    <a:bodyPr/>
+                    <a:lstStyle/>
+                    <a:p>
+                      <a:pPr algn="l" fontAlgn="b"/>
+                      <a:r>
+                        <a:rPr lang="en-GB" sz="3200" b="0" i="0" u="none" strike="noStrike" dirty="0">
+                          <a:solidFill>
+                            <a:schemeClr val="bg1"/>
+                          </a:solidFill>
+                          <a:effectLst/>
+                          <a:latin typeface="Open Sans Light" pitchFamily="2" charset="0"/>
+                          <a:ea typeface="Open Sans Light" pitchFamily="2" charset="0"/>
+                          <a:cs typeface="Open Sans Light" pitchFamily="2" charset="0"/>
+                        </a:rPr>
+                        <a:t>hypothesis4</a:t>
+                      </a:r>
+                    </a:p>
+                  </a:txBody>
+                  <a:tcPr marL="9525" marR="9525" marT="9525" marB="0" anchor="ctr"/>
+                </a:tc>
+                <a:extLst>
+                  <a:ext uri="{0D108BD9-81ED-4DB2-BD59-A6C34878D82A}">
+                    <a16:rowId xmlns:a16="http://schemas.microsoft.com/office/drawing/2014/main" val="4232742880"/>
+                  </a:ext>
+                </a:extLst>
+              </a:tr>
+            </a:tbl>
+          </a:graphicData>
+        </a:graphic>
+      </p:graphicFrame>
+      <p:grpSp>
+        <p:nvGrpSpPr>
+          <p:cNvPr id="3" name="Group 2">
+            <a:extLst>
+              <a:ext uri="{FF2B5EF4-FFF2-40B4-BE49-F238E27FC236}">
+                <a16:creationId xmlns:a16="http://schemas.microsoft.com/office/drawing/2014/main" id="{CEFC9DF5-7E6F-8BFE-39BA-4EF86F54EE8B}"/>
+              </a:ext>
+            </a:extLst>
+          </p:cNvPr>
+          <p:cNvGrpSpPr/>
+          <p:nvPr/>
+        </p:nvGrpSpPr>
+        <p:grpSpPr>
+          <a:xfrm>
+            <a:off x="15351338" y="10701249"/>
+            <a:ext cx="27782521" cy="6720008"/>
+            <a:chOff x="15407639" y="3789703"/>
+            <a:chExt cx="27782521" cy="6720008"/>
+          </a:xfrm>
+        </p:grpSpPr>
+        <p:sp>
+          <p:nvSpPr>
+            <p:cNvPr id="6" name="Rectangle: Rounded Corners 5">
+              <a:extLst>
+                <a:ext uri="{FF2B5EF4-FFF2-40B4-BE49-F238E27FC236}">
+                  <a16:creationId xmlns:a16="http://schemas.microsoft.com/office/drawing/2014/main" id="{C18D1764-DEC6-08A2-1CE8-A0FA70C0F3C5}"/>
+                </a:ext>
+              </a:extLst>
+            </p:cNvPr>
+            <p:cNvSpPr/>
+            <p:nvPr/>
+          </p:nvSpPr>
+          <p:spPr>
+            <a:xfrm>
+              <a:off x="15407639" y="3789703"/>
+              <a:ext cx="27782521" cy="6720008"/>
+            </a:xfrm>
+            <a:prstGeom prst="roundRect">
+              <a:avLst>
+                <a:gd name="adj" fmla="val 10428"/>
+              </a:avLst>
+            </a:prstGeom>
+            <a:solidFill>
+              <a:srgbClr val="A799B7"/>
+            </a:solidFill>
+            <a:ln>
+              <a:noFill/>
+            </a:ln>
+          </p:spPr>
+          <p:style>
+            <a:lnRef idx="2">
+              <a:schemeClr val="accent1">
+                <a:shade val="15000"/>
+              </a:schemeClr>
+            </a:lnRef>
+            <a:fillRef idx="1">
+              <a:schemeClr val="accent1"/>
+            </a:fillRef>
+            <a:effectRef idx="0">
+              <a:schemeClr val="accent1"/>
+            </a:effectRef>
+            <a:fontRef idx="minor">
+              <a:schemeClr val="lt1"/>
+            </a:fontRef>
+          </p:style>
+          <p:txBody>
+            <a:bodyPr rtlCol="0" anchor="t"/>
+            <a:lstStyle/>
+            <a:p>
+              <a:pPr algn="ctr"/>
+              <a:r>
+                <a:rPr lang="en-US" sz="6600" dirty="0">
+                  <a:solidFill>
+                    <a:srgbClr val="FBD206"/>
+                  </a:solidFill>
+                  <a:latin typeface="Open Sans SemiBold" pitchFamily="2" charset="0"/>
+                  <a:ea typeface="Open Sans SemiBold" pitchFamily="2" charset="0"/>
+                  <a:cs typeface="Open Sans SemiBold" pitchFamily="2" charset="0"/>
+                </a:rPr>
+                <a:t>Task C: Figures</a:t>
+              </a:r>
+              <a:endParaRPr lang="en-GB" sz="6600" dirty="0">
+                <a:solidFill>
+                  <a:schemeClr val="bg1"/>
+                </a:solidFill>
+                <a:latin typeface="Open Sans Light" pitchFamily="2" charset="0"/>
+                <a:ea typeface="Open Sans Light" pitchFamily="2" charset="0"/>
+                <a:cs typeface="Open Sans Light" pitchFamily="2" charset="0"/>
+              </a:endParaRPr>
+            </a:p>
+            <a:p>
+              <a:pPr algn="ctr"/>
+              <a:endParaRPr lang="en-GB" sz="6600" dirty="0">
+                <a:solidFill>
+                  <a:srgbClr val="FBD206"/>
+                </a:solidFill>
+                <a:latin typeface="Open Sans Light" pitchFamily="2" charset="0"/>
+                <a:ea typeface="Open Sans Light" pitchFamily="2" charset="0"/>
+                <a:cs typeface="Open Sans Light" pitchFamily="2" charset="0"/>
+              </a:endParaRPr>
+            </a:p>
+          </p:txBody>
+        </p:sp>
+        <p:pic>
+          <p:nvPicPr>
+            <p:cNvPr id="10" name="Picture 9">
+              <a:extLst>
+                <a:ext uri="{FF2B5EF4-FFF2-40B4-BE49-F238E27FC236}">
+                  <a16:creationId xmlns:a16="http://schemas.microsoft.com/office/drawing/2014/main" id="{AB5CDD09-A021-E74D-299D-8D6A72C112AD}"/>
+                </a:ext>
+              </a:extLst>
+            </p:cNvPr>
+            <p:cNvPicPr>
+              <a:picLocks noChangeAspect="1"/>
+            </p:cNvPicPr>
+            <p:nvPr/>
+          </p:nvPicPr>
+          <p:blipFill>
+            <a:blip r:embed="rId3"/>
+            <a:stretch>
+              <a:fillRect/>
+            </a:stretch>
+          </p:blipFill>
+          <p:spPr>
+            <a:xfrm>
+              <a:off x="15594526" y="5198153"/>
+              <a:ext cx="9460033" cy="4850710"/>
+            </a:xfrm>
+            <a:prstGeom prst="rect">
+              <a:avLst/>
+            </a:prstGeom>
+          </p:spPr>
+        </p:pic>
+        <p:pic>
+          <p:nvPicPr>
+            <p:cNvPr id="16" name="Picture 15">
+              <a:extLst>
+                <a:ext uri="{FF2B5EF4-FFF2-40B4-BE49-F238E27FC236}">
+                  <a16:creationId xmlns:a16="http://schemas.microsoft.com/office/drawing/2014/main" id="{5F1ACB40-71DE-CC4D-8892-13703C4CDF88}"/>
+                </a:ext>
+              </a:extLst>
+            </p:cNvPr>
+            <p:cNvPicPr>
+              <a:picLocks noChangeAspect="1"/>
+            </p:cNvPicPr>
+            <p:nvPr/>
+          </p:nvPicPr>
+          <p:blipFill>
+            <a:blip r:embed="rId4"/>
+            <a:stretch>
+              <a:fillRect/>
+            </a:stretch>
+          </p:blipFill>
+          <p:spPr>
+            <a:xfrm>
+              <a:off x="25207082" y="5198152"/>
+              <a:ext cx="6903598" cy="4871327"/>
+            </a:xfrm>
+            <a:prstGeom prst="rect">
+              <a:avLst/>
+            </a:prstGeom>
+          </p:spPr>
+        </p:pic>
+      </p:grpSp>
+      <p:graphicFrame>
+        <p:nvGraphicFramePr>
+          <p:cNvPr id="18" name="Table 17">
+            <a:extLst>
+              <a:ext uri="{FF2B5EF4-FFF2-40B4-BE49-F238E27FC236}">
+                <a16:creationId xmlns:a16="http://schemas.microsoft.com/office/drawing/2014/main" id="{83D14E49-C22F-1D62-4F05-68F044F9C4DD}"/>
+              </a:ext>
+            </a:extLst>
+          </p:cNvPr>
+          <p:cNvGraphicFramePr>
+            <a:graphicFrameLocks noGrp="1"/>
+          </p:cNvGraphicFramePr>
+          <p:nvPr>
+            <p:extLst>
+              <p:ext uri="{D42A27DB-BD31-4B8C-83A1-F6EECF244321}">
+                <p14:modId xmlns:p14="http://schemas.microsoft.com/office/powerpoint/2010/main" val="2869282001"/>
+              </p:ext>
+            </p:extLst>
+          </p:nvPr>
+        </p:nvGraphicFramePr>
+        <p:xfrm>
+          <a:off x="32277971" y="12137401"/>
+          <a:ext cx="10501053" cy="4977799"/>
+        </p:xfrm>
+        <a:graphic>
+          <a:graphicData uri="http://schemas.openxmlformats.org/drawingml/2006/table">
+            <a:tbl>
+              <a:tblPr firstRow="1" bandRow="1">
+                <a:tableStyleId>{5940675A-B579-460E-94D1-54222C63F5DA}</a:tableStyleId>
+              </a:tblPr>
+              <a:tblGrid>
+                <a:gridCol w="3500351">
+                  <a:extLst>
+                    <a:ext uri="{9D8B030D-6E8A-4147-A177-3AD203B41FA5}">
+                      <a16:colId xmlns:a16="http://schemas.microsoft.com/office/drawing/2014/main" val="2074238800"/>
+                    </a:ext>
+                  </a:extLst>
+                </a:gridCol>
+                <a:gridCol w="3500351">
+                  <a:extLst>
+                    <a:ext uri="{9D8B030D-6E8A-4147-A177-3AD203B41FA5}">
+                      <a16:colId xmlns:a16="http://schemas.microsoft.com/office/drawing/2014/main" val="2240268206"/>
+                    </a:ext>
+                  </a:extLst>
+                </a:gridCol>
+                <a:gridCol w="3500351">
+                  <a:extLst>
+                    <a:ext uri="{9D8B030D-6E8A-4147-A177-3AD203B41FA5}">
+                      <a16:colId xmlns:a16="http://schemas.microsoft.com/office/drawing/2014/main" val="3305914191"/>
+                    </a:ext>
+                  </a:extLst>
+                </a:gridCol>
+              </a:tblGrid>
+              <a:tr h="1189687">
+                <a:tc>
+                  <a:txBody>
+                    <a:bodyPr/>
+                    <a:lstStyle/>
+                    <a:p>
+                      <a:pPr algn="ctr"/>
+                      <a:r>
+                        <a:rPr lang="en-US" sz="3200" b="0" dirty="0">
+                          <a:solidFill>
+                            <a:srgbClr val="FBD206"/>
+                          </a:solidFill>
+                          <a:latin typeface="Open Sans SemiBold" pitchFamily="2" charset="0"/>
+                          <a:ea typeface="Open Sans SemiBold" pitchFamily="2" charset="0"/>
+                          <a:cs typeface="Open Sans SemiBold" pitchFamily="2" charset="0"/>
+                        </a:rPr>
+                        <a:t>Loss</a:t>
+                      </a:r>
+                      <a:endParaRPr lang="en-GB" sz="3200" b="0" dirty="0">
+                        <a:solidFill>
+                          <a:srgbClr val="FBD206"/>
+                        </a:solidFill>
+                        <a:latin typeface="Open Sans SemiBold" pitchFamily="2" charset="0"/>
+                        <a:ea typeface="Open Sans SemiBold" pitchFamily="2" charset="0"/>
+                        <a:cs typeface="Open Sans SemiBold" pitchFamily="2" charset="0"/>
+                      </a:endParaRPr>
+                    </a:p>
+                  </a:txBody>
+                  <a:tcPr anchor="ctr"/>
+                </a:tc>
+                <a:tc>
+                  <a:txBody>
+                    <a:bodyPr/>
+                    <a:lstStyle/>
+                    <a:p>
+                      <a:pPr algn="ctr" fontAlgn="b"/>
+                      <a:r>
+                        <a:rPr lang="en-GB" sz="3200" b="0" i="0" u="none" strike="noStrike" dirty="0">
+                          <a:solidFill>
+                            <a:srgbClr val="FBD206"/>
+                          </a:solidFill>
+                          <a:effectLst/>
+                          <a:latin typeface="Open Sans SemiBold" pitchFamily="2" charset="0"/>
+                          <a:ea typeface="Open Sans SemiBold" pitchFamily="2" charset="0"/>
+                          <a:cs typeface="Open Sans SemiBold" pitchFamily="2" charset="0"/>
+                        </a:rPr>
+                        <a:t>Premise</a:t>
+                      </a:r>
+                    </a:p>
+                  </a:txBody>
+                  <a:tcPr marL="7620" marR="7620" marT="7620" marB="0" anchor="ctr"/>
+                </a:tc>
+                <a:tc>
+                  <a:txBody>
+                    <a:bodyPr/>
+                    <a:lstStyle/>
+                    <a:p>
+                      <a:pPr algn="ctr" fontAlgn="b"/>
+                      <a:r>
+                        <a:rPr lang="en-GB" sz="3200" b="0" i="0" u="none" strike="noStrike" dirty="0">
+                          <a:solidFill>
+                            <a:srgbClr val="FBD206"/>
+                          </a:solidFill>
+                          <a:effectLst/>
+                          <a:latin typeface="Open Sans SemiBold" pitchFamily="2" charset="0"/>
+                          <a:ea typeface="Open Sans SemiBold" pitchFamily="2" charset="0"/>
+                          <a:cs typeface="Open Sans SemiBold" pitchFamily="2" charset="0"/>
+                        </a:rPr>
+                        <a:t>Hypothesis</a:t>
+                      </a:r>
+                    </a:p>
+                  </a:txBody>
+                  <a:tcPr marL="7620" marR="7620" marT="7620" marB="0" anchor="ctr"/>
+                </a:tc>
+                <a:extLst>
+                  <a:ext uri="{0D108BD9-81ED-4DB2-BD59-A6C34878D82A}">
+                    <a16:rowId xmlns:a16="http://schemas.microsoft.com/office/drawing/2014/main" val="2616975685"/>
+                  </a:ext>
+                </a:extLst>
+              </a:tr>
+              <a:tr h="947028">
+                <a:tc>
+                  <a:txBody>
+                    <a:bodyPr/>
+                    <a:lstStyle/>
+                    <a:p>
+                      <a:pPr algn="ctr"/>
+                      <a:r>
+                        <a:rPr lang="en-US" sz="3200" dirty="0">
+                          <a:solidFill>
+                            <a:schemeClr val="bg1"/>
+                          </a:solidFill>
+                          <a:latin typeface="Open Sans Light" pitchFamily="2" charset="0"/>
+                          <a:ea typeface="Open Sans Light" pitchFamily="2" charset="0"/>
+                          <a:cs typeface="Open Sans Light" pitchFamily="2" charset="0"/>
+                        </a:rPr>
+                        <a:t>4</a:t>
+                      </a:r>
+                      <a:endParaRPr lang="en-GB" sz="3200" dirty="0">
+                        <a:solidFill>
+                          <a:schemeClr val="bg1"/>
+                        </a:solidFill>
+                        <a:latin typeface="Open Sans Light" pitchFamily="2" charset="0"/>
+                        <a:ea typeface="Open Sans Light" pitchFamily="2" charset="0"/>
+                        <a:cs typeface="Open Sans Light" pitchFamily="2" charset="0"/>
+                      </a:endParaRPr>
+                    </a:p>
+                  </a:txBody>
+                  <a:tcPr anchor="ctr"/>
+                </a:tc>
+                <a:tc>
+                  <a:txBody>
+                    <a:bodyPr/>
+                    <a:lstStyle/>
+                    <a:p>
+                      <a:pPr algn="l" fontAlgn="b"/>
+                      <a:r>
+                        <a:rPr lang="en-US" sz="3200" b="0" i="0" u="none" strike="noStrike" dirty="0">
+                          <a:solidFill>
+                            <a:schemeClr val="bg1"/>
+                          </a:solidFill>
+                          <a:effectLst/>
+                          <a:latin typeface="Open Sans Light" pitchFamily="2" charset="0"/>
+                          <a:ea typeface="Open Sans Light" pitchFamily="2" charset="0"/>
+                          <a:cs typeface="Open Sans Light" pitchFamily="2" charset="0"/>
+                        </a:rPr>
+                        <a:t>p</a:t>
+                      </a:r>
+                      <a:r>
+                        <a:rPr lang="en-GB" sz="3200" b="0" i="0" u="none" strike="noStrike" dirty="0">
+                          <a:solidFill>
+                            <a:schemeClr val="bg1"/>
+                          </a:solidFill>
+                          <a:effectLst/>
+                          <a:latin typeface="Open Sans Light" pitchFamily="2" charset="0"/>
+                          <a:ea typeface="Open Sans Light" pitchFamily="2" charset="0"/>
+                          <a:cs typeface="Open Sans Light" pitchFamily="2" charset="0"/>
+                        </a:rPr>
+                        <a:t>remise1</a:t>
+                      </a:r>
+                    </a:p>
+                  </a:txBody>
+                  <a:tcPr marL="9525" marR="9525" marT="9525" marB="0" anchor="ctr"/>
+                </a:tc>
+                <a:tc>
+                  <a:txBody>
+                    <a:bodyPr/>
+                    <a:lstStyle/>
+                    <a:p>
+                      <a:pPr algn="l" fontAlgn="b"/>
+                      <a:r>
+                        <a:rPr lang="en-GB" sz="3200" b="0" i="0" u="none" strike="noStrike" dirty="0">
+                          <a:solidFill>
+                            <a:schemeClr val="bg1"/>
+                          </a:solidFill>
+                          <a:effectLst/>
+                          <a:latin typeface="Open Sans Light" pitchFamily="2" charset="0"/>
+                          <a:ea typeface="Open Sans Light" pitchFamily="2" charset="0"/>
+                          <a:cs typeface="Open Sans Light" pitchFamily="2" charset="0"/>
+                        </a:rPr>
+                        <a:t>hypothesis1</a:t>
+                      </a:r>
+                    </a:p>
+                  </a:txBody>
+                  <a:tcPr marL="9525" marR="9525" marT="9525" marB="0" anchor="ctr"/>
+                </a:tc>
+                <a:extLst>
+                  <a:ext uri="{0D108BD9-81ED-4DB2-BD59-A6C34878D82A}">
+                    <a16:rowId xmlns:a16="http://schemas.microsoft.com/office/drawing/2014/main" val="1005609488"/>
+                  </a:ext>
+                </a:extLst>
+              </a:tr>
+              <a:tr h="947028">
+                <a:tc>
+                  <a:txBody>
+                    <a:bodyPr/>
+                    <a:lstStyle/>
+                    <a:p>
+                      <a:pPr algn="ctr"/>
+                      <a:r>
+                        <a:rPr lang="en-US" sz="3200" dirty="0">
+                          <a:solidFill>
+                            <a:schemeClr val="bg1"/>
+                          </a:solidFill>
+                          <a:latin typeface="Open Sans Light" pitchFamily="2" charset="0"/>
+                          <a:ea typeface="Open Sans Light" pitchFamily="2" charset="0"/>
+                          <a:cs typeface="Open Sans Light" pitchFamily="2" charset="0"/>
+                        </a:rPr>
+                        <a:t>3</a:t>
+                      </a:r>
+                      <a:endParaRPr lang="en-GB" sz="3200" dirty="0">
+                        <a:solidFill>
+                          <a:schemeClr val="bg1"/>
+                        </a:solidFill>
+                        <a:latin typeface="Open Sans Light" pitchFamily="2" charset="0"/>
+                        <a:ea typeface="Open Sans Light" pitchFamily="2" charset="0"/>
+                        <a:cs typeface="Open Sans Light" pitchFamily="2" charset="0"/>
+                      </a:endParaRPr>
+                    </a:p>
+                  </a:txBody>
+                  <a:tcPr anchor="ctr"/>
+                </a:tc>
+                <a:tc>
+                  <a:txBody>
+                    <a:bodyPr/>
+                    <a:lstStyle/>
+                    <a:p>
+                      <a:pPr algn="l" fontAlgn="b"/>
+                      <a:r>
+                        <a:rPr lang="en-GB" sz="3200" b="0" i="0" u="none" strike="noStrike" dirty="0">
+                          <a:solidFill>
+                            <a:schemeClr val="bg1"/>
+                          </a:solidFill>
+                          <a:effectLst/>
+                          <a:latin typeface="Open Sans Light" pitchFamily="2" charset="0"/>
+                          <a:ea typeface="Open Sans Light" pitchFamily="2" charset="0"/>
+                          <a:cs typeface="Open Sans Light" pitchFamily="2" charset="0"/>
+                        </a:rPr>
+                        <a:t>Premise2</a:t>
+                      </a:r>
+                    </a:p>
+                  </a:txBody>
+                  <a:tcPr marL="9525" marR="9525" marT="9525" marB="0" anchor="ctr"/>
+                </a:tc>
+                <a:tc>
+                  <a:txBody>
+                    <a:bodyPr/>
+                    <a:lstStyle/>
+                    <a:p>
+                      <a:pPr algn="l" fontAlgn="b"/>
+                      <a:r>
+                        <a:rPr lang="en-GB" sz="3200" b="0" i="0" u="none" strike="noStrike" dirty="0">
+                          <a:solidFill>
+                            <a:schemeClr val="bg1"/>
+                          </a:solidFill>
+                          <a:effectLst/>
+                          <a:latin typeface="Open Sans Light" pitchFamily="2" charset="0"/>
+                          <a:ea typeface="Open Sans Light" pitchFamily="2" charset="0"/>
+                          <a:cs typeface="Open Sans Light" pitchFamily="2" charset="0"/>
+                        </a:rPr>
+                        <a:t>Hypothesis2</a:t>
+                      </a:r>
+                    </a:p>
+                  </a:txBody>
+                  <a:tcPr marL="9525" marR="9525" marT="9525" marB="0" anchor="ctr"/>
+                </a:tc>
+                <a:extLst>
+                  <a:ext uri="{0D108BD9-81ED-4DB2-BD59-A6C34878D82A}">
+                    <a16:rowId xmlns:a16="http://schemas.microsoft.com/office/drawing/2014/main" val="1894335215"/>
+                  </a:ext>
+                </a:extLst>
+              </a:tr>
+              <a:tr h="947028">
+                <a:tc>
+                  <a:txBody>
+                    <a:bodyPr/>
+                    <a:lstStyle/>
+                    <a:p>
+                      <a:pPr algn="ctr"/>
+                      <a:r>
+                        <a:rPr lang="en-US" sz="3200" dirty="0">
+                          <a:solidFill>
+                            <a:schemeClr val="bg1"/>
+                          </a:solidFill>
+                          <a:latin typeface="Open Sans Light" pitchFamily="2" charset="0"/>
+                          <a:ea typeface="Open Sans Light" pitchFamily="2" charset="0"/>
+                          <a:cs typeface="Open Sans Light" pitchFamily="2" charset="0"/>
+                        </a:rPr>
+                        <a:t>2</a:t>
+                      </a:r>
+                      <a:endParaRPr lang="en-GB" sz="3200" dirty="0">
+                        <a:solidFill>
+                          <a:schemeClr val="bg1"/>
+                        </a:solidFill>
+                        <a:latin typeface="Open Sans Light" pitchFamily="2" charset="0"/>
+                        <a:ea typeface="Open Sans Light" pitchFamily="2" charset="0"/>
+                        <a:cs typeface="Open Sans Light" pitchFamily="2" charset="0"/>
+                      </a:endParaRPr>
+                    </a:p>
+                  </a:txBody>
+                  <a:tcPr anchor="ctr"/>
+                </a:tc>
+                <a:tc>
+                  <a:txBody>
+                    <a:bodyPr/>
+                    <a:lstStyle/>
+                    <a:p>
+                      <a:pPr algn="l" fontAlgn="b"/>
+                      <a:r>
+                        <a:rPr lang="en-US" sz="3200" b="0" i="0" u="none" strike="noStrike" dirty="0">
+                          <a:solidFill>
+                            <a:schemeClr val="bg1"/>
+                          </a:solidFill>
+                          <a:effectLst/>
+                          <a:latin typeface="Open Sans Light" pitchFamily="2" charset="0"/>
+                          <a:ea typeface="Open Sans Light" pitchFamily="2" charset="0"/>
+                          <a:cs typeface="Open Sans Light" pitchFamily="2" charset="0"/>
+                        </a:rPr>
+                        <a:t>P</a:t>
+                      </a:r>
+                      <a:r>
+                        <a:rPr lang="en-GB" sz="3200" b="0" i="0" u="none" strike="noStrike" dirty="0">
+                          <a:solidFill>
+                            <a:schemeClr val="bg1"/>
+                          </a:solidFill>
+                          <a:effectLst/>
+                          <a:latin typeface="Open Sans Light" pitchFamily="2" charset="0"/>
+                          <a:ea typeface="Open Sans Light" pitchFamily="2" charset="0"/>
+                          <a:cs typeface="Open Sans Light" pitchFamily="2" charset="0"/>
+                        </a:rPr>
+                        <a:t>remise3</a:t>
+                      </a:r>
+                    </a:p>
+                  </a:txBody>
+                  <a:tcPr marL="9525" marR="9525" marT="9525" marB="0" anchor="ctr"/>
+                </a:tc>
+                <a:tc>
+                  <a:txBody>
+                    <a:bodyPr/>
+                    <a:lstStyle/>
+                    <a:p>
+                      <a:pPr algn="l" fontAlgn="b"/>
+                      <a:r>
+                        <a:rPr lang="en-GB" sz="3200" b="0" i="0" u="none" strike="noStrike" dirty="0">
+                          <a:solidFill>
+                            <a:schemeClr val="bg1"/>
+                          </a:solidFill>
+                          <a:effectLst/>
+                          <a:latin typeface="Open Sans Light" pitchFamily="2" charset="0"/>
+                          <a:ea typeface="Open Sans Light" pitchFamily="2" charset="0"/>
+                          <a:cs typeface="Open Sans Light" pitchFamily="2" charset="0"/>
+                        </a:rPr>
+                        <a:t>Hypothesis3</a:t>
+                      </a:r>
+                    </a:p>
+                  </a:txBody>
+                  <a:tcPr marL="9525" marR="9525" marT="9525" marB="0" anchor="ctr"/>
+                </a:tc>
+                <a:extLst>
+                  <a:ext uri="{0D108BD9-81ED-4DB2-BD59-A6C34878D82A}">
+                    <a16:rowId xmlns:a16="http://schemas.microsoft.com/office/drawing/2014/main" val="2766742310"/>
+                  </a:ext>
+                </a:extLst>
+              </a:tr>
+              <a:tr h="947028">
+                <a:tc>
+                  <a:txBody>
+                    <a:bodyPr/>
+                    <a:lstStyle/>
+                    <a:p>
+                      <a:pPr algn="ctr"/>
+                      <a:r>
+                        <a:rPr lang="en-US" sz="3200" dirty="0">
+                          <a:solidFill>
+                            <a:schemeClr val="bg1"/>
+                          </a:solidFill>
+                          <a:latin typeface="Open Sans Light" pitchFamily="2" charset="0"/>
+                          <a:ea typeface="Open Sans Light" pitchFamily="2" charset="0"/>
+                          <a:cs typeface="Open Sans Light" pitchFamily="2" charset="0"/>
+                        </a:rPr>
+                        <a:t>1</a:t>
+                      </a:r>
+                      <a:endParaRPr lang="en-GB" sz="3200" dirty="0">
+                        <a:solidFill>
+                          <a:schemeClr val="bg1"/>
+                        </a:solidFill>
+                        <a:latin typeface="Open Sans Light" pitchFamily="2" charset="0"/>
+                        <a:ea typeface="Open Sans Light" pitchFamily="2" charset="0"/>
+                        <a:cs typeface="Open Sans Light" pitchFamily="2" charset="0"/>
+                      </a:endParaRPr>
+                    </a:p>
+                  </a:txBody>
+                  <a:tcPr anchor="ctr"/>
+                </a:tc>
+                <a:tc>
+                  <a:txBody>
+                    <a:bodyPr/>
+                    <a:lstStyle/>
+                    <a:p>
+                      <a:pPr algn="l" fontAlgn="b"/>
+                      <a:r>
+                        <a:rPr lang="en-GB" sz="3200" b="0" i="0" u="none" strike="noStrike" dirty="0">
+                          <a:solidFill>
+                            <a:schemeClr val="bg1"/>
+                          </a:solidFill>
+                          <a:effectLst/>
+                          <a:latin typeface="Open Sans Light" pitchFamily="2" charset="0"/>
+                          <a:ea typeface="Open Sans Light" pitchFamily="2" charset="0"/>
+                          <a:cs typeface="Open Sans Light" pitchFamily="2" charset="0"/>
+                        </a:rPr>
+                        <a:t>premise4</a:t>
+                      </a:r>
+                    </a:p>
+                  </a:txBody>
+                  <a:tcPr marL="9525" marR="9525" marT="9525" marB="0" anchor="ctr"/>
+                </a:tc>
+                <a:tc>
+                  <a:txBody>
+                    <a:bodyPr/>
+                    <a:lstStyle/>
+                    <a:p>
+                      <a:pPr algn="l" fontAlgn="b"/>
+                      <a:r>
+                        <a:rPr lang="en-GB" sz="3200" b="0" i="0" u="none" strike="noStrike" dirty="0">
+                          <a:solidFill>
+                            <a:schemeClr val="bg1"/>
+                          </a:solidFill>
+                          <a:effectLst/>
+                          <a:latin typeface="Open Sans Light" pitchFamily="2" charset="0"/>
+                          <a:ea typeface="Open Sans Light" pitchFamily="2" charset="0"/>
+                          <a:cs typeface="Open Sans Light" pitchFamily="2" charset="0"/>
+                        </a:rPr>
+                        <a:t>hypothesis4</a:t>
+                      </a:r>
+                    </a:p>
+                  </a:txBody>
+                  <a:tcPr marL="9525" marR="9525" marT="9525" marB="0" anchor="ctr"/>
+                </a:tc>
+                <a:extLst>
+                  <a:ext uri="{0D108BD9-81ED-4DB2-BD59-A6C34878D82A}">
+                    <a16:rowId xmlns:a16="http://schemas.microsoft.com/office/drawing/2014/main" val="4232742880"/>
                   </a:ext>
                 </a:extLst>
               </a:tr>

</xml_diff>

<commit_message>
Get figures for solution C, #3
</commit_message>
<xml_diff>
--- a/poster/poster.pptx
+++ b/poster/poster.pptx
@@ -255,7 +255,7 @@
           <a:p>
             <a:fld id="{52A2FECF-891D-49EB-A3E6-5F3FE0DE1572}" type="datetimeFigureOut">
               <a:rPr lang="en-GB" smtClean="0"/>
-              <a:t>22/04/2024</a:t>
+              <a:t>23/04/2024</a:t>
             </a:fld>
             <a:endParaRPr lang="en-GB"/>
           </a:p>
@@ -425,7 +425,7 @@
           <a:p>
             <a:fld id="{52A2FECF-891D-49EB-A3E6-5F3FE0DE1572}" type="datetimeFigureOut">
               <a:rPr lang="en-GB" smtClean="0"/>
-              <a:t>22/04/2024</a:t>
+              <a:t>23/04/2024</a:t>
             </a:fld>
             <a:endParaRPr lang="en-GB"/>
           </a:p>
@@ -605,7 +605,7 @@
           <a:p>
             <a:fld id="{52A2FECF-891D-49EB-A3E6-5F3FE0DE1572}" type="datetimeFigureOut">
               <a:rPr lang="en-GB" smtClean="0"/>
-              <a:t>22/04/2024</a:t>
+              <a:t>23/04/2024</a:t>
             </a:fld>
             <a:endParaRPr lang="en-GB"/>
           </a:p>
@@ -775,7 +775,7 @@
           <a:p>
             <a:fld id="{52A2FECF-891D-49EB-A3E6-5F3FE0DE1572}" type="datetimeFigureOut">
               <a:rPr lang="en-GB" smtClean="0"/>
-              <a:t>22/04/2024</a:t>
+              <a:t>23/04/2024</a:t>
             </a:fld>
             <a:endParaRPr lang="en-GB"/>
           </a:p>
@@ -1019,7 +1019,7 @@
           <a:p>
             <a:fld id="{52A2FECF-891D-49EB-A3E6-5F3FE0DE1572}" type="datetimeFigureOut">
               <a:rPr lang="en-GB" smtClean="0"/>
-              <a:t>22/04/2024</a:t>
+              <a:t>23/04/2024</a:t>
             </a:fld>
             <a:endParaRPr lang="en-GB"/>
           </a:p>
@@ -1251,7 +1251,7 @@
           <a:p>
             <a:fld id="{52A2FECF-891D-49EB-A3E6-5F3FE0DE1572}" type="datetimeFigureOut">
               <a:rPr lang="en-GB" smtClean="0"/>
-              <a:t>22/04/2024</a:t>
+              <a:t>23/04/2024</a:t>
             </a:fld>
             <a:endParaRPr lang="en-GB"/>
           </a:p>
@@ -1618,7 +1618,7 @@
           <a:p>
             <a:fld id="{52A2FECF-891D-49EB-A3E6-5F3FE0DE1572}" type="datetimeFigureOut">
               <a:rPr lang="en-GB" smtClean="0"/>
-              <a:t>22/04/2024</a:t>
+              <a:t>23/04/2024</a:t>
             </a:fld>
             <a:endParaRPr lang="en-GB"/>
           </a:p>
@@ -1736,7 +1736,7 @@
           <a:p>
             <a:fld id="{52A2FECF-891D-49EB-A3E6-5F3FE0DE1572}" type="datetimeFigureOut">
               <a:rPr lang="en-GB" smtClean="0"/>
-              <a:t>22/04/2024</a:t>
+              <a:t>23/04/2024</a:t>
             </a:fld>
             <a:endParaRPr lang="en-GB"/>
           </a:p>
@@ -1831,7 +1831,7 @@
           <a:p>
             <a:fld id="{52A2FECF-891D-49EB-A3E6-5F3FE0DE1572}" type="datetimeFigureOut">
               <a:rPr lang="en-GB" smtClean="0"/>
-              <a:t>22/04/2024</a:t>
+              <a:t>23/04/2024</a:t>
             </a:fld>
             <a:endParaRPr lang="en-GB"/>
           </a:p>
@@ -2108,7 +2108,7 @@
           <a:p>
             <a:fld id="{52A2FECF-891D-49EB-A3E6-5F3FE0DE1572}" type="datetimeFigureOut">
               <a:rPr lang="en-GB" smtClean="0"/>
-              <a:t>22/04/2024</a:t>
+              <a:t>23/04/2024</a:t>
             </a:fld>
             <a:endParaRPr lang="en-GB"/>
           </a:p>
@@ -2365,7 +2365,7 @@
           <a:p>
             <a:fld id="{52A2FECF-891D-49EB-A3E6-5F3FE0DE1572}" type="datetimeFigureOut">
               <a:rPr lang="en-GB" smtClean="0"/>
-              <a:t>22/04/2024</a:t>
+              <a:t>23/04/2024</a:t>
             </a:fld>
             <a:endParaRPr lang="en-GB"/>
           </a:p>
@@ -2578,7 +2578,7 @@
           <a:p>
             <a:fld id="{52A2FECF-891D-49EB-A3E6-5F3FE0DE1572}" type="datetimeFigureOut">
               <a:rPr lang="en-GB" smtClean="0"/>
-              <a:t>22/04/2024</a:t>
+              <a:t>23/04/2024</a:t>
             </a:fld>
             <a:endParaRPr lang="en-GB"/>
           </a:p>
@@ -2991,6 +2991,156 @@
           <a:chExt cx="0" cy="0"/>
         </a:xfrm>
       </p:grpSpPr>
+      <p:grpSp>
+        <p:nvGrpSpPr>
+          <p:cNvPr id="45" name="Group 44">
+            <a:extLst>
+              <a:ext uri="{FF2B5EF4-FFF2-40B4-BE49-F238E27FC236}">
+                <a16:creationId xmlns:a16="http://schemas.microsoft.com/office/drawing/2014/main" id="{2335D509-B8CD-2790-9724-8280762B548A}"/>
+              </a:ext>
+            </a:extLst>
+          </p:cNvPr>
+          <p:cNvGrpSpPr/>
+          <p:nvPr/>
+        </p:nvGrpSpPr>
+        <p:grpSpPr>
+          <a:xfrm>
+            <a:off x="14950397" y="15431049"/>
+            <a:ext cx="28239720" cy="11347103"/>
+            <a:chOff x="14950400" y="15536257"/>
+            <a:chExt cx="28239720" cy="11347103"/>
+          </a:xfrm>
+        </p:grpSpPr>
+        <p:sp>
+          <p:nvSpPr>
+            <p:cNvPr id="40" name="Rectangle: Rounded Corners 39">
+              <a:extLst>
+                <a:ext uri="{FF2B5EF4-FFF2-40B4-BE49-F238E27FC236}">
+                  <a16:creationId xmlns:a16="http://schemas.microsoft.com/office/drawing/2014/main" id="{B3DD0584-5B5B-F1BF-C970-72F059428018}"/>
+                </a:ext>
+              </a:extLst>
+            </p:cNvPr>
+            <p:cNvSpPr/>
+            <p:nvPr/>
+          </p:nvSpPr>
+          <p:spPr>
+            <a:xfrm>
+              <a:off x="14950400" y="15536257"/>
+              <a:ext cx="28239720" cy="11347103"/>
+            </a:xfrm>
+            <a:prstGeom prst="roundRect">
+              <a:avLst>
+                <a:gd name="adj" fmla="val 3710"/>
+              </a:avLst>
+            </a:prstGeom>
+            <a:solidFill>
+              <a:srgbClr val="A799B7"/>
+            </a:solidFill>
+            <a:ln>
+              <a:noFill/>
+            </a:ln>
+          </p:spPr>
+          <p:style>
+            <a:lnRef idx="2">
+              <a:schemeClr val="accent1">
+                <a:shade val="15000"/>
+              </a:schemeClr>
+            </a:lnRef>
+            <a:fillRef idx="1">
+              <a:schemeClr val="accent1"/>
+            </a:fillRef>
+            <a:effectRef idx="0">
+              <a:schemeClr val="accent1"/>
+            </a:effectRef>
+            <a:fontRef idx="minor">
+              <a:schemeClr val="lt1"/>
+            </a:fontRef>
+          </p:style>
+          <p:txBody>
+            <a:bodyPr rtlCol="0" anchor="t"/>
+            <a:lstStyle/>
+            <a:p>
+              <a:pPr algn="ctr"/>
+              <a:r>
+                <a:rPr lang="en-US" sz="5400" dirty="0">
+                  <a:solidFill>
+                    <a:srgbClr val="FBD206"/>
+                  </a:solidFill>
+                  <a:latin typeface="Open Sans SemiBold" pitchFamily="2" charset="0"/>
+                  <a:ea typeface="Open Sans SemiBold" pitchFamily="2" charset="0"/>
+                  <a:cs typeface="Open Sans SemiBold" pitchFamily="2" charset="0"/>
+                </a:rPr>
+                <a:t>Task C: Figures</a:t>
+              </a:r>
+              <a:endParaRPr lang="en-GB" sz="5400" dirty="0">
+                <a:solidFill>
+                  <a:schemeClr val="bg1"/>
+                </a:solidFill>
+                <a:latin typeface="Open Sans Light" pitchFamily="2" charset="0"/>
+                <a:ea typeface="Open Sans Light" pitchFamily="2" charset="0"/>
+                <a:cs typeface="Open Sans Light" pitchFamily="2" charset="0"/>
+              </a:endParaRPr>
+            </a:p>
+            <a:p>
+              <a:pPr algn="ctr"/>
+              <a:endParaRPr lang="en-GB" sz="6600" dirty="0">
+                <a:solidFill>
+                  <a:srgbClr val="FBD206"/>
+                </a:solidFill>
+                <a:latin typeface="Open Sans Light" pitchFamily="2" charset="0"/>
+                <a:ea typeface="Open Sans Light" pitchFamily="2" charset="0"/>
+                <a:cs typeface="Open Sans Light" pitchFamily="2" charset="0"/>
+              </a:endParaRPr>
+            </a:p>
+          </p:txBody>
+        </p:sp>
+        <p:pic>
+          <p:nvPicPr>
+            <p:cNvPr id="43" name="Picture 42">
+              <a:extLst>
+                <a:ext uri="{FF2B5EF4-FFF2-40B4-BE49-F238E27FC236}">
+                  <a16:creationId xmlns:a16="http://schemas.microsoft.com/office/drawing/2014/main" id="{32375122-C3DB-9F06-26BE-EDC451255FEB}"/>
+                </a:ext>
+              </a:extLst>
+            </p:cNvPr>
+            <p:cNvPicPr>
+              <a:picLocks noChangeAspect="1"/>
+            </p:cNvPicPr>
+            <p:nvPr/>
+          </p:nvPicPr>
+          <p:blipFill>
+            <a:blip r:embed="rId2">
+              <a:clrChange>
+                <a:clrFrom>
+                  <a:srgbClr val="FFFFFF"/>
+                </a:clrFrom>
+                <a:clrTo>
+                  <a:srgbClr val="FFFFFF">
+                    <a:alpha val="0"/>
+                  </a:srgbClr>
+                </a:clrTo>
+              </a:clrChange>
+              <a:extLst>
+                <a:ext uri="{28A0092B-C50C-407E-A947-70E740481C1C}">
+                  <a14:useLocalDpi xmlns:a14="http://schemas.microsoft.com/office/drawing/2010/main" val="0"/>
+                </a:ext>
+              </a:extLst>
+            </a:blip>
+            <a:stretch>
+              <a:fillRect/>
+            </a:stretch>
+          </p:blipFill>
+          <p:spPr>
+            <a:xfrm>
+              <a:off x="33436559" y="15709371"/>
+              <a:ext cx="8961121" cy="6495309"/>
+            </a:xfrm>
+            <a:prstGeom prst="rect">
+              <a:avLst/>
+            </a:prstGeom>
+          </p:spPr>
+        </p:pic>
+      </p:grpSp>
       <p:sp>
         <p:nvSpPr>
           <p:cNvPr id="5" name="Rectangle 4">
@@ -3092,7 +3242,7 @@
           <p:nvPr/>
         </p:nvPicPr>
         <p:blipFill rotWithShape="1">
-          <a:blip r:embed="rId2">
+          <a:blip r:embed="rId3">
             <a:extLst>
               <a:ext uri="{28A0092B-C50C-407E-A947-70E740481C1C}">
                 <a14:useLocalDpi xmlns:a14="http://schemas.microsoft.com/office/drawing/2010/main" val="0"/>
@@ -3136,12 +3286,12 @@
         </p:nvSpPr>
         <p:spPr>
           <a:xfrm>
-            <a:off x="14950441" y="25237440"/>
-            <a:ext cx="28083798" cy="7292305"/>
+            <a:off x="14950397" y="27044443"/>
+            <a:ext cx="28239708" cy="5485302"/>
           </a:xfrm>
           <a:prstGeom prst="roundRect">
             <a:avLst>
-              <a:gd name="adj" fmla="val 8626"/>
+              <a:gd name="adj" fmla="val 6993"/>
             </a:avLst>
           </a:prstGeom>
           <a:solidFill>
@@ -3173,7 +3323,7 @@
           <a:p>
             <a:pPr algn="ctr"/>
             <a:r>
-              <a:rPr lang="en-US" sz="6600" dirty="0">
+              <a:rPr lang="en-US" sz="5400" dirty="0">
                 <a:solidFill>
                   <a:srgbClr val="FBD206"/>
                 </a:solidFill>
@@ -3183,7 +3333,7 @@
               </a:rPr>
               <a:t>Optimal Results</a:t>
             </a:r>
-            <a:endParaRPr lang="en-GB" sz="6600" dirty="0">
+            <a:endParaRPr lang="en-GB" sz="5400" dirty="0">
               <a:solidFill>
                 <a:schemeClr val="bg1"/>
               </a:solidFill>
@@ -3219,7 +3369,7 @@
         </p:nvSpPr>
         <p:spPr>
           <a:xfrm>
-            <a:off x="701040" y="3789703"/>
+            <a:off x="701040" y="3789702"/>
             <a:ext cx="13763105" cy="4577057"/>
           </a:xfrm>
           <a:prstGeom prst="roundRect">
@@ -3258,7 +3408,7 @@
               </a:spcBef>
             </a:pPr>
             <a:r>
-              <a:rPr lang="en-US" sz="6600" dirty="0">
+              <a:rPr lang="en-US" sz="5400" dirty="0">
                 <a:solidFill>
                   <a:srgbClr val="FBD206"/>
                 </a:solidFill>
@@ -3268,6 +3418,14 @@
               </a:rPr>
               <a:t>Introduction</a:t>
             </a:r>
+            <a:endParaRPr lang="en-US" sz="6000" dirty="0">
+              <a:solidFill>
+                <a:srgbClr val="FBD206"/>
+              </a:solidFill>
+              <a:latin typeface="Open Sans SemiBold" pitchFamily="2" charset="0"/>
+              <a:ea typeface="Open Sans SemiBold" pitchFamily="2" charset="0"/>
+              <a:cs typeface="Open Sans SemiBold" pitchFamily="2" charset="0"/>
+            </a:endParaRPr>
           </a:p>
           <a:p>
             <a:pPr marL="857250" indent="-857250">
@@ -3278,7 +3436,7 @@
               <a:buChar char="•"/>
             </a:pPr>
             <a:r>
-              <a:rPr lang="en-GB" sz="4000" b="1" dirty="0">
+              <a:rPr lang="en-GB" sz="3600" b="1" dirty="0">
                 <a:latin typeface="Open Sans Light" pitchFamily="2" charset="0"/>
                 <a:ea typeface="Open Sans Light" pitchFamily="2" charset="0"/>
                 <a:cs typeface="Open Sans Light" pitchFamily="2" charset="0"/>
@@ -3286,7 +3444,7 @@
               <a:t>Two models </a:t>
             </a:r>
             <a:r>
-              <a:rPr lang="en-GB" sz="4000" dirty="0">
+              <a:rPr lang="en-GB" sz="3600" dirty="0">
                 <a:latin typeface="Open Sans Light" pitchFamily="2" charset="0"/>
                 <a:ea typeface="Open Sans Light" pitchFamily="2" charset="0"/>
                 <a:cs typeface="Open Sans Light" pitchFamily="2" charset="0"/>
@@ -3294,7 +3452,7 @@
               <a:t>were developed to solve Natural Language Inference (</a:t>
             </a:r>
             <a:r>
-              <a:rPr lang="en-GB" sz="4000" b="1" dirty="0">
+              <a:rPr lang="en-GB" sz="3600" b="1" dirty="0">
                 <a:latin typeface="Open Sans Light" pitchFamily="2" charset="0"/>
                 <a:ea typeface="Open Sans Light" pitchFamily="2" charset="0"/>
                 <a:cs typeface="Open Sans Light" pitchFamily="2" charset="0"/>
@@ -3302,12 +3460,12 @@
               <a:t>NLI</a:t>
             </a:r>
             <a:r>
-              <a:rPr lang="en-GB" sz="4000" dirty="0">
-                <a:latin typeface="Open Sans Light" pitchFamily="2" charset="0"/>
-                <a:ea typeface="Open Sans Light" pitchFamily="2" charset="0"/>
-                <a:cs typeface="Open Sans Light" pitchFamily="2" charset="0"/>
-              </a:rPr>
-              <a:t>)</a:t>
+              <a:rPr lang="en-GB" sz="3600" dirty="0">
+                <a:latin typeface="Open Sans Light" pitchFamily="2" charset="0"/>
+                <a:ea typeface="Open Sans Light" pitchFamily="2" charset="0"/>
+                <a:cs typeface="Open Sans Light" pitchFamily="2" charset="0"/>
+              </a:rPr>
+              <a:t>), the task of assessing whether a premise semantically supports a hypothesis</a:t>
             </a:r>
           </a:p>
           <a:p>
@@ -3319,7 +3477,7 @@
               <a:buChar char="•"/>
             </a:pPr>
             <a:r>
-              <a:rPr lang="en-GB" sz="4000" dirty="0">
+              <a:rPr lang="en-GB" sz="3600" dirty="0">
                 <a:latin typeface="Open Sans Light" pitchFamily="2" charset="0"/>
                 <a:ea typeface="Open Sans Light" pitchFamily="2" charset="0"/>
                 <a:cs typeface="Open Sans Light" pitchFamily="2" charset="0"/>
@@ -3385,8 +3543,8 @@
         </p:nvSpPr>
         <p:spPr>
           <a:xfrm>
-            <a:off x="701039" y="8650416"/>
-            <a:ext cx="13763105" cy="12929424"/>
+            <a:off x="701039" y="8622355"/>
+            <a:ext cx="13763105" cy="12517944"/>
           </a:xfrm>
           <a:prstGeom prst="roundRect">
             <a:avLst>
@@ -3426,7 +3584,7 @@
               </a:spcBef>
             </a:pPr>
             <a:r>
-              <a:rPr lang="en-US" sz="6600" dirty="0">
+              <a:rPr lang="en-US" sz="5400" dirty="0">
                 <a:solidFill>
                   <a:srgbClr val="FBD206"/>
                 </a:solidFill>
@@ -3436,6 +3594,14 @@
               </a:rPr>
               <a:t>Methods</a:t>
             </a:r>
+            <a:endParaRPr lang="en-US" sz="6600" dirty="0">
+              <a:solidFill>
+                <a:srgbClr val="FBD206"/>
+              </a:solidFill>
+              <a:latin typeface="Open Sans SemiBold" pitchFamily="2" charset="0"/>
+              <a:ea typeface="Open Sans SemiBold" pitchFamily="2" charset="0"/>
+              <a:cs typeface="Open Sans SemiBold" pitchFamily="2" charset="0"/>
+            </a:endParaRPr>
           </a:p>
           <a:p>
             <a:pPr marL="685800" indent="-685800">
@@ -3446,7 +3612,7 @@
               <a:buChar char="•"/>
             </a:pPr>
             <a:r>
-              <a:rPr lang="en-US" sz="4000" b="1" dirty="0">
+              <a:rPr lang="en-US" sz="3600" b="1" dirty="0">
                 <a:solidFill>
                   <a:schemeClr val="bg1"/>
                 </a:solidFill>
@@ -3457,7 +3623,7 @@
               <a:t>Method B</a:t>
             </a:r>
             <a:r>
-              <a:rPr lang="en-US" sz="4000" dirty="0">
+              <a:rPr lang="en-US" sz="3600" dirty="0">
                 <a:solidFill>
                   <a:schemeClr val="bg1"/>
                 </a:solidFill>
@@ -3477,7 +3643,7 @@
               <a:buChar char="•"/>
             </a:pPr>
             <a:r>
-              <a:rPr lang="en-GB" sz="4000" dirty="0">
+              <a:rPr lang="en-GB" sz="3600" dirty="0">
                 <a:solidFill>
                   <a:schemeClr val="bg1"/>
                 </a:solidFill>
@@ -3488,7 +3654,7 @@
               <a:t>Trained a </a:t>
             </a:r>
             <a:r>
-              <a:rPr lang="en-GB" sz="4000" b="1" dirty="0">
+              <a:rPr lang="en-GB" sz="3600" b="1" dirty="0">
                 <a:solidFill>
                   <a:schemeClr val="bg1"/>
                 </a:solidFill>
@@ -3499,7 +3665,7 @@
               <a:t>Bi-LSTM</a:t>
             </a:r>
             <a:r>
-              <a:rPr lang="en-GB" sz="4000" dirty="0">
+              <a:rPr lang="en-GB" sz="3600" dirty="0">
                 <a:solidFill>
                   <a:schemeClr val="bg1"/>
                 </a:solidFill>
@@ -3510,7 +3676,7 @@
               <a:t> with frozen </a:t>
             </a:r>
             <a:r>
-              <a:rPr lang="en-GB" sz="4000" b="1" dirty="0">
+              <a:rPr lang="en-GB" sz="3600" b="1" dirty="0">
                 <a:solidFill>
                   <a:schemeClr val="bg1"/>
                 </a:solidFill>
@@ -3521,7 +3687,7 @@
               <a:t>XLNET</a:t>
             </a:r>
             <a:r>
-              <a:rPr lang="en-GB" sz="4000" dirty="0">
+              <a:rPr lang="en-GB" sz="3600" dirty="0">
                 <a:solidFill>
                   <a:schemeClr val="bg1"/>
                 </a:solidFill>
@@ -3541,7 +3707,7 @@
               <a:buChar char="•"/>
             </a:pPr>
             <a:r>
-              <a:rPr lang="en-GB" sz="4000" dirty="0">
+              <a:rPr lang="en-GB" sz="3600" dirty="0">
                 <a:solidFill>
                   <a:schemeClr val="bg1"/>
                 </a:solidFill>
@@ -3552,7 +3718,7 @@
               <a:t>Utilised </a:t>
             </a:r>
             <a:r>
-              <a:rPr lang="en-GB" sz="4000" b="1" dirty="0">
+              <a:rPr lang="en-GB" sz="3600" b="1" dirty="0">
                 <a:solidFill>
                   <a:schemeClr val="bg1"/>
                 </a:solidFill>
@@ -3563,7 +3729,7 @@
               <a:t>learning rate scheduling </a:t>
             </a:r>
             <a:r>
-              <a:rPr lang="en-GB" sz="4000" dirty="0">
+              <a:rPr lang="en-GB" sz="3600" dirty="0">
                 <a:solidFill>
                   <a:schemeClr val="bg1"/>
                 </a:solidFill>
@@ -3572,6 +3738,26 @@
                 <a:cs typeface="Open Sans Light" pitchFamily="2" charset="0"/>
               </a:rPr>
               <a:t>to approach a global optimum</a:t>
+            </a:r>
+          </a:p>
+          <a:p>
+            <a:pPr marL="1600200" lvl="2" indent="-685800">
+              <a:spcBef>
+                <a:spcPts val="1800"/>
+              </a:spcBef>
+              <a:buFont typeface="Arial" panose="020B0604020202020204" pitchFamily="34" charset="0"/>
+              <a:buChar char="•"/>
+            </a:pPr>
+            <a:r>
+              <a:rPr lang="en-GB" sz="3600" dirty="0">
+                <a:solidFill>
+                  <a:schemeClr val="bg1"/>
+                </a:solidFill>
+                <a:latin typeface="Open Sans Light" pitchFamily="2" charset="0"/>
+                <a:ea typeface="Open Sans Light" pitchFamily="2" charset="0"/>
+                <a:cs typeface="Open Sans Light" pitchFamily="2" charset="0"/>
+              </a:rPr>
+              <a:t>LR was reduced on metric plateau</a:t>
             </a:r>
           </a:p>
           <a:p>
@@ -3583,7 +3769,7 @@
               <a:buChar char="•"/>
             </a:pPr>
             <a:r>
-              <a:rPr lang="en-GB" sz="4000" dirty="0">
+              <a:rPr lang="en-GB" sz="3600" dirty="0">
                 <a:solidFill>
                   <a:schemeClr val="bg1"/>
                 </a:solidFill>
@@ -3594,7 +3780,7 @@
               <a:t>Employed </a:t>
             </a:r>
             <a:r>
-              <a:rPr lang="en-GB" sz="4000" b="1" dirty="0">
+              <a:rPr lang="en-GB" sz="3600" b="1" dirty="0">
                 <a:solidFill>
                   <a:schemeClr val="bg1"/>
                 </a:solidFill>
@@ -3605,7 +3791,7 @@
               <a:t>subtractive &amp; multiplicative sentence fusion</a:t>
             </a:r>
             <a:r>
-              <a:rPr lang="en-GB" sz="4000" dirty="0">
+              <a:rPr lang="en-GB" sz="3600" dirty="0">
                 <a:solidFill>
                   <a:schemeClr val="bg1"/>
                 </a:solidFill>
@@ -3616,7 +3802,7 @@
               <a:t>, &amp; </a:t>
             </a:r>
             <a:r>
-              <a:rPr lang="en-GB" sz="4000" b="1" dirty="0">
+              <a:rPr lang="en-GB" sz="3600" b="1" dirty="0">
                 <a:solidFill>
                   <a:schemeClr val="bg1"/>
                 </a:solidFill>
@@ -3627,7 +3813,7 @@
               <a:t>attention</a:t>
             </a:r>
             <a:r>
-              <a:rPr lang="en-GB" sz="4000" dirty="0">
+              <a:rPr lang="en-GB" sz="3600" dirty="0">
                 <a:solidFill>
                   <a:schemeClr val="bg1"/>
                 </a:solidFill>
@@ -3647,7 +3833,7 @@
               <a:buChar char="•"/>
             </a:pPr>
             <a:r>
-              <a:rPr lang="en-GB" sz="4000" b="1" dirty="0">
+              <a:rPr lang="en-GB" sz="3600" b="1" dirty="0">
                 <a:solidFill>
                   <a:schemeClr val="bg1"/>
                 </a:solidFill>
@@ -3657,7 +3843,7 @@
               </a:rPr>
               <a:t>Method C:</a:t>
             </a:r>
-            <a:endParaRPr lang="en-GB" sz="4000" dirty="0">
+            <a:endParaRPr lang="en-GB" sz="3600" dirty="0">
               <a:solidFill>
                 <a:schemeClr val="bg1"/>
               </a:solidFill>
@@ -3675,7 +3861,7 @@
               <a:buChar char="•"/>
             </a:pPr>
             <a:r>
-              <a:rPr lang="en-GB" sz="4000" dirty="0">
+              <a:rPr lang="en-GB" sz="3600" dirty="0">
                 <a:solidFill>
                   <a:schemeClr val="bg1"/>
                 </a:solidFill>
@@ -3686,7 +3872,7 @@
               <a:t>Finetuned the base </a:t>
             </a:r>
             <a:r>
-              <a:rPr lang="en-GB" sz="4000" b="1" dirty="0">
+              <a:rPr lang="en-GB" sz="3600" b="1" dirty="0">
                 <a:solidFill>
                   <a:schemeClr val="bg1"/>
                 </a:solidFill>
@@ -3697,7 +3883,7 @@
               <a:t>ROBERTA</a:t>
             </a:r>
             <a:r>
-              <a:rPr lang="en-GB" sz="4000" dirty="0">
+              <a:rPr lang="en-GB" sz="3600" dirty="0">
                 <a:solidFill>
                   <a:schemeClr val="bg1"/>
                 </a:solidFill>
@@ -3717,7 +3903,7 @@
               <a:buChar char="•"/>
             </a:pPr>
             <a:r>
-              <a:rPr lang="en-GB" sz="4000" dirty="0">
+              <a:rPr lang="en-GB" sz="3600" dirty="0">
                 <a:solidFill>
                   <a:schemeClr val="bg1"/>
                 </a:solidFill>
@@ -3728,7 +3914,7 @@
               <a:t>Employed </a:t>
             </a:r>
             <a:r>
-              <a:rPr lang="en-GB" sz="4000" b="1" dirty="0">
+              <a:rPr lang="en-GB" sz="3600" b="1" dirty="0">
                 <a:solidFill>
                   <a:schemeClr val="bg1"/>
                 </a:solidFill>
@@ -3739,7 +3925,7 @@
               <a:t>data augmentation </a:t>
             </a:r>
             <a:r>
-              <a:rPr lang="en-GB" sz="4000" dirty="0">
+              <a:rPr lang="en-GB" sz="3600" dirty="0">
                 <a:solidFill>
                   <a:schemeClr val="bg1"/>
                 </a:solidFill>
@@ -3759,7 +3945,7 @@
               <a:buChar char="•"/>
             </a:pPr>
             <a:r>
-              <a:rPr lang="en-GB" sz="4000" dirty="0">
+              <a:rPr lang="en-GB" sz="3600" dirty="0">
                 <a:solidFill>
                   <a:schemeClr val="bg1"/>
                 </a:solidFill>
@@ -3779,7 +3965,7 @@
               <a:buChar char="•"/>
             </a:pPr>
             <a:r>
-              <a:rPr lang="en-GB" sz="4000" dirty="0">
+              <a:rPr lang="en-GB" sz="3600" dirty="0">
                 <a:solidFill>
                   <a:schemeClr val="bg1"/>
                 </a:solidFill>
@@ -3799,7 +3985,7 @@
               <a:buChar char="•"/>
             </a:pPr>
             <a:r>
-              <a:rPr lang="en-GB" sz="4000" dirty="0">
+              <a:rPr lang="en-GB" sz="3600" dirty="0">
                 <a:solidFill>
                   <a:schemeClr val="bg1"/>
                 </a:solidFill>
@@ -3810,7 +3996,7 @@
               <a:t>Used </a:t>
             </a:r>
             <a:r>
-              <a:rPr lang="en-GB" sz="4000" b="1" dirty="0">
+              <a:rPr lang="en-GB" sz="3600" b="1" dirty="0">
                 <a:solidFill>
                   <a:schemeClr val="bg1"/>
                 </a:solidFill>
@@ -3821,7 +4007,7 @@
               <a:t>early stopping </a:t>
             </a:r>
             <a:r>
-              <a:rPr lang="en-GB" sz="4000" dirty="0">
+              <a:rPr lang="en-GB" sz="3600" dirty="0">
                 <a:solidFill>
                   <a:schemeClr val="bg1"/>
                 </a:solidFill>
@@ -3830,6 +4016,26 @@
                 <a:cs typeface="Open Sans Light" pitchFamily="2" charset="0"/>
               </a:rPr>
               <a:t> and LR scheduling to reduce overfitting</a:t>
+            </a:r>
+          </a:p>
+          <a:p>
+            <a:pPr marL="1600200" lvl="2" indent="-685800">
+              <a:spcBef>
+                <a:spcPts val="1800"/>
+              </a:spcBef>
+              <a:buFont typeface="Arial" panose="020B0604020202020204" pitchFamily="34" charset="0"/>
+              <a:buChar char="•"/>
+            </a:pPr>
+            <a:r>
+              <a:rPr lang="en-GB" sz="3600" dirty="0">
+                <a:solidFill>
+                  <a:schemeClr val="bg1"/>
+                </a:solidFill>
+                <a:latin typeface="Open Sans Light" pitchFamily="2" charset="0"/>
+                <a:ea typeface="Open Sans Light" pitchFamily="2" charset="0"/>
+                <a:cs typeface="Open Sans Light" pitchFamily="2" charset="0"/>
+              </a:rPr>
+              <a:t>LR warmup and then decreasing was used</a:t>
             </a:r>
           </a:p>
         </p:txBody>
@@ -3848,7 +4054,7 @@
         </p:nvSpPr>
         <p:spPr>
           <a:xfrm>
-            <a:off x="701040" y="21939477"/>
+            <a:off x="701038" y="21395894"/>
             <a:ext cx="13763104" cy="6199078"/>
           </a:xfrm>
           <a:prstGeom prst="roundRect">
@@ -3885,7 +4091,7 @@
           <a:p>
             <a:pPr algn="ctr"/>
             <a:r>
-              <a:rPr lang="en-US" sz="6600" dirty="0">
+              <a:rPr lang="en-US" sz="5400" dirty="0">
                 <a:solidFill>
                   <a:srgbClr val="FBD206"/>
                 </a:solidFill>
@@ -3895,6 +4101,14 @@
               </a:rPr>
               <a:t>Conclusions</a:t>
             </a:r>
+            <a:endParaRPr lang="en-US" sz="6600" dirty="0">
+              <a:solidFill>
+                <a:srgbClr val="FBD206"/>
+              </a:solidFill>
+              <a:latin typeface="Open Sans SemiBold" pitchFamily="2" charset="0"/>
+              <a:ea typeface="Open Sans SemiBold" pitchFamily="2" charset="0"/>
+              <a:cs typeface="Open Sans SemiBold" pitchFamily="2" charset="0"/>
+            </a:endParaRPr>
           </a:p>
           <a:p>
             <a:pPr marL="857250" indent="-857250">
@@ -4063,8 +4277,8 @@
         </p:nvSpPr>
         <p:spPr>
           <a:xfrm>
-            <a:off x="701038" y="28498192"/>
-            <a:ext cx="13763103" cy="4031553"/>
+            <a:off x="701038" y="27850566"/>
+            <a:ext cx="13763103" cy="4569973"/>
           </a:xfrm>
           <a:prstGeom prst="roundRect">
             <a:avLst>
@@ -4100,7 +4314,7 @@
           <a:p>
             <a:pPr algn="ctr"/>
             <a:r>
-              <a:rPr lang="en-US" sz="6600" dirty="0">
+              <a:rPr lang="en-US" sz="5400" dirty="0">
                 <a:solidFill>
                   <a:srgbClr val="FBD206"/>
                 </a:solidFill>
@@ -4110,6 +4324,14 @@
               </a:rPr>
               <a:t>References</a:t>
             </a:r>
+            <a:endParaRPr lang="en-US" sz="6600" dirty="0">
+              <a:solidFill>
+                <a:srgbClr val="FBD206"/>
+              </a:solidFill>
+              <a:latin typeface="Open Sans SemiBold" pitchFamily="2" charset="0"/>
+              <a:ea typeface="Open Sans SemiBold" pitchFamily="2" charset="0"/>
+              <a:cs typeface="Open Sans SemiBold" pitchFamily="2" charset="0"/>
+            </a:endParaRPr>
           </a:p>
           <a:p>
             <a:pPr marL="571500" indent="-571500">
@@ -4117,7 +4339,7 @@
               <a:buChar char="•"/>
             </a:pPr>
             <a:r>
-              <a:rPr lang="en-US" sz="2300" dirty="0">
+              <a:rPr lang="en-US" sz="2400" dirty="0">
                 <a:solidFill>
                   <a:schemeClr val="bg1"/>
                 </a:solidFill>
@@ -4128,7 +4350,7 @@
               <a:t>S. Zhang, S. Liu and M. Liu, "Natural language inference using LSTM model with sentence fusion," 2017 36th Chinese Control Conference (CCC), Dalian, China, 2017, pp. 11081-11085, </a:t>
             </a:r>
             <a:r>
-              <a:rPr lang="en-US" sz="2300" dirty="0" err="1">
+              <a:rPr lang="en-US" sz="2400" dirty="0" err="1">
                 <a:solidFill>
                   <a:schemeClr val="bg1"/>
                 </a:solidFill>
@@ -4139,7 +4361,7 @@
               <a:t>doi</a:t>
             </a:r>
             <a:r>
-              <a:rPr lang="en-US" sz="2300" dirty="0">
+              <a:rPr lang="en-US" sz="2400" dirty="0">
                 <a:solidFill>
                   <a:schemeClr val="bg1"/>
                 </a:solidFill>
@@ -4156,7 +4378,7 @@
               <a:buChar char="•"/>
             </a:pPr>
             <a:r>
-              <a:rPr lang="en-GB" sz="2300" dirty="0" err="1">
+              <a:rPr lang="en-GB" sz="2400" dirty="0" err="1">
                 <a:solidFill>
                   <a:schemeClr val="bg1"/>
                 </a:solidFill>
@@ -4167,7 +4389,7 @@
               <a:t>Tarunesh</a:t>
             </a:r>
             <a:r>
-              <a:rPr lang="en-GB" sz="2300" dirty="0">
+              <a:rPr lang="en-GB" sz="2400" dirty="0">
                 <a:solidFill>
                   <a:schemeClr val="bg1"/>
                 </a:solidFill>
@@ -4178,7 +4400,7 @@
               <a:t>, Ishan, </a:t>
             </a:r>
             <a:r>
-              <a:rPr lang="en-GB" sz="2300" dirty="0" err="1">
+              <a:rPr lang="en-GB" sz="2400" dirty="0" err="1">
                 <a:solidFill>
                   <a:schemeClr val="bg1"/>
                 </a:solidFill>
@@ -4189,7 +4411,7 @@
               <a:t>Somak</a:t>
             </a:r>
             <a:r>
-              <a:rPr lang="en-GB" sz="2300" dirty="0">
+              <a:rPr lang="en-GB" sz="2400" dirty="0">
                 <a:solidFill>
                   <a:schemeClr val="bg1"/>
                 </a:solidFill>
@@ -4200,7 +4422,7 @@
               <a:t> Aditya, and </a:t>
             </a:r>
             <a:r>
-              <a:rPr lang="en-GB" sz="2300" dirty="0" err="1">
+              <a:rPr lang="en-GB" sz="2400" dirty="0" err="1">
                 <a:solidFill>
                   <a:schemeClr val="bg1"/>
                 </a:solidFill>
@@ -4211,7 +4433,7 @@
               <a:t>Monojit</a:t>
             </a:r>
             <a:r>
-              <a:rPr lang="en-GB" sz="2300" dirty="0">
+              <a:rPr lang="en-GB" sz="2400" dirty="0">
                 <a:solidFill>
                   <a:schemeClr val="bg1"/>
                 </a:solidFill>
@@ -4222,7 +4444,7 @@
               <a:t> Choudhury. "Trusting </a:t>
             </a:r>
             <a:r>
-              <a:rPr lang="en-GB" sz="2300" dirty="0" err="1">
+              <a:rPr lang="en-GB" sz="2400" dirty="0" err="1">
                 <a:solidFill>
                   <a:schemeClr val="bg1"/>
                 </a:solidFill>
@@ -4233,7 +4455,7 @@
               <a:t>roberta</a:t>
             </a:r>
             <a:r>
-              <a:rPr lang="en-GB" sz="2300" dirty="0">
+              <a:rPr lang="en-GB" sz="2400" dirty="0">
                 <a:solidFill>
                   <a:schemeClr val="bg1"/>
                 </a:solidFill>
@@ -4244,7 +4466,7 @@
               <a:t> over </a:t>
             </a:r>
             <a:r>
-              <a:rPr lang="en-GB" sz="2300" dirty="0" err="1">
+              <a:rPr lang="en-GB" sz="2400" dirty="0" err="1">
                 <a:solidFill>
                   <a:schemeClr val="bg1"/>
                 </a:solidFill>
@@ -4255,7 +4477,7 @@
               <a:t>bert</a:t>
             </a:r>
             <a:r>
-              <a:rPr lang="en-GB" sz="2300" dirty="0">
+              <a:rPr lang="en-GB" sz="2400" dirty="0">
                 <a:solidFill>
                   <a:schemeClr val="bg1"/>
                 </a:solidFill>
@@ -4266,7 +4488,7 @@
               <a:t>: Insights from </a:t>
             </a:r>
             <a:r>
-              <a:rPr lang="en-GB" sz="2300" dirty="0" err="1">
+              <a:rPr lang="en-GB" sz="2400" dirty="0" err="1">
                 <a:solidFill>
                   <a:schemeClr val="bg1"/>
                 </a:solidFill>
@@ -4277,7 +4499,7 @@
               <a:t>checklisting</a:t>
             </a:r>
             <a:r>
-              <a:rPr lang="en-GB" sz="2300" dirty="0">
+              <a:rPr lang="en-GB" sz="2400" dirty="0">
                 <a:solidFill>
                   <a:schemeClr val="bg1"/>
                 </a:solidFill>
@@ -4288,7 +4510,7 @@
               <a:t> the natural language inference task." </a:t>
             </a:r>
             <a:r>
-              <a:rPr lang="en-GB" sz="2300" dirty="0" err="1">
+              <a:rPr lang="en-GB" sz="2400" dirty="0" err="1">
                 <a:solidFill>
                   <a:schemeClr val="bg1"/>
                 </a:solidFill>
@@ -4299,7 +4521,7 @@
               <a:t>arXiv</a:t>
             </a:r>
             <a:r>
-              <a:rPr lang="en-GB" sz="2300" dirty="0">
+              <a:rPr lang="en-GB" sz="2400" dirty="0">
                 <a:solidFill>
                   <a:schemeClr val="bg1"/>
                 </a:solidFill>
@@ -4316,7 +4538,7 @@
               <a:buChar char="•"/>
             </a:pPr>
             <a:r>
-              <a:rPr lang="en-GB" sz="2300" dirty="0">
+              <a:rPr lang="en-GB" sz="2400" dirty="0">
                 <a:solidFill>
                   <a:schemeClr val="bg1"/>
                 </a:solidFill>
@@ -4327,7 +4549,7 @@
               <a:t>Sadat, </a:t>
             </a:r>
             <a:r>
-              <a:rPr lang="en-GB" sz="2300" dirty="0" err="1">
+              <a:rPr lang="en-GB" sz="2400" dirty="0" err="1">
                 <a:solidFill>
                   <a:schemeClr val="bg1"/>
                 </a:solidFill>
@@ -4338,7 +4560,7 @@
               <a:t>Mobashir</a:t>
             </a:r>
             <a:r>
-              <a:rPr lang="en-GB" sz="2300" dirty="0">
+              <a:rPr lang="en-GB" sz="2400" dirty="0">
                 <a:solidFill>
                   <a:schemeClr val="bg1"/>
                 </a:solidFill>
@@ -4349,7 +4571,7 @@
               <a:t>, and Cornelia </a:t>
             </a:r>
             <a:r>
-              <a:rPr lang="en-GB" sz="2300" dirty="0" err="1">
+              <a:rPr lang="en-GB" sz="2400" dirty="0" err="1">
                 <a:solidFill>
                   <a:schemeClr val="bg1"/>
                 </a:solidFill>
@@ -4360,7 +4582,7 @@
               <a:t>Caragea</a:t>
             </a:r>
             <a:r>
-              <a:rPr lang="en-GB" sz="2300" dirty="0">
+              <a:rPr lang="en-GB" sz="2400" dirty="0">
                 <a:solidFill>
                   <a:schemeClr val="bg1"/>
                 </a:solidFill>
@@ -4371,7 +4593,7 @@
               <a:t>. "</a:t>
             </a:r>
             <a:r>
-              <a:rPr lang="en-GB" sz="2300" dirty="0" err="1">
+              <a:rPr lang="en-GB" sz="2400" dirty="0" err="1">
                 <a:solidFill>
                   <a:schemeClr val="bg1"/>
                 </a:solidFill>
@@ -4382,7 +4604,7 @@
               <a:t>Scinli</a:t>
             </a:r>
             <a:r>
-              <a:rPr lang="en-GB" sz="2300" dirty="0">
+              <a:rPr lang="en-GB" sz="2400" dirty="0">
                 <a:solidFill>
                   <a:schemeClr val="bg1"/>
                 </a:solidFill>
@@ -4393,7 +4615,7 @@
               <a:t>: A corpus for natural language inference on scientific text." </a:t>
             </a:r>
             <a:r>
-              <a:rPr lang="en-GB" sz="2300" dirty="0" err="1">
+              <a:rPr lang="en-GB" sz="2400" dirty="0" err="1">
                 <a:solidFill>
                   <a:schemeClr val="bg1"/>
                 </a:solidFill>
@@ -4404,7 +4626,7 @@
               <a:t>arXiv</a:t>
             </a:r>
             <a:r>
-              <a:rPr lang="en-GB" sz="2300" dirty="0">
+              <a:rPr lang="en-GB" sz="2400" dirty="0">
                 <a:solidFill>
                   <a:schemeClr val="bg1"/>
                 </a:solidFill>
@@ -4443,7 +4665,7 @@
           <p:nvPr/>
         </p:nvPicPr>
         <p:blipFill rotWithShape="1">
-          <a:blip r:embed="rId2">
+          <a:blip r:embed="rId3">
             <a:extLst>
               <a:ext uri="{28A0092B-C50C-407E-A947-70E740481C1C}">
                 <a14:useLocalDpi xmlns:a14="http://schemas.microsoft.com/office/drawing/2010/main" val="0"/>
@@ -4488,14 +4710,14 @@
           <p:nvPr>
             <p:extLst>
               <p:ext uri="{D42A27DB-BD31-4B8C-83A1-F6EECF244321}">
-                <p14:modId xmlns:p14="http://schemas.microsoft.com/office/powerpoint/2010/main" val="1901920704"/>
+                <p14:modId xmlns:p14="http://schemas.microsoft.com/office/powerpoint/2010/main" val="1473218545"/>
               </p:ext>
             </p:extLst>
           </p:nvPr>
         </p:nvGraphicFramePr>
         <p:xfrm>
-          <a:off x="14950442" y="26564843"/>
-          <a:ext cx="28083809" cy="5127708"/>
+          <a:off x="14950415" y="28147322"/>
+          <a:ext cx="28239705" cy="4141878"/>
         </p:xfrm>
         <a:graphic>
           <a:graphicData uri="http://schemas.openxmlformats.org/drawingml/2006/table">
@@ -4504,91 +4726,91 @@
                 <a:tableStyleId>{5940675A-B579-460E-94D1-54222C63F5DA}</a:tableStyleId>
               </a:tblPr>
               <a:tblGrid>
-                <a:gridCol w="2160293">
+                <a:gridCol w="2172285">
                   <a:extLst>
                     <a:ext uri="{9D8B030D-6E8A-4147-A177-3AD203B41FA5}">
                       <a16:colId xmlns:a16="http://schemas.microsoft.com/office/drawing/2014/main" val="2074238800"/>
                     </a:ext>
                   </a:extLst>
                 </a:gridCol>
-                <a:gridCol w="2160293">
+                <a:gridCol w="2172285">
                   <a:extLst>
                     <a:ext uri="{9D8B030D-6E8A-4147-A177-3AD203B41FA5}">
                       <a16:colId xmlns:a16="http://schemas.microsoft.com/office/drawing/2014/main" val="2240268206"/>
                     </a:ext>
                   </a:extLst>
                 </a:gridCol>
-                <a:gridCol w="2160293">
+                <a:gridCol w="2172285">
                   <a:extLst>
                     <a:ext uri="{9D8B030D-6E8A-4147-A177-3AD203B41FA5}">
                       <a16:colId xmlns:a16="http://schemas.microsoft.com/office/drawing/2014/main" val="3305914191"/>
                     </a:ext>
                   </a:extLst>
                 </a:gridCol>
-                <a:gridCol w="2160293">
+                <a:gridCol w="2172285">
                   <a:extLst>
                     <a:ext uri="{9D8B030D-6E8A-4147-A177-3AD203B41FA5}">
                       <a16:colId xmlns:a16="http://schemas.microsoft.com/office/drawing/2014/main" val="3391066115"/>
                     </a:ext>
                   </a:extLst>
                 </a:gridCol>
-                <a:gridCol w="2160293">
+                <a:gridCol w="2172285">
                   <a:extLst>
                     <a:ext uri="{9D8B030D-6E8A-4147-A177-3AD203B41FA5}">
                       <a16:colId xmlns:a16="http://schemas.microsoft.com/office/drawing/2014/main" val="4079886862"/>
                     </a:ext>
                   </a:extLst>
                 </a:gridCol>
-                <a:gridCol w="2160293">
+                <a:gridCol w="2172285">
                   <a:extLst>
                     <a:ext uri="{9D8B030D-6E8A-4147-A177-3AD203B41FA5}">
                       <a16:colId xmlns:a16="http://schemas.microsoft.com/office/drawing/2014/main" val="1603675036"/>
                     </a:ext>
                   </a:extLst>
                 </a:gridCol>
-                <a:gridCol w="2160293">
+                <a:gridCol w="2172285">
                   <a:extLst>
                     <a:ext uri="{9D8B030D-6E8A-4147-A177-3AD203B41FA5}">
                       <a16:colId xmlns:a16="http://schemas.microsoft.com/office/drawing/2014/main" val="1095657681"/>
                     </a:ext>
                   </a:extLst>
                 </a:gridCol>
-                <a:gridCol w="2160293">
+                <a:gridCol w="2172285">
                   <a:extLst>
                     <a:ext uri="{9D8B030D-6E8A-4147-A177-3AD203B41FA5}">
                       <a16:colId xmlns:a16="http://schemas.microsoft.com/office/drawing/2014/main" val="2061514745"/>
                     </a:ext>
                   </a:extLst>
                 </a:gridCol>
-                <a:gridCol w="2160293">
+                <a:gridCol w="2172285">
                   <a:extLst>
                     <a:ext uri="{9D8B030D-6E8A-4147-A177-3AD203B41FA5}">
                       <a16:colId xmlns:a16="http://schemas.microsoft.com/office/drawing/2014/main" val="4013144454"/>
                     </a:ext>
                   </a:extLst>
                 </a:gridCol>
-                <a:gridCol w="2160293">
+                <a:gridCol w="2172285">
                   <a:extLst>
                     <a:ext uri="{9D8B030D-6E8A-4147-A177-3AD203B41FA5}">
                       <a16:colId xmlns:a16="http://schemas.microsoft.com/office/drawing/2014/main" val="3579964545"/>
                     </a:ext>
                   </a:extLst>
                 </a:gridCol>
-                <a:gridCol w="2160293">
+                <a:gridCol w="2172285">
                   <a:extLst>
                     <a:ext uri="{9D8B030D-6E8A-4147-A177-3AD203B41FA5}">
                       <a16:colId xmlns:a16="http://schemas.microsoft.com/office/drawing/2014/main" val="3448529985"/>
                     </a:ext>
                   </a:extLst>
                 </a:gridCol>
-                <a:gridCol w="2160293">
+                <a:gridCol w="2172285">
                   <a:extLst>
                     <a:ext uri="{9D8B030D-6E8A-4147-A177-3AD203B41FA5}">
                       <a16:colId xmlns:a16="http://schemas.microsoft.com/office/drawing/2014/main" val="2131172517"/>
                     </a:ext>
                   </a:extLst>
                 </a:gridCol>
-                <a:gridCol w="2160293">
+                <a:gridCol w="2172285">
                   <a:extLst>
                     <a:ext uri="{9D8B030D-6E8A-4147-A177-3AD203B41FA5}">
                       <a16:colId xmlns:a16="http://schemas.microsoft.com/office/drawing/2014/main" val="1762411193"/>
@@ -4596,7 +4818,7 @@
                   </a:extLst>
                 </a:gridCol>
               </a:tblGrid>
-              <a:tr h="1070161">
+              <a:tr h="1842180">
                 <a:tc>
                   <a:txBody>
                     <a:bodyPr/>
@@ -4604,7 +4826,7 @@
                     <a:p>
                       <a:pPr algn="ctr"/>
                       <a:r>
-                        <a:rPr lang="en-US" sz="3200" b="0" dirty="0">
+                        <a:rPr lang="en-US" sz="3600" b="0" dirty="0">
                           <a:solidFill>
                             <a:srgbClr val="FBD206"/>
                           </a:solidFill>
@@ -4614,7 +4836,7 @@
                         </a:rPr>
                         <a:t>Method</a:t>
                       </a:r>
-                      <a:endParaRPr lang="en-GB" sz="3200" b="0" dirty="0">
+                      <a:endParaRPr lang="en-GB" sz="3600" b="0" dirty="0">
                         <a:solidFill>
                           <a:srgbClr val="FBD206"/>
                         </a:solidFill>
@@ -4633,7 +4855,7 @@
                     <a:p>
                       <a:pPr algn="ctr" fontAlgn="b"/>
                       <a:r>
-                        <a:rPr lang="en-GB" sz="3200" b="0" i="0" u="none" strike="noStrike" dirty="0">
+                        <a:rPr lang="en-GB" sz="3600" b="0" i="0" u="none" strike="noStrike" dirty="0">
                           <a:solidFill>
                             <a:srgbClr val="FBD206"/>
                           </a:solidFill>
@@ -4655,7 +4877,7 @@
                     <a:p>
                       <a:pPr algn="ctr" fontAlgn="b"/>
                       <a:r>
-                        <a:rPr lang="en-GB" sz="3200" b="0" i="0" u="none" strike="noStrike" dirty="0">
+                        <a:rPr lang="en-GB" sz="3600" b="0" i="0" u="none" strike="noStrike" dirty="0">
                           <a:solidFill>
                             <a:srgbClr val="FBD206"/>
                           </a:solidFill>
@@ -4677,7 +4899,7 @@
                     <a:p>
                       <a:pPr algn="ctr" fontAlgn="b"/>
                       <a:r>
-                        <a:rPr lang="en-GB" sz="3200" b="0" i="0" u="none" strike="noStrike">
+                        <a:rPr lang="en-GB" sz="3600" b="0" i="0" u="none" strike="noStrike">
                           <a:solidFill>
                             <a:srgbClr val="FBD206"/>
                           </a:solidFill>
@@ -4699,7 +4921,7 @@
                     <a:p>
                       <a:pPr algn="ctr" fontAlgn="b"/>
                       <a:r>
-                        <a:rPr lang="en-GB" sz="3200" b="0" i="0" u="none" strike="noStrike" dirty="0">
+                        <a:rPr lang="en-GB" sz="3600" b="0" i="0" u="none" strike="noStrike" dirty="0">
                           <a:solidFill>
                             <a:srgbClr val="FBD206"/>
                           </a:solidFill>
@@ -4721,7 +4943,7 @@
                     <a:p>
                       <a:pPr algn="ctr" fontAlgn="b"/>
                       <a:r>
-                        <a:rPr lang="en-GB" sz="3200" b="0" i="0" u="none" strike="noStrike">
+                        <a:rPr lang="en-GB" sz="3600" b="0" i="0" u="none" strike="noStrike">
                           <a:solidFill>
                             <a:srgbClr val="FBD206"/>
                           </a:solidFill>
@@ -4743,7 +4965,7 @@
                     <a:p>
                       <a:pPr algn="ctr" fontAlgn="b"/>
                       <a:r>
-                        <a:rPr lang="en-GB" sz="3200" b="0" i="0" u="none" strike="noStrike">
+                        <a:rPr lang="en-GB" sz="3600" b="0" i="0" u="none" strike="noStrike">
                           <a:solidFill>
                             <a:srgbClr val="FBD206"/>
                           </a:solidFill>
@@ -4765,7 +4987,7 @@
                     <a:p>
                       <a:pPr algn="ctr" fontAlgn="b"/>
                       <a:r>
-                        <a:rPr lang="en-GB" sz="3200" b="0" i="0" u="none" strike="noStrike" dirty="0">
+                        <a:rPr lang="en-GB" sz="3600" b="0" i="0" u="none" strike="noStrike" dirty="0">
                           <a:solidFill>
                             <a:srgbClr val="FBD206"/>
                           </a:solidFill>
@@ -4787,7 +5009,7 @@
                     <a:p>
                       <a:pPr algn="ctr" fontAlgn="b"/>
                       <a:r>
-                        <a:rPr lang="en-GB" sz="3200" b="0" i="0" u="none" strike="noStrike" dirty="0">
+                        <a:rPr lang="en-GB" sz="3600" b="0" i="0" u="none" strike="noStrike" dirty="0">
                           <a:solidFill>
                             <a:srgbClr val="FBD206"/>
                           </a:solidFill>
@@ -4809,7 +5031,7 @@
                     <a:p>
                       <a:pPr algn="ctr" fontAlgn="b"/>
                       <a:r>
-                        <a:rPr lang="en-GB" sz="3200" b="0" i="0" u="none" strike="noStrike" dirty="0">
+                        <a:rPr lang="en-GB" sz="3600" b="0" i="0" u="none" strike="noStrike" dirty="0">
                           <a:solidFill>
                             <a:srgbClr val="FBD206"/>
                           </a:solidFill>
@@ -4831,7 +5053,7 @@
                     <a:p>
                       <a:pPr algn="ctr" fontAlgn="b"/>
                       <a:r>
-                        <a:rPr lang="en-GB" sz="3200" b="0" i="0" u="none" strike="noStrike" dirty="0">
+                        <a:rPr lang="en-GB" sz="3600" b="0" i="0" u="none" strike="noStrike" dirty="0">
                           <a:solidFill>
                             <a:srgbClr val="FBD206"/>
                           </a:solidFill>
@@ -4853,7 +5075,7 @@
                     <a:p>
                       <a:pPr algn="ctr" fontAlgn="b"/>
                       <a:r>
-                        <a:rPr lang="en-GB" sz="3200" b="0" i="0" u="none" strike="noStrike" dirty="0">
+                        <a:rPr lang="en-GB" sz="3600" b="0" i="0" u="none" strike="noStrike" dirty="0">
                           <a:solidFill>
                             <a:srgbClr val="FBD206"/>
                           </a:solidFill>
@@ -4875,7 +5097,7 @@
                     <a:p>
                       <a:pPr algn="ctr" fontAlgn="b"/>
                       <a:r>
-                        <a:rPr lang="en-GB" sz="3200" b="0" i="0" u="none" strike="noStrike" dirty="0">
+                        <a:rPr lang="en-GB" sz="3600" b="0" i="0" u="none" strike="noStrike" dirty="0">
                           <a:solidFill>
                             <a:srgbClr val="FBD206"/>
                           </a:solidFill>
@@ -4896,7 +5118,7 @@
                   </a:ext>
                 </a:extLst>
               </a:tr>
-              <a:tr h="1828524">
+              <a:tr h="1149849">
                 <a:tc>
                   <a:txBody>
                     <a:bodyPr/>
@@ -4904,7 +5126,7 @@
                     <a:p>
                       <a:pPr algn="ctr"/>
                       <a:r>
-                        <a:rPr lang="en-US" sz="4000" dirty="0">
+                        <a:rPr lang="en-US" sz="4800" dirty="0">
                           <a:solidFill>
                             <a:schemeClr val="bg1"/>
                           </a:solidFill>
@@ -4914,7 +5136,7 @@
                         </a:rPr>
                         <a:t>B</a:t>
                       </a:r>
-                      <a:endParaRPr lang="en-GB" sz="4000" dirty="0">
+                      <a:endParaRPr lang="en-GB" sz="4800" dirty="0">
                         <a:solidFill>
                           <a:schemeClr val="bg1"/>
                         </a:solidFill>
@@ -4933,7 +5155,7 @@
                     <a:p>
                       <a:pPr algn="ctr" fontAlgn="b"/>
                       <a:r>
-                        <a:rPr lang="en-GB" sz="4000" b="0" i="0" u="none" strike="noStrike" dirty="0">
+                        <a:rPr lang="en-GB" sz="4800" b="0" i="0" u="none" strike="noStrike" dirty="0">
                           <a:solidFill>
                             <a:schemeClr val="bg1"/>
                           </a:solidFill>
@@ -4955,7 +5177,7 @@
                     <a:p>
                       <a:pPr algn="ctr" fontAlgn="b"/>
                       <a:r>
-                        <a:rPr lang="en-GB" sz="4000" b="0" i="0" u="none" strike="noStrike" dirty="0">
+                        <a:rPr lang="en-GB" sz="4800" b="0" i="0" u="none" strike="noStrike" dirty="0">
                           <a:solidFill>
                             <a:schemeClr val="bg1"/>
                           </a:solidFill>
@@ -4977,7 +5199,7 @@
                     <a:p>
                       <a:pPr algn="ctr" fontAlgn="b"/>
                       <a:r>
-                        <a:rPr lang="en-GB" sz="4000" b="0" i="0" u="none" strike="noStrike" dirty="0">
+                        <a:rPr lang="en-GB" sz="4800" b="0" i="0" u="none" strike="noStrike" dirty="0">
                           <a:solidFill>
                             <a:schemeClr val="bg1"/>
                           </a:solidFill>
@@ -4999,7 +5221,7 @@
                     <a:p>
                       <a:pPr algn="ctr" fontAlgn="b"/>
                       <a:r>
-                        <a:rPr lang="en-GB" sz="4000" b="0" i="0" u="none" strike="noStrike" dirty="0">
+                        <a:rPr lang="en-GB" sz="4800" b="0" i="0" u="none" strike="noStrike" dirty="0">
                           <a:solidFill>
                             <a:schemeClr val="bg1"/>
                           </a:solidFill>
@@ -5021,7 +5243,7 @@
                     <a:p>
                       <a:pPr algn="ctr" fontAlgn="b"/>
                       <a:r>
-                        <a:rPr lang="en-GB" sz="4000" b="0" i="0" u="none" strike="noStrike" dirty="0">
+                        <a:rPr lang="en-GB" sz="4800" b="0" i="0" u="none" strike="noStrike" dirty="0">
                           <a:solidFill>
                             <a:schemeClr val="bg1"/>
                           </a:solidFill>
@@ -5043,7 +5265,7 @@
                     <a:p>
                       <a:pPr algn="ctr" fontAlgn="b"/>
                       <a:r>
-                        <a:rPr lang="en-GB" sz="4000" b="0" i="0" u="none" strike="noStrike" dirty="0">
+                        <a:rPr lang="en-GB" sz="4800" b="0" i="0" u="none" strike="noStrike" dirty="0">
                           <a:solidFill>
                             <a:schemeClr val="bg1"/>
                           </a:solidFill>
@@ -5065,7 +5287,7 @@
                     <a:p>
                       <a:pPr algn="ctr" fontAlgn="b"/>
                       <a:r>
-                        <a:rPr lang="en-GB" sz="4000" b="0" i="0" u="none" strike="noStrike" dirty="0">
+                        <a:rPr lang="en-GB" sz="4800" b="0" i="0" u="none" strike="noStrike" dirty="0">
                           <a:solidFill>
                             <a:schemeClr val="bg1"/>
                           </a:solidFill>
@@ -5087,7 +5309,7 @@
                     <a:p>
                       <a:pPr algn="ctr" fontAlgn="b"/>
                       <a:r>
-                        <a:rPr lang="en-GB" sz="4000" b="0" i="0" u="none" strike="noStrike" dirty="0">
+                        <a:rPr lang="en-GB" sz="4800" b="0" i="0" u="none" strike="noStrike" dirty="0">
                           <a:solidFill>
                             <a:schemeClr val="bg1"/>
                           </a:solidFill>
@@ -5109,7 +5331,7 @@
                     <a:p>
                       <a:pPr algn="ctr" fontAlgn="b"/>
                       <a:r>
-                        <a:rPr lang="en-GB" sz="4000" b="0" i="0" u="none" strike="noStrike" dirty="0">
+                        <a:rPr lang="en-GB" sz="4800" b="0" i="0" u="none" strike="noStrike" dirty="0">
                           <a:solidFill>
                             <a:schemeClr val="bg1"/>
                           </a:solidFill>
@@ -5131,7 +5353,7 @@
                     <a:p>
                       <a:pPr algn="ctr" fontAlgn="b"/>
                       <a:r>
-                        <a:rPr lang="en-GB" sz="4000" b="0" i="0" u="none" strike="noStrike" dirty="0">
+                        <a:rPr lang="en-GB" sz="4800" b="0" i="0" u="none" strike="noStrike" dirty="0">
                           <a:solidFill>
                             <a:schemeClr val="bg1"/>
                           </a:solidFill>
@@ -5153,7 +5375,7 @@
                     <a:p>
                       <a:pPr algn="ctr" fontAlgn="b"/>
                       <a:r>
-                        <a:rPr lang="en-GB" sz="4000" b="0" i="0" u="none" strike="noStrike" dirty="0">
+                        <a:rPr lang="en-GB" sz="4800" b="0" i="0" u="none" strike="noStrike" dirty="0">
                           <a:solidFill>
                             <a:schemeClr val="bg1"/>
                           </a:solidFill>
@@ -5175,7 +5397,7 @@
                     <a:p>
                       <a:pPr algn="ctr" fontAlgn="b"/>
                       <a:r>
-                        <a:rPr lang="en-GB" sz="4000" b="0" i="0" u="none" strike="noStrike" dirty="0">
+                        <a:rPr lang="en-GB" sz="4800" b="0" i="0" u="none" strike="noStrike" dirty="0">
                           <a:solidFill>
                             <a:schemeClr val="bg1"/>
                           </a:solidFill>
@@ -5196,7 +5418,7 @@
                   </a:ext>
                 </a:extLst>
               </a:tr>
-              <a:tr h="1828524">
+              <a:tr h="1149849">
                 <a:tc>
                   <a:txBody>
                     <a:bodyPr/>
@@ -5204,7 +5426,7 @@
                     <a:p>
                       <a:pPr algn="ctr"/>
                       <a:r>
-                        <a:rPr lang="en-US" sz="4000" dirty="0">
+                        <a:rPr lang="en-US" sz="4800" dirty="0">
                           <a:solidFill>
                             <a:schemeClr val="bg1"/>
                           </a:solidFill>
@@ -5214,7 +5436,7 @@
                         </a:rPr>
                         <a:t>C</a:t>
                       </a:r>
-                      <a:endParaRPr lang="en-GB" sz="4000" dirty="0">
+                      <a:endParaRPr lang="en-GB" sz="4800" dirty="0">
                         <a:solidFill>
                           <a:schemeClr val="bg1"/>
                         </a:solidFill>
@@ -5232,18 +5454,21 @@
                     <a:lstStyle/>
                     <a:p>
                       <a:pPr algn="ctr" fontAlgn="b"/>
-                      <a:endParaRPr lang="en-GB" sz="4000" b="0" i="0" u="none" strike="noStrike" dirty="0">
-                        <a:solidFill>
-                          <a:schemeClr val="bg1"/>
-                        </a:solidFill>
-                        <a:effectLst/>
-                        <a:latin typeface="Open Sans Light" pitchFamily="2" charset="0"/>
-                        <a:ea typeface="Open Sans Light" pitchFamily="2" charset="0"/>
-                        <a:cs typeface="Open Sans Light" pitchFamily="2" charset="0"/>
-                      </a:endParaRPr>
+                      <a:r>
+                        <a:rPr lang="en-GB" sz="4800" b="0" i="0" u="none" strike="noStrike" dirty="0">
+                          <a:solidFill>
+                            <a:schemeClr val="bg1"/>
+                          </a:solidFill>
+                          <a:effectLst/>
+                          <a:latin typeface="Open Sans Light" pitchFamily="2" charset="0"/>
+                          <a:ea typeface="Open Sans Light" pitchFamily="2" charset="0"/>
+                          <a:cs typeface="Open Sans Light" pitchFamily="2" charset="0"/>
+                        </a:rPr>
+                        <a:t>0.874</a:t>
+                      </a:r>
                     </a:p>
                   </a:txBody>
-                  <a:tcPr marL="9525" marR="9525" marT="9525" marB="0" anchor="ctr"/>
+                  <a:tcPr marL="7620" marR="7620" marT="7620" marB="0" anchor="ctr"/>
                 </a:tc>
                 <a:tc>
                   <a:txBody>
@@ -5251,18 +5476,21 @@
                     <a:lstStyle/>
                     <a:p>
                       <a:pPr algn="ctr" fontAlgn="b"/>
-                      <a:endParaRPr lang="en-GB" sz="4000" b="0" i="0" u="none" strike="noStrike" dirty="0">
-                        <a:solidFill>
-                          <a:schemeClr val="bg1"/>
-                        </a:solidFill>
-                        <a:effectLst/>
-                        <a:latin typeface="Open Sans Light" pitchFamily="2" charset="0"/>
-                        <a:ea typeface="Open Sans Light" pitchFamily="2" charset="0"/>
-                        <a:cs typeface="Open Sans Light" pitchFamily="2" charset="0"/>
-                      </a:endParaRPr>
+                      <a:r>
+                        <a:rPr lang="en-GB" sz="4800" b="0" i="0" u="none" strike="noStrike" dirty="0">
+                          <a:solidFill>
+                            <a:schemeClr val="bg1"/>
+                          </a:solidFill>
+                          <a:effectLst/>
+                          <a:latin typeface="Open Sans Light" pitchFamily="2" charset="0"/>
+                          <a:ea typeface="Open Sans Light" pitchFamily="2" charset="0"/>
+                          <a:cs typeface="Open Sans Light" pitchFamily="2" charset="0"/>
+                        </a:rPr>
+                        <a:t>0.902</a:t>
+                      </a:r>
                     </a:p>
                   </a:txBody>
-                  <a:tcPr marL="9525" marR="9525" marT="9525" marB="0" anchor="ctr"/>
+                  <a:tcPr marL="7620" marR="7620" marT="7620" marB="0" anchor="ctr"/>
                 </a:tc>
                 <a:tc>
                   <a:txBody>
@@ -5270,18 +5498,21 @@
                     <a:lstStyle/>
                     <a:p>
                       <a:pPr algn="ctr" fontAlgn="b"/>
-                      <a:endParaRPr lang="en-GB" sz="4000" b="0" i="0" u="none" strike="noStrike" dirty="0">
-                        <a:solidFill>
-                          <a:schemeClr val="bg1"/>
-                        </a:solidFill>
-                        <a:effectLst/>
-                        <a:latin typeface="Open Sans Light" pitchFamily="2" charset="0"/>
-                        <a:ea typeface="Open Sans Light" pitchFamily="2" charset="0"/>
-                        <a:cs typeface="Open Sans Light" pitchFamily="2" charset="0"/>
-                      </a:endParaRPr>
+                      <a:r>
+                        <a:rPr lang="en-GB" sz="4800" b="0" i="0" u="none" strike="noStrike" dirty="0">
+                          <a:solidFill>
+                            <a:schemeClr val="bg1"/>
+                          </a:solidFill>
+                          <a:effectLst/>
+                          <a:latin typeface="Open Sans Light" pitchFamily="2" charset="0"/>
+                          <a:ea typeface="Open Sans Light" pitchFamily="2" charset="0"/>
+                          <a:cs typeface="Open Sans Light" pitchFamily="2" charset="0"/>
+                        </a:rPr>
+                        <a:t>0.874</a:t>
+                      </a:r>
                     </a:p>
                   </a:txBody>
-                  <a:tcPr marL="9525" marR="9525" marT="9525" marB="0" anchor="ctr"/>
+                  <a:tcPr marL="7620" marR="7620" marT="7620" marB="0" anchor="ctr"/>
                 </a:tc>
                 <a:tc>
                   <a:txBody>
@@ -5289,18 +5520,21 @@
                     <a:lstStyle/>
                     <a:p>
                       <a:pPr algn="ctr" fontAlgn="b"/>
-                      <a:endParaRPr lang="en-GB" sz="4000" b="0" i="0" u="none" strike="noStrike" dirty="0">
-                        <a:solidFill>
-                          <a:schemeClr val="bg1"/>
-                        </a:solidFill>
-                        <a:effectLst/>
-                        <a:latin typeface="Open Sans Light" pitchFamily="2" charset="0"/>
-                        <a:ea typeface="Open Sans Light" pitchFamily="2" charset="0"/>
-                        <a:cs typeface="Open Sans Light" pitchFamily="2" charset="0"/>
-                      </a:endParaRPr>
+                      <a:r>
+                        <a:rPr lang="en-GB" sz="4800" b="0" i="0" u="none" strike="noStrike" dirty="0">
+                          <a:solidFill>
+                            <a:schemeClr val="bg1"/>
+                          </a:solidFill>
+                          <a:effectLst/>
+                          <a:latin typeface="Open Sans Light" pitchFamily="2" charset="0"/>
+                          <a:ea typeface="Open Sans Light" pitchFamily="2" charset="0"/>
+                          <a:cs typeface="Open Sans Light" pitchFamily="2" charset="0"/>
+                        </a:rPr>
+                        <a:t>0.875</a:t>
+                      </a:r>
                     </a:p>
                   </a:txBody>
-                  <a:tcPr marL="9525" marR="9525" marT="9525" marB="0" anchor="ctr"/>
+                  <a:tcPr marL="7620" marR="7620" marT="7620" marB="0" anchor="ctr"/>
                 </a:tc>
                 <a:tc>
                   <a:txBody>
@@ -5308,18 +5542,21 @@
                     <a:lstStyle/>
                     <a:p>
                       <a:pPr algn="ctr" fontAlgn="b"/>
-                      <a:endParaRPr lang="en-GB" sz="4000" b="0" i="0" u="none" strike="noStrike" dirty="0">
-                        <a:solidFill>
-                          <a:schemeClr val="bg1"/>
-                        </a:solidFill>
-                        <a:effectLst/>
-                        <a:latin typeface="Open Sans Light" pitchFamily="2" charset="0"/>
-                        <a:ea typeface="Open Sans Light" pitchFamily="2" charset="0"/>
-                        <a:cs typeface="Open Sans Light" pitchFamily="2" charset="0"/>
-                      </a:endParaRPr>
+                      <a:r>
+                        <a:rPr lang="en-GB" sz="4800" b="0" i="0" u="none" strike="noStrike" dirty="0">
+                          <a:solidFill>
+                            <a:schemeClr val="bg1"/>
+                          </a:solidFill>
+                          <a:effectLst/>
+                          <a:latin typeface="Open Sans Light" pitchFamily="2" charset="0"/>
+                          <a:ea typeface="Open Sans Light" pitchFamily="2" charset="0"/>
+                          <a:cs typeface="Open Sans Light" pitchFamily="2" charset="0"/>
+                        </a:rPr>
+                        <a:t>0.848</a:t>
+                      </a:r>
                     </a:p>
                   </a:txBody>
-                  <a:tcPr marL="9525" marR="9525" marT="9525" marB="0" anchor="ctr"/>
+                  <a:tcPr marL="7620" marR="7620" marT="7620" marB="0" anchor="ctr"/>
                 </a:tc>
                 <a:tc>
                   <a:txBody>
@@ -5327,18 +5564,21 @@
                     <a:lstStyle/>
                     <a:p>
                       <a:pPr algn="ctr" fontAlgn="b"/>
-                      <a:endParaRPr lang="en-GB" sz="4000" b="0" i="0" u="none" strike="noStrike" dirty="0">
-                        <a:solidFill>
-                          <a:schemeClr val="bg1"/>
-                        </a:solidFill>
-                        <a:effectLst/>
-                        <a:latin typeface="Open Sans Light" pitchFamily="2" charset="0"/>
-                        <a:ea typeface="Open Sans Light" pitchFamily="2" charset="0"/>
-                        <a:cs typeface="Open Sans Light" pitchFamily="2" charset="0"/>
-                      </a:endParaRPr>
+                      <a:r>
+                        <a:rPr lang="en-GB" sz="4800" b="0" i="0" u="none" strike="noStrike" dirty="0">
+                          <a:solidFill>
+                            <a:schemeClr val="bg1"/>
+                          </a:solidFill>
+                          <a:effectLst/>
+                          <a:latin typeface="Open Sans Light" pitchFamily="2" charset="0"/>
+                          <a:ea typeface="Open Sans Light" pitchFamily="2" charset="0"/>
+                          <a:cs typeface="Open Sans Light" pitchFamily="2" charset="0"/>
+                        </a:rPr>
+                        <a:t>0.875</a:t>
+                      </a:r>
                     </a:p>
                   </a:txBody>
-                  <a:tcPr marL="9525" marR="9525" marT="9525" marB="0" anchor="ctr"/>
+                  <a:tcPr marL="7620" marR="7620" marT="7620" marB="0" anchor="ctr"/>
                 </a:tc>
                 <a:tc>
                   <a:txBody>
@@ -5346,18 +5586,21 @@
                     <a:lstStyle/>
                     <a:p>
                       <a:pPr algn="ctr" fontAlgn="b"/>
-                      <a:endParaRPr lang="en-GB" sz="4000" b="0" i="0" u="none" strike="noStrike" dirty="0">
-                        <a:solidFill>
-                          <a:schemeClr val="bg1"/>
-                        </a:solidFill>
-                        <a:effectLst/>
-                        <a:latin typeface="Open Sans Light" pitchFamily="2" charset="0"/>
-                        <a:ea typeface="Open Sans Light" pitchFamily="2" charset="0"/>
-                        <a:cs typeface="Open Sans Light" pitchFamily="2" charset="0"/>
-                      </a:endParaRPr>
+                      <a:r>
+                        <a:rPr lang="en-GB" sz="4800" b="0" i="0" u="none" strike="noStrike" dirty="0">
+                          <a:solidFill>
+                            <a:schemeClr val="bg1"/>
+                          </a:solidFill>
+                          <a:effectLst/>
+                          <a:latin typeface="Open Sans Light" pitchFamily="2" charset="0"/>
+                          <a:ea typeface="Open Sans Light" pitchFamily="2" charset="0"/>
+                          <a:cs typeface="Open Sans Light" pitchFamily="2" charset="0"/>
+                        </a:rPr>
+                        <a:t>0.874</a:t>
+                      </a:r>
                     </a:p>
                   </a:txBody>
-                  <a:tcPr marL="9525" marR="9525" marT="9525" marB="0" anchor="ctr"/>
+                  <a:tcPr marL="7620" marR="7620" marT="7620" marB="0" anchor="ctr"/>
                 </a:tc>
                 <a:tc>
                   <a:txBody>
@@ -5365,18 +5608,21 @@
                     <a:lstStyle/>
                     <a:p>
                       <a:pPr algn="ctr" fontAlgn="b"/>
-                      <a:endParaRPr lang="en-GB" sz="4000" b="0" i="0" u="none" strike="noStrike" dirty="0">
-                        <a:solidFill>
-                          <a:schemeClr val="bg1"/>
-                        </a:solidFill>
-                        <a:effectLst/>
-                        <a:latin typeface="Open Sans Light" pitchFamily="2" charset="0"/>
-                        <a:ea typeface="Open Sans Light" pitchFamily="2" charset="0"/>
-                        <a:cs typeface="Open Sans Light" pitchFamily="2" charset="0"/>
-                      </a:endParaRPr>
+                      <a:r>
+                        <a:rPr lang="en-GB" sz="4800" b="0" i="0" u="none" strike="noStrike" dirty="0">
+                          <a:solidFill>
+                            <a:schemeClr val="bg1"/>
+                          </a:solidFill>
+                          <a:effectLst/>
+                          <a:latin typeface="Open Sans Light" pitchFamily="2" charset="0"/>
+                          <a:ea typeface="Open Sans Light" pitchFamily="2" charset="0"/>
+                          <a:cs typeface="Open Sans Light" pitchFamily="2" charset="0"/>
+                        </a:rPr>
+                        <a:t>0.874</a:t>
+                      </a:r>
                     </a:p>
                   </a:txBody>
-                  <a:tcPr marL="9525" marR="9525" marT="9525" marB="0" anchor="ctr"/>
+                  <a:tcPr marL="7620" marR="7620" marT="7620" marB="0" anchor="ctr"/>
                 </a:tc>
                 <a:tc>
                   <a:txBody>
@@ -5384,18 +5630,21 @@
                     <a:lstStyle/>
                     <a:p>
                       <a:pPr algn="ctr" fontAlgn="b"/>
-                      <a:endParaRPr lang="en-GB" sz="4000" b="0" i="0" u="none" strike="noStrike" dirty="0">
-                        <a:solidFill>
-                          <a:schemeClr val="bg1"/>
-                        </a:solidFill>
-                        <a:effectLst/>
-                        <a:latin typeface="Open Sans Light" pitchFamily="2" charset="0"/>
-                        <a:ea typeface="Open Sans Light" pitchFamily="2" charset="0"/>
-                        <a:cs typeface="Open Sans Light" pitchFamily="2" charset="0"/>
-                      </a:endParaRPr>
+                      <a:r>
+                        <a:rPr lang="en-GB" sz="4800" b="0" i="0" u="none" strike="noStrike" dirty="0">
+                          <a:solidFill>
+                            <a:schemeClr val="bg1"/>
+                          </a:solidFill>
+                          <a:effectLst/>
+                          <a:latin typeface="Open Sans Light" pitchFamily="2" charset="0"/>
+                          <a:ea typeface="Open Sans Light" pitchFamily="2" charset="0"/>
+                          <a:cs typeface="Open Sans Light" pitchFamily="2" charset="0"/>
+                        </a:rPr>
+                        <a:t>0.874</a:t>
+                      </a:r>
                     </a:p>
                   </a:txBody>
-                  <a:tcPr marL="9525" marR="9525" marT="9525" marB="0" anchor="ctr"/>
+                  <a:tcPr marL="7620" marR="7620" marT="7620" marB="0" anchor="ctr"/>
                 </a:tc>
                 <a:tc>
                   <a:txBody>
@@ -5403,18 +5652,21 @@
                     <a:lstStyle/>
                     <a:p>
                       <a:pPr algn="ctr" fontAlgn="b"/>
-                      <a:endParaRPr lang="en-GB" sz="4000" b="0" i="0" u="none" strike="noStrike" dirty="0">
-                        <a:solidFill>
-                          <a:schemeClr val="bg1"/>
-                        </a:solidFill>
-                        <a:effectLst/>
-                        <a:latin typeface="Open Sans Light" pitchFamily="2" charset="0"/>
-                        <a:ea typeface="Open Sans Light" pitchFamily="2" charset="0"/>
-                        <a:cs typeface="Open Sans Light" pitchFamily="2" charset="0"/>
-                      </a:endParaRPr>
+                      <a:r>
+                        <a:rPr lang="en-GB" sz="4800" b="0" i="0" u="none" strike="noStrike" dirty="0">
+                          <a:solidFill>
+                            <a:schemeClr val="bg1"/>
+                          </a:solidFill>
+                          <a:effectLst/>
+                          <a:latin typeface="Open Sans Light" pitchFamily="2" charset="0"/>
+                          <a:ea typeface="Open Sans Light" pitchFamily="2" charset="0"/>
+                          <a:cs typeface="Open Sans Light" pitchFamily="2" charset="0"/>
+                        </a:rPr>
+                        <a:t>0.874</a:t>
+                      </a:r>
                     </a:p>
                   </a:txBody>
-                  <a:tcPr marL="9525" marR="9525" marT="9525" marB="0" anchor="ctr"/>
+                  <a:tcPr marL="7620" marR="7620" marT="7620" marB="0" anchor="ctr"/>
                 </a:tc>
                 <a:tc>
                   <a:txBody>
@@ -5422,18 +5674,21 @@
                     <a:lstStyle/>
                     <a:p>
                       <a:pPr algn="ctr" fontAlgn="b"/>
-                      <a:endParaRPr lang="en-GB" sz="4000" b="0" i="0" u="none" strike="noStrike" dirty="0">
-                        <a:solidFill>
-                          <a:schemeClr val="bg1"/>
-                        </a:solidFill>
-                        <a:effectLst/>
-                        <a:latin typeface="Open Sans Light" pitchFamily="2" charset="0"/>
-                        <a:ea typeface="Open Sans Light" pitchFamily="2" charset="0"/>
-                        <a:cs typeface="Open Sans Light" pitchFamily="2" charset="0"/>
-                      </a:endParaRPr>
+                      <a:r>
+                        <a:rPr lang="en-GB" sz="4800" b="0" i="0" u="none" strike="noStrike" dirty="0">
+                          <a:solidFill>
+                            <a:schemeClr val="bg1"/>
+                          </a:solidFill>
+                          <a:effectLst/>
+                          <a:latin typeface="Open Sans Light" pitchFamily="2" charset="0"/>
+                          <a:ea typeface="Open Sans Light" pitchFamily="2" charset="0"/>
+                          <a:cs typeface="Open Sans Light" pitchFamily="2" charset="0"/>
+                        </a:rPr>
+                        <a:t>0.749</a:t>
+                      </a:r>
                     </a:p>
                   </a:txBody>
-                  <a:tcPr marL="9525" marR="9525" marT="9525" marB="0" anchor="ctr"/>
+                  <a:tcPr marL="7620" marR="7620" marT="7620" marB="0" anchor="ctr"/>
                 </a:tc>
                 <a:tc>
                   <a:txBody>
@@ -5441,18 +5696,21 @@
                     <a:lstStyle/>
                     <a:p>
                       <a:pPr algn="ctr" fontAlgn="b"/>
-                      <a:endParaRPr lang="en-GB" sz="4000" b="0" i="0" u="none" strike="noStrike" dirty="0">
-                        <a:solidFill>
-                          <a:schemeClr val="bg1"/>
-                        </a:solidFill>
-                        <a:effectLst/>
-                        <a:latin typeface="Open Sans Light" pitchFamily="2" charset="0"/>
-                        <a:ea typeface="Open Sans Light" pitchFamily="2" charset="0"/>
-                        <a:cs typeface="Open Sans Light" pitchFamily="2" charset="0"/>
-                      </a:endParaRPr>
+                      <a:r>
+                        <a:rPr lang="en-GB" sz="4800" b="0" i="0" u="none" strike="noStrike" dirty="0">
+                          <a:solidFill>
+                            <a:schemeClr val="bg1"/>
+                          </a:solidFill>
+                          <a:effectLst/>
+                          <a:latin typeface="Open Sans Light" pitchFamily="2" charset="0"/>
+                          <a:ea typeface="Open Sans Light" pitchFamily="2" charset="0"/>
+                          <a:cs typeface="Open Sans Light" pitchFamily="2" charset="0"/>
+                        </a:rPr>
+                        <a:t>1.849</a:t>
+                      </a:r>
                     </a:p>
                   </a:txBody>
-                  <a:tcPr marL="9525" marR="9525" marT="9525" marB="0" anchor="ctr"/>
+                  <a:tcPr marL="7620" marR="7620" marT="7620" marB="0" anchor="ctr"/>
                 </a:tc>
                 <a:extLst>
                   <a:ext uri="{0D108BD9-81ED-4DB2-BD59-A6C34878D82A}">
@@ -5464,95 +5722,12 @@
           </a:graphicData>
         </a:graphic>
       </p:graphicFrame>
-      <p:sp>
-        <p:nvSpPr>
-          <p:cNvPr id="6" name="Rectangle: Rounded Corners 5">
+      <p:grpSp>
+        <p:nvGrpSpPr>
+          <p:cNvPr id="44" name="Group 43">
             <a:extLst>
               <a:ext uri="{FF2B5EF4-FFF2-40B4-BE49-F238E27FC236}">
-                <a16:creationId xmlns:a16="http://schemas.microsoft.com/office/drawing/2014/main" id="{C18D1764-DEC6-08A2-1CE8-A0FA70C0F3C5}"/>
-              </a:ext>
-            </a:extLst>
-          </p:cNvPr>
-          <p:cNvSpPr/>
-          <p:nvPr/>
-        </p:nvSpPr>
-        <p:spPr>
-          <a:xfrm>
-            <a:off x="14950441" y="17094170"/>
-            <a:ext cx="28239721" cy="7729220"/>
-          </a:xfrm>
-          <a:prstGeom prst="roundRect">
-            <a:avLst>
-              <a:gd name="adj" fmla="val 10428"/>
-            </a:avLst>
-          </a:prstGeom>
-          <a:solidFill>
-            <a:srgbClr val="A799B7"/>
-          </a:solidFill>
-          <a:ln>
-            <a:noFill/>
-          </a:ln>
-        </p:spPr>
-        <p:style>
-          <a:lnRef idx="2">
-            <a:schemeClr val="accent1">
-              <a:shade val="15000"/>
-            </a:schemeClr>
-          </a:lnRef>
-          <a:fillRef idx="1">
-            <a:schemeClr val="accent1"/>
-          </a:fillRef>
-          <a:effectRef idx="0">
-            <a:schemeClr val="accent1"/>
-          </a:effectRef>
-          <a:fontRef idx="minor">
-            <a:schemeClr val="lt1"/>
-          </a:fontRef>
-        </p:style>
-        <p:txBody>
-          <a:bodyPr rtlCol="0" anchor="t"/>
-          <a:lstStyle/>
-          <a:p>
-            <a:pPr algn="ctr"/>
-            <a:r>
-              <a:rPr lang="en-US" sz="6600" dirty="0">
-                <a:solidFill>
-                  <a:srgbClr val="FBD206"/>
-                </a:solidFill>
-                <a:latin typeface="Open Sans SemiBold" pitchFamily="2" charset="0"/>
-                <a:ea typeface="Open Sans SemiBold" pitchFamily="2" charset="0"/>
-                <a:cs typeface="Open Sans SemiBold" pitchFamily="2" charset="0"/>
-              </a:rPr>
-              <a:t>Task C: Figures</a:t>
-            </a:r>
-            <a:endParaRPr lang="en-GB" sz="6600" dirty="0">
-              <a:solidFill>
-                <a:schemeClr val="bg1"/>
-              </a:solidFill>
-              <a:latin typeface="Open Sans Light" pitchFamily="2" charset="0"/>
-              <a:ea typeface="Open Sans Light" pitchFamily="2" charset="0"/>
-              <a:cs typeface="Open Sans Light" pitchFamily="2" charset="0"/>
-            </a:endParaRPr>
-          </a:p>
-          <a:p>
-            <a:pPr algn="ctr"/>
-            <a:endParaRPr lang="en-GB" sz="6600" dirty="0">
-              <a:solidFill>
-                <a:srgbClr val="FBD206"/>
-              </a:solidFill>
-              <a:latin typeface="Open Sans Light" pitchFamily="2" charset="0"/>
-              <a:ea typeface="Open Sans Light" pitchFamily="2" charset="0"/>
-              <a:cs typeface="Open Sans Light" pitchFamily="2" charset="0"/>
-            </a:endParaRPr>
-          </a:p>
-        </p:txBody>
-      </p:sp>
-      <p:grpSp>
-        <p:nvGrpSpPr>
-          <p:cNvPr id="7" name="Group 6">
-            <a:extLst>
-              <a:ext uri="{FF2B5EF4-FFF2-40B4-BE49-F238E27FC236}">
-                <a16:creationId xmlns:a16="http://schemas.microsoft.com/office/drawing/2014/main" id="{E90B5867-6BB6-3952-DE9A-82CBC2ADC233}"/>
+                <a16:creationId xmlns:a16="http://schemas.microsoft.com/office/drawing/2014/main" id="{97E300FB-550F-5B0A-E04F-C31F409B244F}"/>
               </a:ext>
             </a:extLst>
           </p:cNvPr>
@@ -5561,10 +5736,10 @@
         </p:nvGrpSpPr>
         <p:grpSpPr>
           <a:xfrm>
-            <a:off x="14950441" y="3789702"/>
-            <a:ext cx="28239720" cy="12929423"/>
-            <a:chOff x="14950441" y="3789702"/>
-            <a:chExt cx="28239720" cy="12929423"/>
+            <a:off x="14950397" y="3817655"/>
+            <a:ext cx="28239720" cy="11347103"/>
+            <a:chOff x="14950440" y="3770977"/>
+            <a:chExt cx="28239720" cy="11347103"/>
           </a:xfrm>
         </p:grpSpPr>
         <p:sp>
@@ -5581,12 +5756,12 @@
           </p:nvSpPr>
           <p:spPr>
             <a:xfrm>
-              <a:off x="14950441" y="3789702"/>
-              <a:ext cx="28239720" cy="12929423"/>
+              <a:off x="14950440" y="3770977"/>
+              <a:ext cx="28239720" cy="11347103"/>
             </a:xfrm>
             <a:prstGeom prst="roundRect">
               <a:avLst>
-                <a:gd name="adj" fmla="val 10428"/>
+                <a:gd name="adj" fmla="val 3710"/>
               </a:avLst>
             </a:prstGeom>
             <a:solidFill>
@@ -5618,7 +5793,7 @@
             <a:p>
               <a:pPr algn="ctr"/>
               <a:r>
-                <a:rPr lang="en-US" sz="6600" dirty="0">
+                <a:rPr lang="en-US" sz="5400" dirty="0">
                   <a:solidFill>
                     <a:srgbClr val="FBD206"/>
                   </a:solidFill>
@@ -5628,7 +5803,7 @@
                 </a:rPr>
                 <a:t>Task B: Figures</a:t>
               </a:r>
-              <a:endParaRPr lang="en-GB" sz="6600" dirty="0">
+              <a:endParaRPr lang="en-GB" sz="5400" dirty="0">
                 <a:solidFill>
                   <a:schemeClr val="bg1"/>
                 </a:solidFill>
@@ -5665,7 +5840,7 @@
             <p:nvPr/>
           </p:nvPicPr>
           <p:blipFill>
-            <a:blip r:embed="rId3">
+            <a:blip r:embed="rId4">
               <a:extLst>
                 <a:ext uri="{28A0092B-C50C-407E-A947-70E740481C1C}">
                   <a14:useLocalDpi xmlns:a14="http://schemas.microsoft.com/office/drawing/2010/main" val="0"/>
@@ -5678,8 +5853,8 @@
           </p:blipFill>
           <p:spPr>
             <a:xfrm>
-              <a:off x="15552643" y="5159276"/>
-              <a:ext cx="11193557" cy="5871467"/>
+              <a:off x="15245497" y="4724400"/>
+              <a:ext cx="11037842" cy="5789787"/>
             </a:xfrm>
             <a:prstGeom prst="rect">
               <a:avLst/>
@@ -5701,7 +5876,7 @@
             <p:nvPr/>
           </p:nvPicPr>
           <p:blipFill>
-            <a:blip r:embed="rId4">
+            <a:blip r:embed="rId5">
               <a:clrChange>
                 <a:clrFrom>
                   <a:srgbClr val="FFFFFF"/>
@@ -5724,8 +5899,8 @@
           </p:blipFill>
           <p:spPr>
             <a:xfrm>
-              <a:off x="32824615" y="5177784"/>
-              <a:ext cx="8103965" cy="5887612"/>
+              <a:off x="33436560" y="4064412"/>
+              <a:ext cx="8961121" cy="6510344"/>
             </a:xfrm>
             <a:prstGeom prst="rect">
               <a:avLst/>
@@ -5748,14 +5923,14 @@
           <p:nvPr>
             <p:extLst>
               <p:ext uri="{D42A27DB-BD31-4B8C-83A1-F6EECF244321}">
-                <p14:modId xmlns:p14="http://schemas.microsoft.com/office/powerpoint/2010/main" val="3161980839"/>
+                <p14:modId xmlns:p14="http://schemas.microsoft.com/office/powerpoint/2010/main" val="3322139284"/>
               </p:ext>
             </p:extLst>
           </p:nvPr>
         </p:nvGraphicFramePr>
         <p:xfrm>
-          <a:off x="15258781" y="11040146"/>
-          <a:ext cx="27782521" cy="5264929"/>
+          <a:off x="14950398" y="10556354"/>
+          <a:ext cx="28239719" cy="4112895"/>
         </p:xfrm>
         <a:graphic>
           <a:graphicData uri="http://schemas.openxmlformats.org/drawingml/2006/table">
@@ -5764,21 +5939,21 @@
                 <a:tableStyleId>{5940675A-B579-460E-94D1-54222C63F5DA}</a:tableStyleId>
               </a:tblPr>
               <a:tblGrid>
-                <a:gridCol w="2301241">
+                <a:gridCol w="1325889">
                   <a:extLst>
                     <a:ext uri="{9D8B030D-6E8A-4147-A177-3AD203B41FA5}">
                       <a16:colId xmlns:a16="http://schemas.microsoft.com/office/drawing/2014/main" val="2074238800"/>
                     </a:ext>
                   </a:extLst>
                 </a:gridCol>
-                <a:gridCol w="12740640">
+                <a:gridCol w="12298680">
                   <a:extLst>
                     <a:ext uri="{9D8B030D-6E8A-4147-A177-3AD203B41FA5}">
                       <a16:colId xmlns:a16="http://schemas.microsoft.com/office/drawing/2014/main" val="2240268206"/>
                     </a:ext>
                   </a:extLst>
                 </a:gridCol>
-                <a:gridCol w="12740640">
+                <a:gridCol w="14615150">
                   <a:extLst>
                     <a:ext uri="{9D8B030D-6E8A-4147-A177-3AD203B41FA5}">
                       <a16:colId xmlns:a16="http://schemas.microsoft.com/office/drawing/2014/main" val="3305914191"/>
@@ -5786,7 +5961,7 @@
                   </a:extLst>
                 </a:gridCol>
               </a:tblGrid>
-              <a:tr h="667457">
+              <a:tr h="382834">
                 <a:tc gridSpan="3">
                   <a:txBody>
                     <a:bodyPr/>
@@ -5794,7 +5969,7 @@
                     <a:p>
                       <a:pPr algn="ctr"/>
                       <a:r>
-                        <a:rPr lang="en-US" sz="3600" b="0" dirty="0">
+                        <a:rPr lang="en-US" sz="3200" b="0" dirty="0">
                           <a:solidFill>
                             <a:srgbClr val="FBD206"/>
                           </a:solidFill>
@@ -5804,7 +5979,7 @@
                         </a:rPr>
                         <a:t>Predictions with the Highest Loss</a:t>
                       </a:r>
-                      <a:endParaRPr lang="en-GB" sz="3600" b="0" dirty="0">
+                      <a:endParaRPr lang="en-GB" sz="3200" b="0" dirty="0">
                         <a:solidFill>
                           <a:srgbClr val="FBD206"/>
                         </a:solidFill>
@@ -5860,7 +6035,7 @@
                   </a:ext>
                 </a:extLst>
               </a:tr>
-              <a:tr h="667457">
+              <a:tr h="342536">
                 <a:tc>
                   <a:txBody>
                     <a:bodyPr/>
@@ -5868,7 +6043,7 @@
                     <a:p>
                       <a:pPr algn="ctr"/>
                       <a:r>
-                        <a:rPr lang="en-US" sz="3200" b="0" dirty="0">
+                        <a:rPr lang="en-US" sz="2800" b="0" dirty="0">
                           <a:solidFill>
                             <a:srgbClr val="FBD206"/>
                           </a:solidFill>
@@ -5878,7 +6053,7 @@
                         </a:rPr>
                         <a:t>Loss</a:t>
                       </a:r>
-                      <a:endParaRPr lang="en-GB" sz="3200" b="0" dirty="0">
+                      <a:endParaRPr lang="en-GB" sz="2800" b="0" dirty="0">
                         <a:solidFill>
                           <a:srgbClr val="FBD206"/>
                         </a:solidFill>
@@ -5897,7 +6072,7 @@
                     <a:p>
                       <a:pPr algn="ctr" fontAlgn="b"/>
                       <a:r>
-                        <a:rPr lang="en-GB" sz="3200" b="0" i="0" u="none" strike="noStrike" dirty="0">
+                        <a:rPr lang="en-GB" sz="2800" b="0" i="0" u="none" strike="noStrike" dirty="0">
                           <a:solidFill>
                             <a:srgbClr val="FBD206"/>
                           </a:solidFill>
@@ -5919,7 +6094,7 @@
                     <a:p>
                       <a:pPr algn="ctr" fontAlgn="b"/>
                       <a:r>
-                        <a:rPr lang="en-GB" sz="3200" b="0" i="0" u="none" strike="noStrike" dirty="0">
+                        <a:rPr lang="en-GB" sz="2800" b="0" i="0" u="none" strike="noStrike" dirty="0">
                           <a:solidFill>
                             <a:srgbClr val="FBD206"/>
                           </a:solidFill>
@@ -5940,7 +6115,7 @@
                   </a:ext>
                 </a:extLst>
               </a:tr>
-              <a:tr h="947028">
+              <a:tr h="852561">
                 <a:tc>
                   <a:txBody>
                     <a:bodyPr/>
@@ -5948,7 +6123,7 @@
                     <a:p>
                       <a:pPr algn="ctr"/>
                       <a:r>
-                        <a:rPr lang="en-GB" sz="3200">
+                        <a:rPr lang="en-GB" sz="2800">
                           <a:solidFill>
                             <a:schemeClr val="bg1"/>
                           </a:solidFill>
@@ -5969,7 +6144,7 @@
                     <a:p>
                       <a:pPr algn="l" fontAlgn="b"/>
                       <a:r>
-                        <a:rPr lang="en-US" sz="3200" b="0" i="0" u="none" strike="noStrike" dirty="0">
+                        <a:rPr lang="en-US" sz="2800" b="0" i="0" u="none" strike="noStrike" dirty="0">
                           <a:solidFill>
                             <a:schemeClr val="bg1"/>
                           </a:solidFill>
@@ -5991,7 +6166,7 @@
                     <a:p>
                       <a:pPr algn="l" fontAlgn="b"/>
                       <a:r>
-                        <a:rPr lang="en-US" sz="3200" b="0" i="0" u="none" strike="noStrike" dirty="0">
+                        <a:rPr lang="en-US" sz="2800" b="0" i="0" u="none" strike="noStrike" dirty="0">
                           <a:solidFill>
                             <a:schemeClr val="bg1"/>
                           </a:solidFill>
@@ -6012,7 +6187,7 @@
                   </a:ext>
                 </a:extLst>
               </a:tr>
-              <a:tr h="947028">
+              <a:tr h="570473">
                 <a:tc>
                   <a:txBody>
                     <a:bodyPr/>
@@ -6020,7 +6195,7 @@
                     <a:p>
                       <a:pPr algn="ctr"/>
                       <a:r>
-                        <a:rPr lang="en-GB" sz="3200" dirty="0">
+                        <a:rPr lang="en-GB" sz="2800" dirty="0">
                           <a:solidFill>
                             <a:schemeClr val="bg1"/>
                           </a:solidFill>
@@ -6041,7 +6216,7 @@
                     <a:p>
                       <a:pPr algn="l" fontAlgn="b"/>
                       <a:r>
-                        <a:rPr lang="en-US" sz="3200" b="0" i="0" u="none" strike="noStrike" dirty="0">
+                        <a:rPr lang="en-US" sz="2800" b="0" i="0" u="none" strike="noStrike" dirty="0">
                           <a:solidFill>
                             <a:schemeClr val="bg1"/>
                           </a:solidFill>
@@ -6053,7 +6228,7 @@
                         <a:t>La </a:t>
                       </a:r>
                       <a:r>
-                        <a:rPr lang="en-US" sz="3200" b="0" i="0" u="none" strike="noStrike" dirty="0" err="1">
+                        <a:rPr lang="en-US" sz="2800" b="0" i="0" u="none" strike="noStrike" dirty="0" err="1">
                           <a:solidFill>
                             <a:schemeClr val="bg1"/>
                           </a:solidFill>
@@ -6065,7 +6240,7 @@
                         <a:t>Barredora</a:t>
                       </a:r>
                       <a:r>
-                        <a:rPr lang="en-US" sz="3200" b="0" i="0" u="none" strike="noStrike" dirty="0">
+                        <a:rPr lang="en-US" sz="2800" b="0" i="0" u="none" strike="noStrike" dirty="0">
                           <a:solidFill>
                             <a:schemeClr val="bg1"/>
                           </a:solidFill>
@@ -6087,7 +6262,7 @@
                     <a:p>
                       <a:pPr algn="l" fontAlgn="b"/>
                       <a:r>
-                        <a:rPr lang="en-US" sz="3200" b="0" i="0" u="none" strike="noStrike" dirty="0">
+                        <a:rPr lang="en-US" sz="2800" b="0" i="0" u="none" strike="noStrike" dirty="0">
                           <a:solidFill>
                             <a:schemeClr val="bg1"/>
                           </a:solidFill>
@@ -6099,7 +6274,7 @@
                         <a:t>La </a:t>
                       </a:r>
                       <a:r>
-                        <a:rPr lang="en-US" sz="3200" b="0" i="0" u="none" strike="noStrike" dirty="0" err="1">
+                        <a:rPr lang="en-US" sz="2800" b="0" i="0" u="none" strike="noStrike" dirty="0" err="1">
                           <a:solidFill>
                             <a:schemeClr val="bg1"/>
                           </a:solidFill>
@@ -6111,7 +6286,7 @@
                         <a:t>Barredora</a:t>
                       </a:r>
                       <a:r>
-                        <a:rPr lang="en-US" sz="3200" b="0" i="0" u="none" strike="noStrike" dirty="0">
+                        <a:rPr lang="en-US" sz="2800" b="0" i="0" u="none" strike="noStrike" dirty="0">
                           <a:solidFill>
                             <a:schemeClr val="bg1"/>
                           </a:solidFill>
@@ -6132,7 +6307,7 @@
                   </a:ext>
                 </a:extLst>
               </a:tr>
-              <a:tr h="947028">
+              <a:tr h="570473">
                 <a:tc>
                   <a:txBody>
                     <a:bodyPr/>
@@ -6140,7 +6315,7 @@
                     <a:p>
                       <a:pPr algn="ctr"/>
                       <a:r>
-                        <a:rPr lang="en-GB" sz="3200" dirty="0">
+                        <a:rPr lang="en-GB" sz="2800" dirty="0">
                           <a:solidFill>
                             <a:schemeClr val="bg1"/>
                           </a:solidFill>
@@ -6161,7 +6336,7 @@
                     <a:p>
                       <a:pPr algn="l" fontAlgn="b"/>
                       <a:r>
-                        <a:rPr lang="en-US" sz="3200" b="0" i="0" u="none" strike="noStrike" dirty="0">
+                        <a:rPr lang="en-US" sz="2800" b="0" i="0" u="none" strike="noStrike" dirty="0">
                           <a:solidFill>
                             <a:schemeClr val="bg1"/>
                           </a:solidFill>
@@ -6183,7 +6358,7 @@
                     <a:p>
                       <a:pPr algn="l" fontAlgn="b"/>
                       <a:r>
-                        <a:rPr lang="en-US" sz="3200" b="0" i="0" u="none" strike="noStrike" dirty="0">
+                        <a:rPr lang="en-US" sz="2800" b="0" i="0" u="none" strike="noStrike" dirty="0">
                           <a:solidFill>
                             <a:schemeClr val="bg1"/>
                           </a:solidFill>
@@ -6208,6 +6383,471 @@
           </a:graphicData>
         </a:graphic>
       </p:graphicFrame>
+      <p:graphicFrame>
+        <p:nvGraphicFramePr>
+          <p:cNvPr id="41" name="Table 40">
+            <a:extLst>
+              <a:ext uri="{FF2B5EF4-FFF2-40B4-BE49-F238E27FC236}">
+                <a16:creationId xmlns:a16="http://schemas.microsoft.com/office/drawing/2014/main" id="{3B873E9A-7174-5AFE-B72D-0B8DDB751052}"/>
+              </a:ext>
+            </a:extLst>
+          </p:cNvPr>
+          <p:cNvGraphicFramePr>
+            <a:graphicFrameLocks noGrp="1"/>
+          </p:cNvGraphicFramePr>
+          <p:nvPr>
+            <p:extLst>
+              <p:ext uri="{D42A27DB-BD31-4B8C-83A1-F6EECF244321}">
+                <p14:modId xmlns:p14="http://schemas.microsoft.com/office/powerpoint/2010/main" val="2765525553"/>
+              </p:ext>
+            </p:extLst>
+          </p:nvPr>
+        </p:nvGraphicFramePr>
+        <p:xfrm>
+          <a:off x="14950386" y="21826680"/>
+          <a:ext cx="28239719" cy="4545654"/>
+        </p:xfrm>
+        <a:graphic>
+          <a:graphicData uri="http://schemas.openxmlformats.org/drawingml/2006/table">
+            <a:tbl>
+              <a:tblPr firstRow="1" bandRow="1">
+                <a:tableStyleId>{5940675A-B579-460E-94D1-54222C63F5DA}</a:tableStyleId>
+              </a:tblPr>
+              <a:tblGrid>
+                <a:gridCol w="1325889">
+                  <a:extLst>
+                    <a:ext uri="{9D8B030D-6E8A-4147-A177-3AD203B41FA5}">
+                      <a16:colId xmlns:a16="http://schemas.microsoft.com/office/drawing/2014/main" val="2074238800"/>
+                    </a:ext>
+                  </a:extLst>
+                </a:gridCol>
+                <a:gridCol w="12298680">
+                  <a:extLst>
+                    <a:ext uri="{9D8B030D-6E8A-4147-A177-3AD203B41FA5}">
+                      <a16:colId xmlns:a16="http://schemas.microsoft.com/office/drawing/2014/main" val="2240268206"/>
+                    </a:ext>
+                  </a:extLst>
+                </a:gridCol>
+                <a:gridCol w="14615150">
+                  <a:extLst>
+                    <a:ext uri="{9D8B030D-6E8A-4147-A177-3AD203B41FA5}">
+                      <a16:colId xmlns:a16="http://schemas.microsoft.com/office/drawing/2014/main" val="3305914191"/>
+                    </a:ext>
+                  </a:extLst>
+                </a:gridCol>
+              </a:tblGrid>
+              <a:tr h="631344">
+                <a:tc gridSpan="3">
+                  <a:txBody>
+                    <a:bodyPr/>
+                    <a:lstStyle/>
+                    <a:p>
+                      <a:pPr algn="ctr"/>
+                      <a:r>
+                        <a:rPr lang="en-US" sz="3200" b="0" dirty="0">
+                          <a:solidFill>
+                            <a:srgbClr val="FBD206"/>
+                          </a:solidFill>
+                          <a:latin typeface="Open Sans SemiBold" pitchFamily="2" charset="0"/>
+                          <a:ea typeface="Open Sans SemiBold" pitchFamily="2" charset="0"/>
+                          <a:cs typeface="Open Sans SemiBold" pitchFamily="2" charset="0"/>
+                        </a:rPr>
+                        <a:t>Predictions with the Highest Loss</a:t>
+                      </a:r>
+                      <a:endParaRPr lang="en-GB" sz="3200" b="0" dirty="0">
+                        <a:solidFill>
+                          <a:srgbClr val="FBD206"/>
+                        </a:solidFill>
+                        <a:latin typeface="Open Sans SemiBold" pitchFamily="2" charset="0"/>
+                        <a:ea typeface="Open Sans SemiBold" pitchFamily="2" charset="0"/>
+                        <a:cs typeface="Open Sans SemiBold" pitchFamily="2" charset="0"/>
+                      </a:endParaRPr>
+                    </a:p>
+                  </a:txBody>
+                  <a:tcPr anchor="ctr"/>
+                </a:tc>
+                <a:tc hMerge="1">
+                  <a:txBody>
+                    <a:bodyPr/>
+                    <a:lstStyle/>
+                    <a:p>
+                      <a:pPr algn="ctr" fontAlgn="b"/>
+                      <a:endParaRPr lang="en-GB" sz="3200" b="0" i="0" u="none" strike="noStrike" dirty="0">
+                        <a:solidFill>
+                          <a:srgbClr val="FBD206"/>
+                        </a:solidFill>
+                        <a:effectLst/>
+                        <a:latin typeface="Open Sans SemiBold" pitchFamily="2" charset="0"/>
+                        <a:ea typeface="Open Sans SemiBold" pitchFamily="2" charset="0"/>
+                        <a:cs typeface="Open Sans SemiBold" pitchFamily="2" charset="0"/>
+                      </a:endParaRPr>
+                    </a:p>
+                  </a:txBody>
+                  <a:tcPr marL="7620" marR="7620" marT="7620" marB="0" anchor="ctr"/>
+                </a:tc>
+                <a:tc hMerge="1">
+                  <a:txBody>
+                    <a:bodyPr/>
+                    <a:lstStyle/>
+                    <a:p>
+                      <a:pPr algn="ctr" fontAlgn="b"/>
+                      <a:endParaRPr lang="en-GB" sz="3200" b="0" i="0" u="none" strike="noStrike" dirty="0">
+                        <a:solidFill>
+                          <a:srgbClr val="FBD206"/>
+                        </a:solidFill>
+                        <a:effectLst/>
+                        <a:latin typeface="Open Sans SemiBold" pitchFamily="2" charset="0"/>
+                        <a:ea typeface="Open Sans SemiBold" pitchFamily="2" charset="0"/>
+                        <a:cs typeface="Open Sans SemiBold" pitchFamily="2" charset="0"/>
+                      </a:endParaRPr>
+                    </a:p>
+                  </a:txBody>
+                  <a:tcPr marL="7620" marR="7620" marT="7620" marB="0" anchor="ctr"/>
+                </a:tc>
+                <a:extLst>
+                  <a:ext uri="{0D108BD9-81ED-4DB2-BD59-A6C34878D82A}">
+                    <a16:rowId xmlns:a16="http://schemas.microsoft.com/office/drawing/2014/main" val="1349975616"/>
+                  </a:ext>
+                </a:extLst>
+              </a:tr>
+              <a:tr h="564887">
+                <a:tc>
+                  <a:txBody>
+                    <a:bodyPr/>
+                    <a:lstStyle/>
+                    <a:p>
+                      <a:pPr algn="ctr"/>
+                      <a:r>
+                        <a:rPr lang="en-US" sz="2800" b="0" dirty="0">
+                          <a:solidFill>
+                            <a:srgbClr val="FBD206"/>
+                          </a:solidFill>
+                          <a:latin typeface="Open Sans SemiBold" pitchFamily="2" charset="0"/>
+                          <a:ea typeface="Open Sans SemiBold" pitchFamily="2" charset="0"/>
+                          <a:cs typeface="Open Sans SemiBold" pitchFamily="2" charset="0"/>
+                        </a:rPr>
+                        <a:t>Loss</a:t>
+                      </a:r>
+                      <a:endParaRPr lang="en-GB" sz="2800" b="0" dirty="0">
+                        <a:solidFill>
+                          <a:srgbClr val="FBD206"/>
+                        </a:solidFill>
+                        <a:latin typeface="Open Sans SemiBold" pitchFamily="2" charset="0"/>
+                        <a:ea typeface="Open Sans SemiBold" pitchFamily="2" charset="0"/>
+                        <a:cs typeface="Open Sans SemiBold" pitchFamily="2" charset="0"/>
+                      </a:endParaRPr>
+                    </a:p>
+                  </a:txBody>
+                  <a:tcPr anchor="ctr"/>
+                </a:tc>
+                <a:tc>
+                  <a:txBody>
+                    <a:bodyPr/>
+                    <a:lstStyle/>
+                    <a:p>
+                      <a:pPr algn="ctr" fontAlgn="b"/>
+                      <a:r>
+                        <a:rPr lang="en-GB" sz="2800" b="0" i="0" u="none" strike="noStrike" dirty="0">
+                          <a:solidFill>
+                            <a:srgbClr val="FBD206"/>
+                          </a:solidFill>
+                          <a:effectLst/>
+                          <a:latin typeface="Open Sans SemiBold" pitchFamily="2" charset="0"/>
+                          <a:ea typeface="Open Sans SemiBold" pitchFamily="2" charset="0"/>
+                          <a:cs typeface="Open Sans SemiBold" pitchFamily="2" charset="0"/>
+                        </a:rPr>
+                        <a:t>Premise</a:t>
+                      </a:r>
+                    </a:p>
+                  </a:txBody>
+                  <a:tcPr marL="7620" marR="7620" marT="7620" marB="0" anchor="ctr"/>
+                </a:tc>
+                <a:tc>
+                  <a:txBody>
+                    <a:bodyPr/>
+                    <a:lstStyle/>
+                    <a:p>
+                      <a:pPr algn="ctr" fontAlgn="b"/>
+                      <a:r>
+                        <a:rPr lang="en-GB" sz="2800" b="0" i="0" u="none" strike="noStrike" dirty="0">
+                          <a:solidFill>
+                            <a:srgbClr val="FBD206"/>
+                          </a:solidFill>
+                          <a:effectLst/>
+                          <a:latin typeface="Open Sans SemiBold" pitchFamily="2" charset="0"/>
+                          <a:ea typeface="Open Sans SemiBold" pitchFamily="2" charset="0"/>
+                          <a:cs typeface="Open Sans SemiBold" pitchFamily="2" charset="0"/>
+                        </a:rPr>
+                        <a:t>Hypothesis</a:t>
+                      </a:r>
+                    </a:p>
+                  </a:txBody>
+                  <a:tcPr marL="7620" marR="7620" marT="7620" marB="0" anchor="ctr"/>
+                </a:tc>
+                <a:extLst>
+                  <a:ext uri="{0D108BD9-81ED-4DB2-BD59-A6C34878D82A}">
+                    <a16:rowId xmlns:a16="http://schemas.microsoft.com/office/drawing/2014/main" val="2616975685"/>
+                  </a:ext>
+                </a:extLst>
+              </a:tr>
+              <a:tr h="1403910">
+                <a:tc>
+                  <a:txBody>
+                    <a:bodyPr/>
+                    <a:lstStyle/>
+                    <a:p>
+                      <a:pPr algn="ctr" fontAlgn="b"/>
+                      <a:r>
+                        <a:rPr lang="en-GB" sz="2800" b="0" i="0" u="none" strike="noStrike" dirty="0">
+                          <a:solidFill>
+                            <a:schemeClr val="bg1"/>
+                          </a:solidFill>
+                          <a:effectLst/>
+                          <a:latin typeface="Open Sans Light" pitchFamily="2" charset="0"/>
+                          <a:ea typeface="Open Sans Light" pitchFamily="2" charset="0"/>
+                          <a:cs typeface="Open Sans Light" pitchFamily="2" charset="0"/>
+                        </a:rPr>
+                        <a:t>16.12</a:t>
+                      </a:r>
+                    </a:p>
+                  </a:txBody>
+                  <a:tcPr marL="7620" marR="7620" marT="7620" marB="0" anchor="ctr"/>
+                </a:tc>
+                <a:tc>
+                  <a:txBody>
+                    <a:bodyPr/>
+                    <a:lstStyle/>
+                    <a:p>
+                      <a:pPr algn="l" fontAlgn="b"/>
+                      <a:r>
+                        <a:rPr lang="en-US" sz="2800" b="0" i="0" u="none" strike="noStrike">
+                          <a:solidFill>
+                            <a:schemeClr val="bg1"/>
+                          </a:solidFill>
+                          <a:effectLst/>
+                          <a:latin typeface="Open Sans Light" pitchFamily="2" charset="0"/>
+                          <a:ea typeface="Open Sans Light" pitchFamily="2" charset="0"/>
+                          <a:cs typeface="Open Sans Light" pitchFamily="2" charset="0"/>
+                        </a:rPr>
+                        <a:t>The traditional word for the API is pharmacon from Greek : : Ï†Î¬ÏÎ¼Î±ÎºÎ¿Î½, adapted from pharmacos which originally denoted a magical substance or drug.</a:t>
+                      </a:r>
+                    </a:p>
+                  </a:txBody>
+                  <a:tcPr marL="7620" marR="7620" marT="7620" marB="0" anchor="ctr"/>
+                </a:tc>
+                <a:tc>
+                  <a:txBody>
+                    <a:bodyPr/>
+                    <a:lstStyle/>
+                    <a:p>
+                      <a:pPr algn="l" fontAlgn="b"/>
+                      <a:r>
+                        <a:rPr lang="en-US" sz="2800" b="0" i="0" u="none" strike="noStrike">
+                          <a:solidFill>
+                            <a:schemeClr val="bg1"/>
+                          </a:solidFill>
+                          <a:effectLst/>
+                          <a:latin typeface="Open Sans Light" pitchFamily="2" charset="0"/>
+                          <a:ea typeface="Open Sans Light" pitchFamily="2" charset="0"/>
+                          <a:cs typeface="Open Sans Light" pitchFamily="2" charset="0"/>
+                        </a:rPr>
+                        <a:t>The traditional word for the API is pharmacon or pharmakon (from Greek: Ï†Î¬ÏÎ¼Î±ÎºÎ¿Î½ , adapted from pharmacos) which originally denoted a magical substance or drug.</a:t>
+                      </a:r>
+                    </a:p>
+                  </a:txBody>
+                  <a:tcPr marL="7620" marR="7620" marT="7620" marB="0" anchor="ctr"/>
+                </a:tc>
+                <a:extLst>
+                  <a:ext uri="{0D108BD9-81ED-4DB2-BD59-A6C34878D82A}">
+                    <a16:rowId xmlns:a16="http://schemas.microsoft.com/office/drawing/2014/main" val="1005609488"/>
+                  </a:ext>
+                </a:extLst>
+              </a:tr>
+              <a:tr h="1165800">
+                <a:tc>
+                  <a:txBody>
+                    <a:bodyPr/>
+                    <a:lstStyle/>
+                    <a:p>
+                      <a:pPr algn="ctr" fontAlgn="b"/>
+                      <a:r>
+                        <a:rPr lang="en-GB" sz="2800" b="0" i="0" u="none" strike="noStrike" dirty="0">
+                          <a:solidFill>
+                            <a:schemeClr val="bg1"/>
+                          </a:solidFill>
+                          <a:effectLst/>
+                          <a:latin typeface="Open Sans Light" pitchFamily="2" charset="0"/>
+                          <a:ea typeface="Open Sans Light" pitchFamily="2" charset="0"/>
+                          <a:cs typeface="Open Sans Light" pitchFamily="2" charset="0"/>
+                        </a:rPr>
+                        <a:t>16.12</a:t>
+                      </a:r>
+                    </a:p>
+                  </a:txBody>
+                  <a:tcPr marL="7620" marR="7620" marT="7620" marB="0" anchor="ctr"/>
+                </a:tc>
+                <a:tc>
+                  <a:txBody>
+                    <a:bodyPr/>
+                    <a:lstStyle/>
+                    <a:p>
+                      <a:pPr algn="l" fontAlgn="b"/>
+                      <a:r>
+                        <a:rPr lang="en-US" sz="2800" b="0" i="0" u="none" strike="noStrike" dirty="0">
+                          <a:solidFill>
+                            <a:schemeClr val="bg1"/>
+                          </a:solidFill>
+                          <a:effectLst/>
+                          <a:latin typeface="Open Sans Light" pitchFamily="2" charset="0"/>
+                          <a:ea typeface="Open Sans Light" pitchFamily="2" charset="0"/>
+                          <a:cs typeface="Open Sans Light" pitchFamily="2" charset="0"/>
+                        </a:rPr>
+                        <a:t>She received basic training in music when her mother used to take her ' masterji ' for training.</a:t>
+                      </a:r>
+                    </a:p>
+                  </a:txBody>
+                  <a:tcPr marL="7620" marR="7620" marT="7620" marB="0" anchor="ctr"/>
+                </a:tc>
+                <a:tc>
+                  <a:txBody>
+                    <a:bodyPr/>
+                    <a:lstStyle/>
+                    <a:p>
+                      <a:pPr algn="l" fontAlgn="b"/>
+                      <a:r>
+                        <a:rPr lang="en-US" sz="2800" b="0" i="0" u="none" strike="noStrike">
+                          <a:solidFill>
+                            <a:schemeClr val="bg1"/>
+                          </a:solidFill>
+                          <a:effectLst/>
+                          <a:latin typeface="Open Sans Light" pitchFamily="2" charset="0"/>
+                          <a:ea typeface="Open Sans Light" pitchFamily="2" charset="0"/>
+                          <a:cs typeface="Open Sans Light" pitchFamily="2" charset="0"/>
+                        </a:rPr>
+                        <a:t>She received basic training in music when her mother used to take her to a Hindustani music teacher or 'masterji' for training.</a:t>
+                      </a:r>
+                    </a:p>
+                  </a:txBody>
+                  <a:tcPr marL="7620" marR="7620" marT="7620" marB="0" anchor="ctr"/>
+                </a:tc>
+                <a:extLst>
+                  <a:ext uri="{0D108BD9-81ED-4DB2-BD59-A6C34878D82A}">
+                    <a16:rowId xmlns:a16="http://schemas.microsoft.com/office/drawing/2014/main" val="1894335215"/>
+                  </a:ext>
+                </a:extLst>
+              </a:tr>
+              <a:tr h="779713">
+                <a:tc>
+                  <a:txBody>
+                    <a:bodyPr/>
+                    <a:lstStyle/>
+                    <a:p>
+                      <a:pPr algn="ctr" fontAlgn="b"/>
+                      <a:r>
+                        <a:rPr lang="en-GB" sz="2800" b="0" i="0" u="none" strike="noStrike" dirty="0">
+                          <a:solidFill>
+                            <a:schemeClr val="bg1"/>
+                          </a:solidFill>
+                          <a:effectLst/>
+                          <a:latin typeface="Open Sans Light" pitchFamily="2" charset="0"/>
+                          <a:ea typeface="Open Sans Light" pitchFamily="2" charset="0"/>
+                          <a:cs typeface="Open Sans Light" pitchFamily="2" charset="0"/>
+                        </a:rPr>
+                        <a:t>16.12</a:t>
+                      </a:r>
+                    </a:p>
+                  </a:txBody>
+                  <a:tcPr marL="7620" marR="7620" marT="7620" marB="0" anchor="ctr"/>
+                </a:tc>
+                <a:tc>
+                  <a:txBody>
+                    <a:bodyPr/>
+                    <a:lstStyle/>
+                    <a:p>
+                      <a:pPr algn="l" fontAlgn="b"/>
+                      <a:r>
+                        <a:rPr lang="en-GB" sz="2800" b="0" i="0" u="none" strike="noStrike">
+                          <a:solidFill>
+                            <a:schemeClr val="bg1"/>
+                          </a:solidFill>
+                          <a:effectLst/>
+                          <a:latin typeface="Open Sans Light" pitchFamily="2" charset="0"/>
+                          <a:ea typeface="Open Sans Light" pitchFamily="2" charset="0"/>
+                          <a:cs typeface="Open Sans Light" pitchFamily="2" charset="0"/>
+                        </a:rPr>
+                        <a:t>Mon Dieu! </a:t>
+                      </a:r>
+                    </a:p>
+                  </a:txBody>
+                  <a:tcPr marL="7620" marR="7620" marT="7620" marB="0" anchor="ctr"/>
+                </a:tc>
+                <a:tc>
+                  <a:txBody>
+                    <a:bodyPr/>
+                    <a:lstStyle/>
+                    <a:p>
+                      <a:pPr algn="l" fontAlgn="b"/>
+                      <a:r>
+                        <a:rPr lang="en-US" sz="2800" b="0" i="0" u="none" strike="noStrike" dirty="0">
+                          <a:solidFill>
+                            <a:schemeClr val="bg1"/>
+                          </a:solidFill>
+                          <a:effectLst/>
+                          <a:latin typeface="Open Sans Light" pitchFamily="2" charset="0"/>
+                          <a:ea typeface="Open Sans Light" pitchFamily="2" charset="0"/>
+                          <a:cs typeface="Open Sans Light" pitchFamily="2" charset="0"/>
+                        </a:rPr>
+                        <a:t>This person is speaking English.</a:t>
+                      </a:r>
+                    </a:p>
+                  </a:txBody>
+                  <a:tcPr marL="7620" marR="7620" marT="7620" marB="0" anchor="ctr"/>
+                </a:tc>
+                <a:extLst>
+                  <a:ext uri="{0D108BD9-81ED-4DB2-BD59-A6C34878D82A}">
+                    <a16:rowId xmlns:a16="http://schemas.microsoft.com/office/drawing/2014/main" val="2766742310"/>
+                  </a:ext>
+                </a:extLst>
+              </a:tr>
+            </a:tbl>
+          </a:graphicData>
+        </a:graphic>
+      </p:graphicFrame>
+      <p:pic>
+        <p:nvPicPr>
+          <p:cNvPr id="47" name="Picture 46">
+            <a:extLst>
+              <a:ext uri="{FF2B5EF4-FFF2-40B4-BE49-F238E27FC236}">
+                <a16:creationId xmlns:a16="http://schemas.microsoft.com/office/drawing/2014/main" id="{CDC31F98-3610-5CBA-7C17-BC37E9EFFE0F}"/>
+              </a:ext>
+            </a:extLst>
+          </p:cNvPr>
+          <p:cNvPicPr>
+            <a:picLocks noChangeAspect="1"/>
+          </p:cNvPicPr>
+          <p:nvPr/>
+        </p:nvPicPr>
+        <p:blipFill rotWithShape="1">
+          <a:blip r:embed="rId6">
+            <a:extLst>
+              <a:ext uri="{28A0092B-C50C-407E-A947-70E740481C1C}">
+                <a14:useLocalDpi xmlns:a14="http://schemas.microsoft.com/office/drawing/2010/main" val="0"/>
+              </a:ext>
+            </a:extLst>
+          </a:blip>
+          <a:srcRect l="9378" t="9731" r="9339" b="5887"/>
+          <a:stretch/>
+        </p:blipFill>
+        <p:spPr>
+          <a:xfrm>
+            <a:off x="15245455" y="16087471"/>
+            <a:ext cx="11037842" cy="5729302"/>
+          </a:xfrm>
+          <a:prstGeom prst="rect">
+            <a:avLst/>
+          </a:prstGeom>
+        </p:spPr>
+      </p:pic>
     </p:spTree>
     <p:extLst>
       <p:ext uri="{BB962C8B-B14F-4D97-AF65-F5344CB8AC3E}">

</xml_diff>

<commit_message>
Update class filepath variables and do final check
</commit_message>
<xml_diff>
--- a/poster/poster.pptx
+++ b/poster/poster.pptx
@@ -255,7 +255,7 @@
           <a:p>
             <a:fld id="{52A2FECF-891D-49EB-A3E6-5F3FE0DE1572}" type="datetimeFigureOut">
               <a:rPr lang="en-GB" smtClean="0"/>
-              <a:t>23/04/2024</a:t>
+              <a:t>24/04/2024</a:t>
             </a:fld>
             <a:endParaRPr lang="en-GB"/>
           </a:p>
@@ -425,7 +425,7 @@
           <a:p>
             <a:fld id="{52A2FECF-891D-49EB-A3E6-5F3FE0DE1572}" type="datetimeFigureOut">
               <a:rPr lang="en-GB" smtClean="0"/>
-              <a:t>23/04/2024</a:t>
+              <a:t>24/04/2024</a:t>
             </a:fld>
             <a:endParaRPr lang="en-GB"/>
           </a:p>
@@ -605,7 +605,7 @@
           <a:p>
             <a:fld id="{52A2FECF-891D-49EB-A3E6-5F3FE0DE1572}" type="datetimeFigureOut">
               <a:rPr lang="en-GB" smtClean="0"/>
-              <a:t>23/04/2024</a:t>
+              <a:t>24/04/2024</a:t>
             </a:fld>
             <a:endParaRPr lang="en-GB"/>
           </a:p>
@@ -775,7 +775,7 @@
           <a:p>
             <a:fld id="{52A2FECF-891D-49EB-A3E6-5F3FE0DE1572}" type="datetimeFigureOut">
               <a:rPr lang="en-GB" smtClean="0"/>
-              <a:t>23/04/2024</a:t>
+              <a:t>24/04/2024</a:t>
             </a:fld>
             <a:endParaRPr lang="en-GB"/>
           </a:p>
@@ -1019,7 +1019,7 @@
           <a:p>
             <a:fld id="{52A2FECF-891D-49EB-A3E6-5F3FE0DE1572}" type="datetimeFigureOut">
               <a:rPr lang="en-GB" smtClean="0"/>
-              <a:t>23/04/2024</a:t>
+              <a:t>24/04/2024</a:t>
             </a:fld>
             <a:endParaRPr lang="en-GB"/>
           </a:p>
@@ -1251,7 +1251,7 @@
           <a:p>
             <a:fld id="{52A2FECF-891D-49EB-A3E6-5F3FE0DE1572}" type="datetimeFigureOut">
               <a:rPr lang="en-GB" smtClean="0"/>
-              <a:t>23/04/2024</a:t>
+              <a:t>24/04/2024</a:t>
             </a:fld>
             <a:endParaRPr lang="en-GB"/>
           </a:p>
@@ -1618,7 +1618,7 @@
           <a:p>
             <a:fld id="{52A2FECF-891D-49EB-A3E6-5F3FE0DE1572}" type="datetimeFigureOut">
               <a:rPr lang="en-GB" smtClean="0"/>
-              <a:t>23/04/2024</a:t>
+              <a:t>24/04/2024</a:t>
             </a:fld>
             <a:endParaRPr lang="en-GB"/>
           </a:p>
@@ -1736,7 +1736,7 @@
           <a:p>
             <a:fld id="{52A2FECF-891D-49EB-A3E6-5F3FE0DE1572}" type="datetimeFigureOut">
               <a:rPr lang="en-GB" smtClean="0"/>
-              <a:t>23/04/2024</a:t>
+              <a:t>24/04/2024</a:t>
             </a:fld>
             <a:endParaRPr lang="en-GB"/>
           </a:p>
@@ -1831,7 +1831,7 @@
           <a:p>
             <a:fld id="{52A2FECF-891D-49EB-A3E6-5F3FE0DE1572}" type="datetimeFigureOut">
               <a:rPr lang="en-GB" smtClean="0"/>
-              <a:t>23/04/2024</a:t>
+              <a:t>24/04/2024</a:t>
             </a:fld>
             <a:endParaRPr lang="en-GB"/>
           </a:p>
@@ -2108,7 +2108,7 @@
           <a:p>
             <a:fld id="{52A2FECF-891D-49EB-A3E6-5F3FE0DE1572}" type="datetimeFigureOut">
               <a:rPr lang="en-GB" smtClean="0"/>
-              <a:t>23/04/2024</a:t>
+              <a:t>24/04/2024</a:t>
             </a:fld>
             <a:endParaRPr lang="en-GB"/>
           </a:p>
@@ -2365,7 +2365,7 @@
           <a:p>
             <a:fld id="{52A2FECF-891D-49EB-A3E6-5F3FE0DE1572}" type="datetimeFigureOut">
               <a:rPr lang="en-GB" smtClean="0"/>
-              <a:t>23/04/2024</a:t>
+              <a:t>24/04/2024</a:t>
             </a:fld>
             <a:endParaRPr lang="en-GB"/>
           </a:p>
@@ -2578,7 +2578,7 @@
           <a:p>
             <a:fld id="{52A2FECF-891D-49EB-A3E6-5F3FE0DE1572}" type="datetimeFigureOut">
               <a:rPr lang="en-GB" smtClean="0"/>
-              <a:t>23/04/2024</a:t>
+              <a:t>24/04/2024</a:t>
             </a:fld>
             <a:endParaRPr lang="en-GB"/>
           </a:p>
@@ -2993,10 +2993,10 @@
       </p:grpSpPr>
       <p:grpSp>
         <p:nvGrpSpPr>
-          <p:cNvPr id="45" name="Group 44">
+          <p:cNvPr id="2" name="Group 1">
             <a:extLst>
               <a:ext uri="{FF2B5EF4-FFF2-40B4-BE49-F238E27FC236}">
-                <a16:creationId xmlns:a16="http://schemas.microsoft.com/office/drawing/2014/main" id="{2335D509-B8CD-2790-9724-8280762B548A}"/>
+                <a16:creationId xmlns:a16="http://schemas.microsoft.com/office/drawing/2014/main" id="{6E1EB442-AC56-6327-EEB9-ED91CDE5B5FD}"/>
               </a:ext>
             </a:extLst>
           </p:cNvPr>
@@ -3005,10 +3005,10 @@
         </p:nvGrpSpPr>
         <p:grpSpPr>
           <a:xfrm>
-            <a:off x="14950397" y="15431049"/>
-            <a:ext cx="28239720" cy="11347103"/>
-            <a:chOff x="14950400" y="15536257"/>
-            <a:chExt cx="28239720" cy="11347103"/>
+            <a:off x="14950397" y="15926412"/>
+            <a:ext cx="28239720" cy="10851740"/>
+            <a:chOff x="14950397" y="15926412"/>
+            <a:chExt cx="28239720" cy="10851740"/>
           </a:xfrm>
         </p:grpSpPr>
         <p:sp>
@@ -3025,8 +3025,8 @@
           </p:nvSpPr>
           <p:spPr>
             <a:xfrm>
-              <a:off x="14950400" y="15536257"/>
-              <a:ext cx="28239720" cy="11347103"/>
+              <a:off x="14950397" y="15926412"/>
+              <a:ext cx="28239720" cy="10851740"/>
             </a:xfrm>
             <a:prstGeom prst="roundRect">
               <a:avLst>
@@ -3132,8 +3132,43 @@
           </p:blipFill>
           <p:spPr>
             <a:xfrm>
-              <a:off x="33436559" y="15709371"/>
-              <a:ext cx="8961121" cy="6495309"/>
+              <a:off x="32691721" y="16096782"/>
+              <a:ext cx="9705918" cy="7035162"/>
+            </a:xfrm>
+            <a:prstGeom prst="rect">
+              <a:avLst/>
+            </a:prstGeom>
+          </p:spPr>
+        </p:pic>
+        <p:pic>
+          <p:nvPicPr>
+            <p:cNvPr id="47" name="Picture 46">
+              <a:extLst>
+                <a:ext uri="{FF2B5EF4-FFF2-40B4-BE49-F238E27FC236}">
+                  <a16:creationId xmlns:a16="http://schemas.microsoft.com/office/drawing/2014/main" id="{CDC31F98-3610-5CBA-7C17-BC37E9EFFE0F}"/>
+                </a:ext>
+              </a:extLst>
+            </p:cNvPr>
+            <p:cNvPicPr>
+              <a:picLocks noChangeAspect="1"/>
+            </p:cNvPicPr>
+            <p:nvPr/>
+          </p:nvPicPr>
+          <p:blipFill rotWithShape="1">
+            <a:blip r:embed="rId3">
+              <a:extLst>
+                <a:ext uri="{28A0092B-C50C-407E-A947-70E740481C1C}">
+                  <a14:useLocalDpi xmlns:a14="http://schemas.microsoft.com/office/drawing/2010/main" val="0"/>
+                </a:ext>
+              </a:extLst>
+            </a:blip>
+            <a:srcRect l="9378" t="9731" r="9339" b="5887"/>
+            <a:stretch/>
+          </p:blipFill>
+          <p:spPr>
+            <a:xfrm>
+              <a:off x="15245454" y="17001097"/>
+              <a:ext cx="11554929" cy="5997701"/>
             </a:xfrm>
             <a:prstGeom prst="rect">
               <a:avLst/>
@@ -3242,7 +3277,7 @@
           <p:nvPr/>
         </p:nvPicPr>
         <p:blipFill rotWithShape="1">
-          <a:blip r:embed="rId3">
+          <a:blip r:embed="rId4">
             <a:extLst>
               <a:ext uri="{28A0092B-C50C-407E-A947-70E740481C1C}">
                 <a14:useLocalDpi xmlns:a14="http://schemas.microsoft.com/office/drawing/2010/main" val="0"/>
@@ -4185,24 +4220,7 @@
                 <a:ea typeface="Open Sans Light" pitchFamily="2" charset="0"/>
                 <a:cs typeface="Open Sans Light" pitchFamily="2" charset="0"/>
               </a:rPr>
-              <a:t>but also loss, compared with RNNs</a:t>
-            </a:r>
-          </a:p>
-          <a:p>
-            <a:pPr marL="1314450" lvl="1" indent="-857250">
-              <a:buFont typeface="Arial" panose="020B0604020202020204" pitchFamily="34" charset="0"/>
-              <a:buChar char="•"/>
-            </a:pPr>
-            <a:r>
-              <a:rPr lang="en-US" sz="4000" dirty="0">
-                <a:solidFill>
-                  <a:schemeClr val="bg1"/>
-                </a:solidFill>
-                <a:latin typeface="Open Sans Light" pitchFamily="2" charset="0"/>
-                <a:ea typeface="Open Sans Light" pitchFamily="2" charset="0"/>
-                <a:cs typeface="Open Sans Light" pitchFamily="2" charset="0"/>
-              </a:rPr>
-              <a:t>Likely due to low output scores from RNNs</a:t>
+              <a:t>compared with RNN</a:t>
             </a:r>
           </a:p>
           <a:p>
@@ -4220,6 +4238,89 @@
                 <a:cs typeface="Open Sans Light" pitchFamily="2" charset="0"/>
               </a:rPr>
               <a:t>Basic textual augmentations do not significantly improve performance</a:t>
+            </a:r>
+          </a:p>
+          <a:p>
+            <a:pPr marL="857250" indent="-857250">
+              <a:buFont typeface="Arial" panose="020B0604020202020204" pitchFamily="34" charset="0"/>
+              <a:buChar char="•"/>
+            </a:pPr>
+            <a:r>
+              <a:rPr lang="en-US" sz="4000" dirty="0">
+                <a:solidFill>
+                  <a:schemeClr val="bg1"/>
+                </a:solidFill>
+                <a:latin typeface="Open Sans Light" pitchFamily="2" charset="0"/>
+                <a:ea typeface="Open Sans Light" pitchFamily="2" charset="0"/>
+                <a:cs typeface="Open Sans Light" pitchFamily="2" charset="0"/>
+              </a:rPr>
+              <a:t>Models struggle when premise &amp; hypotheses are </a:t>
+            </a:r>
+            <a:r>
+              <a:rPr lang="en-US" sz="4000" b="1" dirty="0">
+                <a:solidFill>
+                  <a:schemeClr val="bg1"/>
+                </a:solidFill>
+                <a:latin typeface="Open Sans Light" pitchFamily="2" charset="0"/>
+                <a:ea typeface="Open Sans Light" pitchFamily="2" charset="0"/>
+                <a:cs typeface="Open Sans Light" pitchFamily="2" charset="0"/>
+              </a:rPr>
+              <a:t>ambiguous</a:t>
+            </a:r>
+            <a:r>
+              <a:rPr lang="en-US" sz="4000" dirty="0">
+                <a:solidFill>
+                  <a:schemeClr val="bg1"/>
+                </a:solidFill>
+                <a:latin typeface="Open Sans Light" pitchFamily="2" charset="0"/>
+                <a:ea typeface="Open Sans Light" pitchFamily="2" charset="0"/>
+                <a:cs typeface="Open Sans Light" pitchFamily="2" charset="0"/>
+              </a:rPr>
+              <a:t>, contain </a:t>
+            </a:r>
+            <a:r>
+              <a:rPr lang="en-US" sz="4000" b="1" dirty="0">
+                <a:solidFill>
+                  <a:schemeClr val="bg1"/>
+                </a:solidFill>
+                <a:latin typeface="Open Sans Light" pitchFamily="2" charset="0"/>
+                <a:ea typeface="Open Sans Light" pitchFamily="2" charset="0"/>
+                <a:cs typeface="Open Sans Light" pitchFamily="2" charset="0"/>
+              </a:rPr>
+              <a:t>disfluencies</a:t>
+            </a:r>
+            <a:r>
+              <a:rPr lang="en-US" sz="4000" dirty="0">
+                <a:solidFill>
+                  <a:schemeClr val="bg1"/>
+                </a:solidFill>
+                <a:latin typeface="Open Sans Light" pitchFamily="2" charset="0"/>
+                <a:ea typeface="Open Sans Light" pitchFamily="2" charset="0"/>
+                <a:cs typeface="Open Sans Light" pitchFamily="2" charset="0"/>
+              </a:rPr>
+              <a:t> or </a:t>
+            </a:r>
+            <a:r>
+              <a:rPr lang="en-US" sz="4000" b="1" dirty="0">
+                <a:solidFill>
+                  <a:schemeClr val="bg1"/>
+                </a:solidFill>
+                <a:latin typeface="Open Sans Light" pitchFamily="2" charset="0"/>
+                <a:ea typeface="Open Sans Light" pitchFamily="2" charset="0"/>
+                <a:cs typeface="Open Sans Light" pitchFamily="2" charset="0"/>
+              </a:rPr>
+              <a:t>OOV  </a:t>
+            </a:r>
+            <a:r>
+              <a:rPr lang="en-US" sz="4000" dirty="0">
+                <a:solidFill>
+                  <a:schemeClr val="bg1"/>
+                </a:solidFill>
+                <a:latin typeface="Open Sans Light" pitchFamily="2" charset="0"/>
+                <a:ea typeface="Open Sans Light" pitchFamily="2" charset="0"/>
+                <a:cs typeface="Open Sans Light" pitchFamily="2" charset="0"/>
+              </a:rPr>
+              <a:t>words</a:t>
             </a:r>
           </a:p>
           <a:p>
@@ -4665,7 +4766,7 @@
           <p:nvPr/>
         </p:nvPicPr>
         <p:blipFill rotWithShape="1">
-          <a:blip r:embed="rId3">
+          <a:blip r:embed="rId4">
             <a:extLst>
               <a:ext uri="{28A0092B-C50C-407E-A947-70E740481C1C}">
                 <a14:useLocalDpi xmlns:a14="http://schemas.microsoft.com/office/drawing/2010/main" val="0"/>
@@ -4710,14 +4811,14 @@
           <p:nvPr>
             <p:extLst>
               <p:ext uri="{D42A27DB-BD31-4B8C-83A1-F6EECF244321}">
-                <p14:modId xmlns:p14="http://schemas.microsoft.com/office/powerpoint/2010/main" val="1473218545"/>
+                <p14:modId xmlns:p14="http://schemas.microsoft.com/office/powerpoint/2010/main" val="2578871310"/>
               </p:ext>
             </p:extLst>
           </p:nvPr>
         </p:nvGraphicFramePr>
         <p:xfrm>
-          <a:off x="14950415" y="28147322"/>
-          <a:ext cx="28239705" cy="4141878"/>
+          <a:off x="15245454" y="28147322"/>
+          <a:ext cx="27609426" cy="4141878"/>
         </p:xfrm>
         <a:graphic>
           <a:graphicData uri="http://schemas.openxmlformats.org/drawingml/2006/table">
@@ -4726,91 +4827,91 @@
                 <a:tableStyleId>{5940675A-B579-460E-94D1-54222C63F5DA}</a:tableStyleId>
               </a:tblPr>
               <a:tblGrid>
-                <a:gridCol w="2172285">
+                <a:gridCol w="2123802">
                   <a:extLst>
                     <a:ext uri="{9D8B030D-6E8A-4147-A177-3AD203B41FA5}">
                       <a16:colId xmlns:a16="http://schemas.microsoft.com/office/drawing/2014/main" val="2074238800"/>
                     </a:ext>
                   </a:extLst>
                 </a:gridCol>
-                <a:gridCol w="2172285">
+                <a:gridCol w="2123802">
                   <a:extLst>
                     <a:ext uri="{9D8B030D-6E8A-4147-A177-3AD203B41FA5}">
                       <a16:colId xmlns:a16="http://schemas.microsoft.com/office/drawing/2014/main" val="2240268206"/>
                     </a:ext>
                   </a:extLst>
                 </a:gridCol>
-                <a:gridCol w="2172285">
+                <a:gridCol w="2123802">
                   <a:extLst>
                     <a:ext uri="{9D8B030D-6E8A-4147-A177-3AD203B41FA5}">
                       <a16:colId xmlns:a16="http://schemas.microsoft.com/office/drawing/2014/main" val="3305914191"/>
                     </a:ext>
                   </a:extLst>
                 </a:gridCol>
-                <a:gridCol w="2172285">
+                <a:gridCol w="2123802">
                   <a:extLst>
                     <a:ext uri="{9D8B030D-6E8A-4147-A177-3AD203B41FA5}">
                       <a16:colId xmlns:a16="http://schemas.microsoft.com/office/drawing/2014/main" val="3391066115"/>
                     </a:ext>
                   </a:extLst>
                 </a:gridCol>
-                <a:gridCol w="2172285">
+                <a:gridCol w="2123802">
                   <a:extLst>
                     <a:ext uri="{9D8B030D-6E8A-4147-A177-3AD203B41FA5}">
                       <a16:colId xmlns:a16="http://schemas.microsoft.com/office/drawing/2014/main" val="4079886862"/>
                     </a:ext>
                   </a:extLst>
                 </a:gridCol>
-                <a:gridCol w="2172285">
+                <a:gridCol w="2123802">
                   <a:extLst>
                     <a:ext uri="{9D8B030D-6E8A-4147-A177-3AD203B41FA5}">
                       <a16:colId xmlns:a16="http://schemas.microsoft.com/office/drawing/2014/main" val="1603675036"/>
                     </a:ext>
                   </a:extLst>
                 </a:gridCol>
-                <a:gridCol w="2172285">
+                <a:gridCol w="2123802">
                   <a:extLst>
                     <a:ext uri="{9D8B030D-6E8A-4147-A177-3AD203B41FA5}">
                       <a16:colId xmlns:a16="http://schemas.microsoft.com/office/drawing/2014/main" val="1095657681"/>
                     </a:ext>
                   </a:extLst>
                 </a:gridCol>
-                <a:gridCol w="2172285">
+                <a:gridCol w="2123802">
                   <a:extLst>
                     <a:ext uri="{9D8B030D-6E8A-4147-A177-3AD203B41FA5}">
                       <a16:colId xmlns:a16="http://schemas.microsoft.com/office/drawing/2014/main" val="2061514745"/>
                     </a:ext>
                   </a:extLst>
                 </a:gridCol>
-                <a:gridCol w="2172285">
+                <a:gridCol w="2123802">
                   <a:extLst>
                     <a:ext uri="{9D8B030D-6E8A-4147-A177-3AD203B41FA5}">
                       <a16:colId xmlns:a16="http://schemas.microsoft.com/office/drawing/2014/main" val="4013144454"/>
                     </a:ext>
                   </a:extLst>
                 </a:gridCol>
-                <a:gridCol w="2172285">
+                <a:gridCol w="2123802">
                   <a:extLst>
                     <a:ext uri="{9D8B030D-6E8A-4147-A177-3AD203B41FA5}">
                       <a16:colId xmlns:a16="http://schemas.microsoft.com/office/drawing/2014/main" val="3579964545"/>
                     </a:ext>
                   </a:extLst>
                 </a:gridCol>
-                <a:gridCol w="2172285">
+                <a:gridCol w="2123802">
                   <a:extLst>
                     <a:ext uri="{9D8B030D-6E8A-4147-A177-3AD203B41FA5}">
                       <a16:colId xmlns:a16="http://schemas.microsoft.com/office/drawing/2014/main" val="3448529985"/>
                     </a:ext>
                   </a:extLst>
                 </a:gridCol>
-                <a:gridCol w="2172285">
+                <a:gridCol w="2123802">
                   <a:extLst>
                     <a:ext uri="{9D8B030D-6E8A-4147-A177-3AD203B41FA5}">
                       <a16:colId xmlns:a16="http://schemas.microsoft.com/office/drawing/2014/main" val="2131172517"/>
                     </a:ext>
                   </a:extLst>
                 </a:gridCol>
-                <a:gridCol w="2172285">
+                <a:gridCol w="2123802">
                   <a:extLst>
                     <a:ext uri="{9D8B030D-6E8A-4147-A177-3AD203B41FA5}">
                       <a16:colId xmlns:a16="http://schemas.microsoft.com/office/drawing/2014/main" val="1762411193"/>
@@ -5706,7 +5807,7 @@
                           <a:ea typeface="Open Sans Light" pitchFamily="2" charset="0"/>
                           <a:cs typeface="Open Sans Light" pitchFamily="2" charset="0"/>
                         </a:rPr>
-                        <a:t>1.849</a:t>
+                        <a:t>0.333</a:t>
                       </a:r>
                     </a:p>
                   </a:txBody>
@@ -5737,9 +5838,9 @@
         <p:grpSpPr>
           <a:xfrm>
             <a:off x="14950397" y="3817655"/>
-            <a:ext cx="28239720" cy="11347103"/>
+            <a:ext cx="28239720" cy="11814272"/>
             <a:chOff x="14950440" y="3770977"/>
-            <a:chExt cx="28239720" cy="11347103"/>
+            <a:chExt cx="28239720" cy="11814272"/>
           </a:xfrm>
         </p:grpSpPr>
         <p:sp>
@@ -5757,7 +5858,7 @@
           <p:spPr>
             <a:xfrm>
               <a:off x="14950440" y="3770977"/>
-              <a:ext cx="28239720" cy="11347103"/>
+              <a:ext cx="28239720" cy="11814272"/>
             </a:xfrm>
             <a:prstGeom prst="roundRect">
               <a:avLst>
@@ -5840,7 +5941,7 @@
             <p:nvPr/>
           </p:nvPicPr>
           <p:blipFill>
-            <a:blip r:embed="rId4">
+            <a:blip r:embed="rId5">
               <a:extLst>
                 <a:ext uri="{28A0092B-C50C-407E-A947-70E740481C1C}">
                   <a14:useLocalDpi xmlns:a14="http://schemas.microsoft.com/office/drawing/2010/main" val="0"/>
@@ -5853,8 +5954,8 @@
           </p:blipFill>
           <p:spPr>
             <a:xfrm>
-              <a:off x="15245497" y="4724400"/>
-              <a:ext cx="11037842" cy="5789787"/>
+              <a:off x="15245497" y="4866134"/>
+              <a:ext cx="12277986" cy="6440292"/>
             </a:xfrm>
             <a:prstGeom prst="rect">
               <a:avLst/>
@@ -5876,7 +5977,7 @@
             <p:nvPr/>
           </p:nvPicPr>
           <p:blipFill>
-            <a:blip r:embed="rId5">
+            <a:blip r:embed="rId6">
               <a:clrChange>
                 <a:clrFrom>
                   <a:srgbClr val="FFFFFF"/>
@@ -5899,8 +6000,8 @@
           </p:blipFill>
           <p:spPr>
             <a:xfrm>
-              <a:off x="33436560" y="4064412"/>
-              <a:ext cx="8961121" cy="6510344"/>
+              <a:off x="32522204" y="4131792"/>
+              <a:ext cx="9875478" cy="7174634"/>
             </a:xfrm>
             <a:prstGeom prst="rect">
               <a:avLst/>
@@ -5923,14 +6024,14 @@
           <p:nvPr>
             <p:extLst>
               <p:ext uri="{D42A27DB-BD31-4B8C-83A1-F6EECF244321}">
-                <p14:modId xmlns:p14="http://schemas.microsoft.com/office/powerpoint/2010/main" val="3322139284"/>
+                <p14:modId xmlns:p14="http://schemas.microsoft.com/office/powerpoint/2010/main" val="1275600275"/>
               </p:ext>
             </p:extLst>
           </p:nvPr>
         </p:nvGraphicFramePr>
         <p:xfrm>
-          <a:off x="14950398" y="10556354"/>
-          <a:ext cx="28239719" cy="4112895"/>
+          <a:off x="15245454" y="11353104"/>
+          <a:ext cx="27609426" cy="4112895"/>
         </p:xfrm>
         <a:graphic>
           <a:graphicData uri="http://schemas.openxmlformats.org/drawingml/2006/table">
@@ -5939,21 +6040,21 @@
                 <a:tableStyleId>{5940675A-B579-460E-94D1-54222C63F5DA}</a:tableStyleId>
               </a:tblPr>
               <a:tblGrid>
-                <a:gridCol w="1325889">
+                <a:gridCol w="1296296">
                   <a:extLst>
                     <a:ext uri="{9D8B030D-6E8A-4147-A177-3AD203B41FA5}">
                       <a16:colId xmlns:a16="http://schemas.microsoft.com/office/drawing/2014/main" val="2074238800"/>
                     </a:ext>
                   </a:extLst>
                 </a:gridCol>
-                <a:gridCol w="12298680">
+                <a:gridCol w="12024181">
                   <a:extLst>
                     <a:ext uri="{9D8B030D-6E8A-4147-A177-3AD203B41FA5}">
                       <a16:colId xmlns:a16="http://schemas.microsoft.com/office/drawing/2014/main" val="2240268206"/>
                     </a:ext>
                   </a:extLst>
                 </a:gridCol>
-                <a:gridCol w="14615150">
+                <a:gridCol w="14288949">
                   <a:extLst>
                     <a:ext uri="{9D8B030D-6E8A-4147-A177-3AD203B41FA5}">
                       <a16:colId xmlns:a16="http://schemas.microsoft.com/office/drawing/2014/main" val="3305914191"/>
@@ -6398,14 +6499,14 @@
           <p:nvPr>
             <p:extLst>
               <p:ext uri="{D42A27DB-BD31-4B8C-83A1-F6EECF244321}">
-                <p14:modId xmlns:p14="http://schemas.microsoft.com/office/powerpoint/2010/main" val="2765525553"/>
+                <p14:modId xmlns:p14="http://schemas.microsoft.com/office/powerpoint/2010/main" val="1103678303"/>
               </p:ext>
             </p:extLst>
           </p:nvPr>
         </p:nvGraphicFramePr>
         <p:xfrm>
-          <a:off x="14950386" y="21826680"/>
-          <a:ext cx="28239719" cy="4545654"/>
+          <a:off x="15245454" y="23131944"/>
+          <a:ext cx="27609426" cy="3351723"/>
         </p:xfrm>
         <a:graphic>
           <a:graphicData uri="http://schemas.openxmlformats.org/drawingml/2006/table">
@@ -6414,21 +6515,21 @@
                 <a:tableStyleId>{5940675A-B579-460E-94D1-54222C63F5DA}</a:tableStyleId>
               </a:tblPr>
               <a:tblGrid>
-                <a:gridCol w="1325889">
+                <a:gridCol w="1296296">
                   <a:extLst>
                     <a:ext uri="{9D8B030D-6E8A-4147-A177-3AD203B41FA5}">
                       <a16:colId xmlns:a16="http://schemas.microsoft.com/office/drawing/2014/main" val="2074238800"/>
                     </a:ext>
                   </a:extLst>
                 </a:gridCol>
-                <a:gridCol w="12298680">
+                <a:gridCol w="12024181">
                   <a:extLst>
                     <a:ext uri="{9D8B030D-6E8A-4147-A177-3AD203B41FA5}">
                       <a16:colId xmlns:a16="http://schemas.microsoft.com/office/drawing/2014/main" val="2240268206"/>
                     </a:ext>
                   </a:extLst>
                 </a:gridCol>
-                <a:gridCol w="14615150">
+                <a:gridCol w="14288949">
                   <a:extLst>
                     <a:ext uri="{9D8B030D-6E8A-4147-A177-3AD203B41FA5}">
                       <a16:colId xmlns:a16="http://schemas.microsoft.com/office/drawing/2014/main" val="3305914191"/>
@@ -6436,7 +6537,7 @@
                   </a:extLst>
                 </a:gridCol>
               </a:tblGrid>
-              <a:tr h="631344">
+              <a:tr h="469452">
                 <a:tc gridSpan="3">
                   <a:txBody>
                     <a:bodyPr/>
@@ -6510,7 +6611,7 @@
                   </a:ext>
                 </a:extLst>
               </a:tr>
-              <a:tr h="564887">
+              <a:tr h="420036">
                 <a:tc>
                   <a:txBody>
                     <a:bodyPr/>
@@ -6590,7 +6691,7 @@
                   </a:ext>
                 </a:extLst>
               </a:tr>
-              <a:tr h="1403910">
+              <a:tr h="761247">
                 <a:tc>
                   <a:txBody>
                     <a:bodyPr/>
@@ -6607,7 +6708,7 @@
                           <a:ea typeface="Open Sans Light" pitchFamily="2" charset="0"/>
                           <a:cs typeface="Open Sans Light" pitchFamily="2" charset="0"/>
                         </a:rPr>
-                        <a:t>16.12</a:t>
+                        <a:t>6.04</a:t>
                       </a:r>
                     </a:p>
                   </a:txBody>
@@ -6620,7 +6721,7 @@
                     <a:p>
                       <a:pPr algn="l" fontAlgn="b"/>
                       <a:r>
-                        <a:rPr lang="en-US" sz="2800" b="0" i="0" u="none" strike="noStrike">
+                        <a:rPr lang="en-US" sz="2800" b="0" i="0" u="none" strike="noStrike" dirty="0">
                           <a:solidFill>
                             <a:schemeClr val="bg1"/>
                           </a:solidFill>
@@ -6629,7 +6730,7 @@
                           <a:ea typeface="Open Sans Light" pitchFamily="2" charset="0"/>
                           <a:cs typeface="Open Sans Light" pitchFamily="2" charset="0"/>
                         </a:rPr>
-                        <a:t>The traditional word for the API is pharmacon from Greek : : Ï†Î¬ÏÎ¼Î±ÎºÎ¿Î½, adapted from pharmacos which originally denoted a magical substance or drug.</a:t>
+                        <a:t>okay well what are we doing about recycling in our community</a:t>
                       </a:r>
                     </a:p>
                   </a:txBody>
@@ -6642,7 +6743,7 @@
                     <a:p>
                       <a:pPr algn="l" fontAlgn="b"/>
                       <a:r>
-                        <a:rPr lang="en-US" sz="2800" b="0" i="0" u="none" strike="noStrike">
+                        <a:rPr lang="en-US" sz="2800" b="0" i="0" u="none" strike="noStrike" dirty="0">
                           <a:solidFill>
                             <a:schemeClr val="bg1"/>
                           </a:solidFill>
@@ -6651,7 +6752,7 @@
                           <a:ea typeface="Open Sans Light" pitchFamily="2" charset="0"/>
                           <a:cs typeface="Open Sans Light" pitchFamily="2" charset="0"/>
                         </a:rPr>
-                        <a:t>The traditional word for the API is pharmacon or pharmakon (from Greek: Ï†Î¬ÏÎ¼Î±ÎºÎ¿Î½ , adapted from pharmacos) which originally denoted a magical substance or drug.</a:t>
+                        <a:t>Our community does not recycle.</a:t>
                       </a:r>
                     </a:p>
                   </a:txBody>
@@ -6663,7 +6764,7 @@
                   </a:ext>
                 </a:extLst>
               </a:tr>
-              <a:tr h="1165800">
+              <a:tr h="632136">
                 <a:tc>
                   <a:txBody>
                     <a:bodyPr/>
@@ -6680,7 +6781,7 @@
                           <a:ea typeface="Open Sans Light" pitchFamily="2" charset="0"/>
                           <a:cs typeface="Open Sans Light" pitchFamily="2" charset="0"/>
                         </a:rPr>
-                        <a:t>16.12</a:t>
+                        <a:t>5.90</a:t>
                       </a:r>
                     </a:p>
                   </a:txBody>
@@ -6702,7 +6803,31 @@
                           <a:ea typeface="Open Sans Light" pitchFamily="2" charset="0"/>
                           <a:cs typeface="Open Sans Light" pitchFamily="2" charset="0"/>
                         </a:rPr>
-                        <a:t>She received basic training in music when her mother used to take her ' masterji ' for training.</a:t>
+                        <a:t>The port is virtually round the corner from the </a:t>
+                      </a:r>
+                      <a:r>
+                        <a:rPr lang="en-US" sz="2800" b="0" i="0" u="none" strike="noStrike" dirty="0" err="1">
+                          <a:solidFill>
+                            <a:schemeClr val="bg1"/>
+                          </a:solidFill>
+                          <a:effectLst/>
+                          <a:latin typeface="Open Sans Light" pitchFamily="2" charset="0"/>
+                          <a:ea typeface="Open Sans Light" pitchFamily="2" charset="0"/>
+                          <a:cs typeface="Open Sans Light" pitchFamily="2" charset="0"/>
+                        </a:rPr>
+                        <a:t>passeig</a:t>
+                      </a:r>
+                      <a:r>
+                        <a:rPr lang="en-US" sz="2800" b="0" i="0" u="none" strike="noStrike" dirty="0">
+                          <a:solidFill>
+                            <a:schemeClr val="bg1"/>
+                          </a:solidFill>
+                          <a:effectLst/>
+                          <a:latin typeface="Open Sans Light" pitchFamily="2" charset="0"/>
+                          <a:ea typeface="Open Sans Light" pitchFamily="2" charset="0"/>
+                          <a:cs typeface="Open Sans Light" pitchFamily="2" charset="0"/>
+                        </a:rPr>
+                        <a:t>.	</a:t>
                       </a:r>
                     </a:p>
                   </a:txBody>
@@ -6715,7 +6840,7 @@
                     <a:p>
                       <a:pPr algn="l" fontAlgn="b"/>
                       <a:r>
-                        <a:rPr lang="en-US" sz="2800" b="0" i="0" u="none" strike="noStrike">
+                        <a:rPr lang="en-US" sz="2800" b="0" i="0" u="none" strike="noStrike" dirty="0">
                           <a:solidFill>
                             <a:schemeClr val="bg1"/>
                           </a:solidFill>
@@ -6724,7 +6849,31 @@
                           <a:ea typeface="Open Sans Light" pitchFamily="2" charset="0"/>
                           <a:cs typeface="Open Sans Light" pitchFamily="2" charset="0"/>
                         </a:rPr>
-                        <a:t>She received basic training in music when her mother used to take her to a Hindustani music teacher or 'masterji' for training.</a:t>
+                        <a:t>It takes at least two days to go from the port to the </a:t>
+                      </a:r>
+                      <a:r>
+                        <a:rPr lang="en-US" sz="2800" b="0" i="0" u="none" strike="noStrike" dirty="0" err="1">
+                          <a:solidFill>
+                            <a:schemeClr val="bg1"/>
+                          </a:solidFill>
+                          <a:effectLst/>
+                          <a:latin typeface="Open Sans Light" pitchFamily="2" charset="0"/>
+                          <a:ea typeface="Open Sans Light" pitchFamily="2" charset="0"/>
+                          <a:cs typeface="Open Sans Light" pitchFamily="2" charset="0"/>
+                        </a:rPr>
+                        <a:t>passeig</a:t>
+                      </a:r>
+                      <a:r>
+                        <a:rPr lang="en-US" sz="2800" b="0" i="0" u="none" strike="noStrike" dirty="0">
+                          <a:solidFill>
+                            <a:schemeClr val="bg1"/>
+                          </a:solidFill>
+                          <a:effectLst/>
+                          <a:latin typeface="Open Sans Light" pitchFamily="2" charset="0"/>
+                          <a:ea typeface="Open Sans Light" pitchFamily="2" charset="0"/>
+                          <a:cs typeface="Open Sans Light" pitchFamily="2" charset="0"/>
+                        </a:rPr>
+                        <a:t>.</a:t>
                       </a:r>
                     </a:p>
                   </a:txBody>
@@ -6736,7 +6885,7 @@
                   </a:ext>
                 </a:extLst>
               </a:tr>
-              <a:tr h="779713">
+              <a:tr h="698002">
                 <a:tc>
                   <a:txBody>
                     <a:bodyPr/>
@@ -6753,7 +6902,7 @@
                           <a:ea typeface="Open Sans Light" pitchFamily="2" charset="0"/>
                           <a:cs typeface="Open Sans Light" pitchFamily="2" charset="0"/>
                         </a:rPr>
-                        <a:t>16.12</a:t>
+                        <a:t>5.87</a:t>
                       </a:r>
                     </a:p>
                   </a:txBody>
@@ -6766,7 +6915,7 @@
                     <a:p>
                       <a:pPr algn="l" fontAlgn="b"/>
                       <a:r>
-                        <a:rPr lang="en-GB" sz="2800" b="0" i="0" u="none" strike="noStrike">
+                        <a:rPr lang="en-US" sz="2800" b="0" i="0" u="none" strike="noStrike" dirty="0">
                           <a:solidFill>
                             <a:schemeClr val="bg1"/>
                           </a:solidFill>
@@ -6775,8 +6924,65 @@
                           <a:ea typeface="Open Sans Light" pitchFamily="2" charset="0"/>
                           <a:cs typeface="Open Sans Light" pitchFamily="2" charset="0"/>
                         </a:rPr>
-                        <a:t>Mon Dieu! </a:t>
-                      </a:r>
+                        <a:t>and </a:t>
+                      </a:r>
+                      <a:r>
+                        <a:rPr lang="en-US" sz="2800" b="0" i="0" u="none" strike="noStrike" dirty="0" err="1">
+                          <a:solidFill>
+                            <a:schemeClr val="bg1"/>
+                          </a:solidFill>
+                          <a:effectLst/>
+                          <a:latin typeface="Open Sans Light" pitchFamily="2" charset="0"/>
+                          <a:ea typeface="Open Sans Light" pitchFamily="2" charset="0"/>
+                          <a:cs typeface="Open Sans Light" pitchFamily="2" charset="0"/>
+                        </a:rPr>
+                        <a:t>i</a:t>
+                      </a:r>
+                      <a:r>
+                        <a:rPr lang="en-US" sz="2800" b="0" i="0" u="none" strike="noStrike" dirty="0">
+                          <a:solidFill>
+                            <a:schemeClr val="bg1"/>
+                          </a:solidFill>
+                          <a:effectLst/>
+                          <a:latin typeface="Open Sans Light" pitchFamily="2" charset="0"/>
+                          <a:ea typeface="Open Sans Light" pitchFamily="2" charset="0"/>
+                          <a:cs typeface="Open Sans Light" pitchFamily="2" charset="0"/>
+                        </a:rPr>
+                        <a:t> don't know about your part of the country but uh down here in the last year oh year plus </a:t>
+                      </a:r>
+                      <a:r>
+                        <a:rPr lang="en-US" sz="2800" b="0" i="0" u="none" strike="noStrike" dirty="0" err="1">
+                          <a:solidFill>
+                            <a:schemeClr val="bg1"/>
+                          </a:solidFill>
+                          <a:effectLst/>
+                          <a:latin typeface="Open Sans Light" pitchFamily="2" charset="0"/>
+                          <a:ea typeface="Open Sans Light" pitchFamily="2" charset="0"/>
+                          <a:cs typeface="Open Sans Light" pitchFamily="2" charset="0"/>
+                        </a:rPr>
+                        <a:t>i</a:t>
+                      </a:r>
+                      <a:r>
+                        <a:rPr lang="en-US" sz="2800" b="0" i="0" u="none" strike="noStrike" dirty="0">
+                          <a:solidFill>
+                            <a:schemeClr val="bg1"/>
+                          </a:solidFill>
+                          <a:effectLst/>
+                          <a:latin typeface="Open Sans Light" pitchFamily="2" charset="0"/>
+                          <a:ea typeface="Open Sans Light" pitchFamily="2" charset="0"/>
+                          <a:cs typeface="Open Sans Light" pitchFamily="2" charset="0"/>
+                        </a:rPr>
+                        <a:t> it was last beginning with last year's Earth Day</a:t>
+                      </a:r>
+                      <a:endParaRPr lang="en-GB" sz="2800" b="0" i="0" u="none" strike="noStrike" dirty="0">
+                        <a:solidFill>
+                          <a:schemeClr val="bg1"/>
+                        </a:solidFill>
+                        <a:effectLst/>
+                        <a:latin typeface="Open Sans Light" pitchFamily="2" charset="0"/>
+                        <a:ea typeface="Open Sans Light" pitchFamily="2" charset="0"/>
+                        <a:cs typeface="Open Sans Light" pitchFamily="2" charset="0"/>
+                      </a:endParaRPr>
                     </a:p>
                   </a:txBody>
                   <a:tcPr marL="7620" marR="7620" marT="7620" marB="0" anchor="ctr"/>
@@ -6797,7 +7003,7 @@
                           <a:ea typeface="Open Sans Light" pitchFamily="2" charset="0"/>
                           <a:cs typeface="Open Sans Light" pitchFamily="2" charset="0"/>
                         </a:rPr>
-                        <a:t>This person is speaking English.</a:t>
+                        <a:t>I've never been to your part of the country.</a:t>
                       </a:r>
                     </a:p>
                   </a:txBody>
@@ -6813,41 +7019,6 @@
           </a:graphicData>
         </a:graphic>
       </p:graphicFrame>
-      <p:pic>
-        <p:nvPicPr>
-          <p:cNvPr id="47" name="Picture 46">
-            <a:extLst>
-              <a:ext uri="{FF2B5EF4-FFF2-40B4-BE49-F238E27FC236}">
-                <a16:creationId xmlns:a16="http://schemas.microsoft.com/office/drawing/2014/main" id="{CDC31F98-3610-5CBA-7C17-BC37E9EFFE0F}"/>
-              </a:ext>
-            </a:extLst>
-          </p:cNvPr>
-          <p:cNvPicPr>
-            <a:picLocks noChangeAspect="1"/>
-          </p:cNvPicPr>
-          <p:nvPr/>
-        </p:nvPicPr>
-        <p:blipFill rotWithShape="1">
-          <a:blip r:embed="rId6">
-            <a:extLst>
-              <a:ext uri="{28A0092B-C50C-407E-A947-70E740481C1C}">
-                <a14:useLocalDpi xmlns:a14="http://schemas.microsoft.com/office/drawing/2010/main" val="0"/>
-              </a:ext>
-            </a:extLst>
-          </a:blip>
-          <a:srcRect l="9378" t="9731" r="9339" b="5887"/>
-          <a:stretch/>
-        </p:blipFill>
-        <p:spPr>
-          <a:xfrm>
-            <a:off x="15245455" y="16087471"/>
-            <a:ext cx="11037842" cy="5729302"/>
-          </a:xfrm>
-          <a:prstGeom prst="rect">
-            <a:avLst/>
-          </a:prstGeom>
-        </p:spPr>
-      </p:pic>
     </p:spTree>
     <p:extLst>
       <p:ext uri="{BB962C8B-B14F-4D97-AF65-F5344CB8AC3E}">

</xml_diff>